<commit_message>
added some pictures to PPT
</commit_message>
<xml_diff>
--- a/Pr�sentation/Echo Cancellation.pptx
+++ b/Pr�sentation/Echo Cancellation.pptx
@@ -7,10 +7,12 @@
   <p:sldIdLst>
     <p:sldId id="256" r:id="rId2"/>
     <p:sldId id="257" r:id="rId3"/>
-    <p:sldId id="258" r:id="rId4"/>
-    <p:sldId id="259" r:id="rId5"/>
-    <p:sldId id="260" r:id="rId6"/>
-    <p:sldId id="261" r:id="rId7"/>
+    <p:sldId id="263" r:id="rId4"/>
+    <p:sldId id="258" r:id="rId5"/>
+    <p:sldId id="262" r:id="rId6"/>
+    <p:sldId id="259" r:id="rId7"/>
+    <p:sldId id="260" r:id="rId8"/>
+    <p:sldId id="261" r:id="rId9"/>
   </p:sldIdLst>
   <p:sldSz cx="9144000" cy="6858000" type="screen4x3"/>
   <p:notesSz cx="6858000" cy="9144000"/>
@@ -293,6 +295,7 @@
           <a:p>
             <a:fld id="{F27091F6-B986-4D50-AC85-4EB94450ED44}" type="datetimeFigureOut">
               <a:rPr lang="de-CH" smtClean="0"/>
+              <a:pPr/>
               <a:t>08.10.2013</a:t>
             </a:fld>
             <a:endParaRPr lang="de-CH"/>
@@ -335,6 +338,7 @@
           <a:p>
             <a:fld id="{7ED0086C-BC6B-4A2B-B421-96AA707CF198}" type="slidenum">
               <a:rPr lang="de-CH" smtClean="0"/>
+              <a:pPr/>
               <a:t>‹Nr.›</a:t>
             </a:fld>
             <a:endParaRPr lang="de-CH"/>
@@ -458,6 +462,7 @@
           <a:p>
             <a:fld id="{F27091F6-B986-4D50-AC85-4EB94450ED44}" type="datetimeFigureOut">
               <a:rPr lang="de-CH" smtClean="0"/>
+              <a:pPr/>
               <a:t>08.10.2013</a:t>
             </a:fld>
             <a:endParaRPr lang="de-CH"/>
@@ -500,6 +505,7 @@
           <a:p>
             <a:fld id="{7ED0086C-BC6B-4A2B-B421-96AA707CF198}" type="slidenum">
               <a:rPr lang="de-CH" smtClean="0"/>
+              <a:pPr/>
               <a:t>‹Nr.›</a:t>
             </a:fld>
             <a:endParaRPr lang="de-CH"/>
@@ -633,6 +639,7 @@
           <a:p>
             <a:fld id="{F27091F6-B986-4D50-AC85-4EB94450ED44}" type="datetimeFigureOut">
               <a:rPr lang="de-CH" smtClean="0"/>
+              <a:pPr/>
               <a:t>08.10.2013</a:t>
             </a:fld>
             <a:endParaRPr lang="de-CH"/>
@@ -675,6 +682,7 @@
           <a:p>
             <a:fld id="{7ED0086C-BC6B-4A2B-B421-96AA707CF198}" type="slidenum">
               <a:rPr lang="de-CH" smtClean="0"/>
+              <a:pPr/>
               <a:t>‹Nr.›</a:t>
             </a:fld>
             <a:endParaRPr lang="de-CH"/>
@@ -798,6 +806,7 @@
           <a:p>
             <a:fld id="{F27091F6-B986-4D50-AC85-4EB94450ED44}" type="datetimeFigureOut">
               <a:rPr lang="de-CH" smtClean="0"/>
+              <a:pPr/>
               <a:t>08.10.2013</a:t>
             </a:fld>
             <a:endParaRPr lang="de-CH"/>
@@ -840,6 +849,7 @@
           <a:p>
             <a:fld id="{7ED0086C-BC6B-4A2B-B421-96AA707CF198}" type="slidenum">
               <a:rPr lang="de-CH" smtClean="0"/>
+              <a:pPr/>
               <a:t>‹Nr.›</a:t>
             </a:fld>
             <a:endParaRPr lang="de-CH"/>
@@ -1039,6 +1049,7 @@
           <a:p>
             <a:fld id="{F27091F6-B986-4D50-AC85-4EB94450ED44}" type="datetimeFigureOut">
               <a:rPr lang="de-CH" smtClean="0"/>
+              <a:pPr/>
               <a:t>08.10.2013</a:t>
             </a:fld>
             <a:endParaRPr lang="de-CH"/>
@@ -1081,6 +1092,7 @@
           <a:p>
             <a:fld id="{7ED0086C-BC6B-4A2B-B421-96AA707CF198}" type="slidenum">
               <a:rPr lang="de-CH" smtClean="0"/>
+              <a:pPr/>
               <a:t>‹Nr.›</a:t>
             </a:fld>
             <a:endParaRPr lang="de-CH"/>
@@ -1322,6 +1334,7 @@
           <a:p>
             <a:fld id="{F27091F6-B986-4D50-AC85-4EB94450ED44}" type="datetimeFigureOut">
               <a:rPr lang="de-CH" smtClean="0"/>
+              <a:pPr/>
               <a:t>08.10.2013</a:t>
             </a:fld>
             <a:endParaRPr lang="de-CH"/>
@@ -1364,6 +1377,7 @@
           <a:p>
             <a:fld id="{7ED0086C-BC6B-4A2B-B421-96AA707CF198}" type="slidenum">
               <a:rPr lang="de-CH" smtClean="0"/>
+              <a:pPr/>
               <a:t>‹Nr.›</a:t>
             </a:fld>
             <a:endParaRPr lang="de-CH"/>
@@ -1739,6 +1753,7 @@
           <a:p>
             <a:fld id="{F27091F6-B986-4D50-AC85-4EB94450ED44}" type="datetimeFigureOut">
               <a:rPr lang="de-CH" smtClean="0"/>
+              <a:pPr/>
               <a:t>08.10.2013</a:t>
             </a:fld>
             <a:endParaRPr lang="de-CH"/>
@@ -1781,6 +1796,7 @@
           <a:p>
             <a:fld id="{7ED0086C-BC6B-4A2B-B421-96AA707CF198}" type="slidenum">
               <a:rPr lang="de-CH" smtClean="0"/>
+              <a:pPr/>
               <a:t>‹Nr.›</a:t>
             </a:fld>
             <a:endParaRPr lang="de-CH"/>
@@ -1852,6 +1868,7 @@
           <a:p>
             <a:fld id="{F27091F6-B986-4D50-AC85-4EB94450ED44}" type="datetimeFigureOut">
               <a:rPr lang="de-CH" smtClean="0"/>
+              <a:pPr/>
               <a:t>08.10.2013</a:t>
             </a:fld>
             <a:endParaRPr lang="de-CH"/>
@@ -1894,6 +1911,7 @@
           <a:p>
             <a:fld id="{7ED0086C-BC6B-4A2B-B421-96AA707CF198}" type="slidenum">
               <a:rPr lang="de-CH" smtClean="0"/>
+              <a:pPr/>
               <a:t>‹Nr.›</a:t>
             </a:fld>
             <a:endParaRPr lang="de-CH"/>
@@ -1942,6 +1960,7 @@
           <a:p>
             <a:fld id="{F27091F6-B986-4D50-AC85-4EB94450ED44}" type="datetimeFigureOut">
               <a:rPr lang="de-CH" smtClean="0"/>
+              <a:pPr/>
               <a:t>08.10.2013</a:t>
             </a:fld>
             <a:endParaRPr lang="de-CH"/>
@@ -1984,6 +2003,7 @@
           <a:p>
             <a:fld id="{7ED0086C-BC6B-4A2B-B421-96AA707CF198}" type="slidenum">
               <a:rPr lang="de-CH" smtClean="0"/>
+              <a:pPr/>
               <a:t>‹Nr.›</a:t>
             </a:fld>
             <a:endParaRPr lang="de-CH"/>
@@ -2214,6 +2234,7 @@
           <a:p>
             <a:fld id="{F27091F6-B986-4D50-AC85-4EB94450ED44}" type="datetimeFigureOut">
               <a:rPr lang="de-CH" smtClean="0"/>
+              <a:pPr/>
               <a:t>08.10.2013</a:t>
             </a:fld>
             <a:endParaRPr lang="de-CH"/>
@@ -2256,6 +2277,7 @@
           <a:p>
             <a:fld id="{7ED0086C-BC6B-4A2B-B421-96AA707CF198}" type="slidenum">
               <a:rPr lang="de-CH" smtClean="0"/>
+              <a:pPr/>
               <a:t>‹Nr.›</a:t>
             </a:fld>
             <a:endParaRPr lang="de-CH"/>
@@ -2462,6 +2484,7 @@
           <a:p>
             <a:fld id="{F27091F6-B986-4D50-AC85-4EB94450ED44}" type="datetimeFigureOut">
               <a:rPr lang="de-CH" smtClean="0"/>
+              <a:pPr/>
               <a:t>08.10.2013</a:t>
             </a:fld>
             <a:endParaRPr lang="de-CH"/>
@@ -2504,6 +2527,7 @@
           <a:p>
             <a:fld id="{7ED0086C-BC6B-4A2B-B421-96AA707CF198}" type="slidenum">
               <a:rPr lang="de-CH" smtClean="0"/>
+              <a:pPr/>
               <a:t>‹Nr.›</a:t>
             </a:fld>
             <a:endParaRPr lang="de-CH"/>
@@ -2670,6 +2694,7 @@
           <a:p>
             <a:fld id="{F27091F6-B986-4D50-AC85-4EB94450ED44}" type="datetimeFigureOut">
               <a:rPr lang="de-CH" smtClean="0"/>
+              <a:pPr/>
               <a:t>08.10.2013</a:t>
             </a:fld>
             <a:endParaRPr lang="de-CH"/>
@@ -2748,6 +2773,7 @@
           <a:p>
             <a:fld id="{7ED0086C-BC6B-4A2B-B421-96AA707CF198}" type="slidenum">
               <a:rPr lang="de-CH" smtClean="0"/>
+              <a:pPr/>
               <a:t>‹Nr.›</a:t>
             </a:fld>
             <a:endParaRPr lang="de-CH"/>
@@ -3220,7 +3246,7 @@
           <a:p>
             <a:r>
               <a:rPr lang="de-CH" dirty="0" smtClean="0"/>
-              <a:t>Lösung</a:t>
+              <a:t>Problematik</a:t>
             </a:r>
             <a:endParaRPr lang="de-CH" dirty="0"/>
           </a:p>
@@ -3238,23 +3264,47 @@
         </p:nvSpPr>
         <p:spPr/>
         <p:txBody>
-          <a:bodyPr/>
+          <a:bodyPr>
+            <a:normAutofit/>
+          </a:bodyPr>
           <a:lstStyle/>
           <a:p>
             <a:r>
               <a:rPr lang="de-CH" dirty="0" smtClean="0"/>
-              <a:t>Adaptives LMS-Filter</a:t>
-            </a:r>
-          </a:p>
-          <a:p>
-            <a:pPr lvl="1"/>
-            <a:r>
-              <a:rPr lang="de-CH" dirty="0" smtClean="0"/>
-              <a:t>Das Signal y und das Signal y^ werden nun verglichen und auf das Filter zurückgeführt.</a:t>
-            </a:r>
-          </a:p>
-        </p:txBody>
-      </p:sp>
+              <a:t>Echo:</a:t>
+            </a:r>
+          </a:p>
+          <a:p>
+            <a:endParaRPr lang="de-CH" dirty="0"/>
+          </a:p>
+        </p:txBody>
+      </p:sp>
+      <p:pic>
+        <p:nvPicPr>
+          <p:cNvPr id="2050" name="Picture 2" descr="D:\BFH\DSV\EchoCancellation\Präsentation\g.png"/>
+          <p:cNvPicPr>
+            <a:picLocks noChangeAspect="1" noChangeArrowheads="1"/>
+          </p:cNvPicPr>
+          <p:nvPr/>
+        </p:nvPicPr>
+        <p:blipFill>
+          <a:blip r:embed="rId2" cstate="print"/>
+          <a:srcRect/>
+          <a:stretch>
+            <a:fillRect/>
+          </a:stretch>
+        </p:blipFill>
+        <p:spPr bwMode="auto">
+          <a:xfrm>
+            <a:off x="1907704" y="2204864"/>
+            <a:ext cx="5343525" cy="4000500"/>
+          </a:xfrm>
+          <a:prstGeom prst="rect">
+            <a:avLst/>
+          </a:prstGeom>
+          <a:noFill/>
+        </p:spPr>
+      </p:pic>
     </p:spTree>
   </p:cSld>
   <p:clrMapOvr>
@@ -3296,68 +3346,88 @@
           <a:lstStyle/>
           <a:p>
             <a:r>
+              <a:rPr lang="de-CH" dirty="0" smtClean="0"/>
+              <a:t>Lösung</a:t>
+            </a:r>
+            <a:endParaRPr lang="de-CH" dirty="0"/>
+          </a:p>
+        </p:txBody>
+      </p:sp>
+      <p:sp>
+        <p:nvSpPr>
+          <p:cNvPr id="3" name="Inhaltsplatzhalter 2"/>
+          <p:cNvSpPr>
+            <a:spLocks noGrp="1"/>
+          </p:cNvSpPr>
+          <p:nvPr>
+            <p:ph idx="1"/>
+          </p:nvPr>
+        </p:nvSpPr>
+        <p:spPr/>
+        <p:txBody>
+          <a:bodyPr/>
+          <a:lstStyle/>
+          <a:p>
+            <a:r>
+              <a:rPr lang="de-CH" dirty="0" smtClean="0"/>
+              <a:t>Adaptives LMS-Filter</a:t>
+            </a:r>
+          </a:p>
+          <a:p>
+            <a:pPr lvl="1"/>
+            <a:r>
+              <a:rPr lang="de-CH" dirty="0" smtClean="0"/>
+              <a:t>Das Signal y und das Signal y^ werden nun verglichen und auf das Filter zurückgeführt</a:t>
+            </a:r>
+            <a:r>
+              <a:rPr lang="de-CH" dirty="0" smtClean="0"/>
+              <a:t>.</a:t>
+            </a:r>
+          </a:p>
+          <a:p>
+            <a:pPr lvl="1"/>
+            <a:r>
+              <a:rPr lang="de-CH" dirty="0" smtClean="0"/>
+              <a:t>Als Resultat sollte </a:t>
+            </a:r>
+            <a:r>
               <a:rPr lang="de-CH" dirty="0" err="1" smtClean="0"/>
-              <a:t>Implementation</a:t>
-            </a:r>
-            <a:endParaRPr lang="de-CH" dirty="0"/>
-          </a:p>
-        </p:txBody>
-      </p:sp>
-      <p:sp>
-        <p:nvSpPr>
-          <p:cNvPr id="3" name="Inhaltsplatzhalter 2"/>
-          <p:cNvSpPr>
-            <a:spLocks noGrp="1"/>
-          </p:cNvSpPr>
-          <p:nvPr>
-            <p:ph idx="1"/>
-          </p:nvPr>
-        </p:nvSpPr>
-        <p:spPr/>
-        <p:txBody>
-          <a:bodyPr/>
-          <a:lstStyle/>
-          <a:p>
+              <a:t>optimalerweise</a:t>
+            </a:r>
             <a:r>
               <a:rPr lang="de-CH" dirty="0" smtClean="0"/>
-              <a:t>Weisses Rauschen</a:t>
-            </a:r>
-          </a:p>
-          <a:p>
-            <a:r>
-              <a:rPr lang="de-CH" dirty="0" smtClean="0"/>
-              <a:t>Echo ist eine Verzögerung um 8 Samples und Amplitude von 0.4:</a:t>
-            </a:r>
-          </a:p>
-          <a:p>
-            <a:pPr lvl="1"/>
-            <a:r>
-              <a:rPr lang="de-CH" dirty="0" smtClean="0"/>
-              <a:t>g = [1 0 0 0 0 0 0 0.4]</a:t>
-            </a:r>
-          </a:p>
-          <a:p>
-            <a:r>
-              <a:rPr lang="de-CH" dirty="0" smtClean="0"/>
-              <a:t>Konvergenzgeschwindigkeit ist abhängig von u</a:t>
-            </a:r>
-          </a:p>
-          <a:p>
-            <a:pPr lvl="1"/>
-            <a:r>
-              <a:rPr lang="de-CH" dirty="0" smtClean="0"/>
-              <a:t>U klein: genau aber </a:t>
-            </a:r>
-          </a:p>
-          <a:p>
-            <a:pPr lvl="1"/>
-            <a:r>
-              <a:rPr lang="de-CH" dirty="0" smtClean="0"/>
-              <a:t>U gross: schnell aber ungenau</a:t>
-            </a:r>
-          </a:p>
-        </p:txBody>
-      </p:sp>
+              <a:t> 0 herauskommen:</a:t>
+            </a:r>
+            <a:endParaRPr lang="de-CH" dirty="0" smtClean="0"/>
+          </a:p>
+        </p:txBody>
+      </p:sp>
+      <p:pic>
+        <p:nvPicPr>
+          <p:cNvPr id="1026" name="Picture 2" descr="D:\BFH\DSV\EchoCancellation\Präsentation\err_Verlauf.png"/>
+          <p:cNvPicPr>
+            <a:picLocks noChangeAspect="1" noChangeArrowheads="1"/>
+          </p:cNvPicPr>
+          <p:nvPr/>
+        </p:nvPicPr>
+        <p:blipFill>
+          <a:blip r:embed="rId2" cstate="print"/>
+          <a:srcRect/>
+          <a:stretch>
+            <a:fillRect/>
+          </a:stretch>
+        </p:blipFill>
+        <p:spPr bwMode="auto">
+          <a:xfrm>
+            <a:off x="2393817" y="4005064"/>
+            <a:ext cx="3618343" cy="2708920"/>
+          </a:xfrm>
+          <a:prstGeom prst="rect">
+            <a:avLst/>
+          </a:prstGeom>
+          <a:noFill/>
+        </p:spPr>
+      </p:pic>
     </p:spTree>
   </p:cSld>
   <p:clrMapOvr>
@@ -3367,6 +3437,340 @@
 </file>
 
 <file path=ppt/slides/slide5.xml><?xml version="1.0" encoding="utf-8"?>
+<p:sld xmlns:a="http://schemas.openxmlformats.org/drawingml/2006/main" xmlns:r="http://schemas.openxmlformats.org/officeDocument/2006/relationships" xmlns:p="http://schemas.openxmlformats.org/presentationml/2006/main">
+  <p:cSld>
+    <p:spTree>
+      <p:nvGrpSpPr>
+        <p:cNvPr id="1" name=""/>
+        <p:cNvGrpSpPr/>
+        <p:nvPr/>
+      </p:nvGrpSpPr>
+      <p:grpSpPr>
+        <a:xfrm>
+          <a:off x="0" y="0"/>
+          <a:ext cx="0" cy="0"/>
+          <a:chOff x="0" y="0"/>
+          <a:chExt cx="0" cy="0"/>
+        </a:xfrm>
+      </p:grpSpPr>
+      <p:sp>
+        <p:nvSpPr>
+          <p:cNvPr id="2" name="Titel 1"/>
+          <p:cNvSpPr>
+            <a:spLocks noGrp="1"/>
+          </p:cNvSpPr>
+          <p:nvPr>
+            <p:ph type="title"/>
+          </p:nvPr>
+        </p:nvSpPr>
+        <p:spPr/>
+        <p:txBody>
+          <a:bodyPr/>
+          <a:lstStyle/>
+          <a:p>
+            <a:r>
+              <a:rPr lang="de-CH" dirty="0" smtClean="0"/>
+              <a:t>Lösung</a:t>
+            </a:r>
+            <a:endParaRPr lang="de-CH" dirty="0"/>
+          </a:p>
+        </p:txBody>
+      </p:sp>
+      <p:sp>
+        <p:nvSpPr>
+          <p:cNvPr id="3" name="Inhaltsplatzhalter 2"/>
+          <p:cNvSpPr>
+            <a:spLocks noGrp="1"/>
+          </p:cNvSpPr>
+          <p:nvPr>
+            <p:ph idx="1"/>
+          </p:nvPr>
+        </p:nvSpPr>
+        <p:spPr/>
+        <p:txBody>
+          <a:bodyPr/>
+          <a:lstStyle/>
+          <a:p>
+            <a:r>
+              <a:rPr lang="de-CH" dirty="0" smtClean="0"/>
+              <a:t>Echo </a:t>
+            </a:r>
+            <a:r>
+              <a:rPr lang="de-CH" dirty="0" err="1" smtClean="0"/>
+              <a:t>Cancellation</a:t>
+            </a:r>
+            <a:r>
+              <a:rPr lang="de-CH" dirty="0" smtClean="0"/>
+              <a:t> mit Adaptivem LMS-Filt</a:t>
+            </a:r>
+            <a:r>
+              <a:rPr lang="de-CH" dirty="0" smtClean="0"/>
+              <a:t>er</a:t>
+            </a:r>
+          </a:p>
+          <a:p>
+            <a:pPr lvl="1"/>
+            <a:r>
+              <a:rPr lang="de-CH" dirty="0" smtClean="0"/>
+              <a:t>Wenn nun das Originalsignal (der erste Filter-Tab) nicht eingeschlossen wird, erhält man als Resultat das Originalsignal, da dieses nun nicht mehr „</a:t>
+            </a:r>
+            <a:r>
+              <a:rPr lang="de-CH" dirty="0" err="1" smtClean="0"/>
+              <a:t>herausgerechne</a:t>
+            </a:r>
+            <a:r>
+              <a:rPr lang="de-CH" dirty="0" err="1" smtClean="0"/>
+              <a:t>t</a:t>
+            </a:r>
+            <a:r>
+              <a:rPr lang="de-CH" dirty="0" smtClean="0"/>
+              <a:t>“ wird:</a:t>
+            </a:r>
+            <a:endParaRPr lang="de-CH" dirty="0" smtClean="0"/>
+          </a:p>
+        </p:txBody>
+      </p:sp>
+      <p:grpSp>
+        <p:nvGrpSpPr>
+          <p:cNvPr id="8" name="Gruppieren 7"/>
+          <p:cNvGrpSpPr/>
+          <p:nvPr/>
+        </p:nvGrpSpPr>
+        <p:grpSpPr>
+          <a:xfrm>
+            <a:off x="683568" y="4005064"/>
+            <a:ext cx="3527926" cy="2641228"/>
+            <a:chOff x="1691680" y="4005064"/>
+            <a:chExt cx="3527926" cy="2641228"/>
+          </a:xfrm>
+        </p:grpSpPr>
+        <p:pic>
+          <p:nvPicPr>
+            <p:cNvPr id="3074" name="Picture 2" descr="D:\BFH\DSV\EchoCancellation\Präsentation\g.png"/>
+            <p:cNvPicPr>
+              <a:picLocks noChangeAspect="1" noChangeArrowheads="1"/>
+            </p:cNvPicPr>
+            <p:nvPr/>
+          </p:nvPicPr>
+          <p:blipFill>
+            <a:blip r:embed="rId2" cstate="print"/>
+            <a:srcRect/>
+            <a:stretch>
+              <a:fillRect/>
+            </a:stretch>
+          </p:blipFill>
+          <p:spPr bwMode="auto">
+            <a:xfrm>
+              <a:off x="1691680" y="4005064"/>
+              <a:ext cx="3527926" cy="2641228"/>
+            </a:xfrm>
+            <a:prstGeom prst="rect">
+              <a:avLst/>
+            </a:prstGeom>
+            <a:noFill/>
+          </p:spPr>
+        </p:pic>
+        <p:sp>
+          <p:nvSpPr>
+            <p:cNvPr id="6" name="Multiplizieren 5"/>
+            <p:cNvSpPr/>
+            <p:nvPr/>
+          </p:nvSpPr>
+          <p:spPr>
+            <a:xfrm>
+              <a:off x="1907704" y="5122688"/>
+              <a:ext cx="720080" cy="720080"/>
+            </a:xfrm>
+            <a:prstGeom prst="mathMultiply">
+              <a:avLst>
+                <a:gd name="adj1" fmla="val 8973"/>
+              </a:avLst>
+            </a:prstGeom>
+          </p:spPr>
+          <p:style>
+            <a:lnRef idx="2">
+              <a:schemeClr val="accent2">
+                <a:shade val="50000"/>
+              </a:schemeClr>
+            </a:lnRef>
+            <a:fillRef idx="1">
+              <a:schemeClr val="accent2"/>
+            </a:fillRef>
+            <a:effectRef idx="0">
+              <a:schemeClr val="accent2"/>
+            </a:effectRef>
+            <a:fontRef idx="minor">
+              <a:schemeClr val="lt1"/>
+            </a:fontRef>
+          </p:style>
+          <p:txBody>
+            <a:bodyPr rtlCol="0" anchor="ctr"/>
+            <a:lstStyle/>
+            <a:p>
+              <a:pPr algn="ctr"/>
+              <a:endParaRPr lang="de-CH"/>
+            </a:p>
+          </p:txBody>
+        </p:sp>
+        <p:sp>
+          <p:nvSpPr>
+            <p:cNvPr id="7" name="Rad 6"/>
+            <p:cNvSpPr/>
+            <p:nvPr/>
+          </p:nvSpPr>
+          <p:spPr>
+            <a:xfrm>
+              <a:off x="2987824" y="5229200"/>
+              <a:ext cx="504056" cy="504056"/>
+            </a:xfrm>
+            <a:prstGeom prst="donut">
+              <a:avLst>
+                <a:gd name="adj" fmla="val 12662"/>
+              </a:avLst>
+            </a:prstGeom>
+          </p:spPr>
+          <p:style>
+            <a:lnRef idx="2">
+              <a:schemeClr val="accent3">
+                <a:shade val="50000"/>
+              </a:schemeClr>
+            </a:lnRef>
+            <a:fillRef idx="1">
+              <a:schemeClr val="accent3"/>
+            </a:fillRef>
+            <a:effectRef idx="0">
+              <a:schemeClr val="accent3"/>
+            </a:effectRef>
+            <a:fontRef idx="minor">
+              <a:schemeClr val="lt1"/>
+            </a:fontRef>
+          </p:style>
+          <p:txBody>
+            <a:bodyPr rtlCol="0" anchor="ctr"/>
+            <a:lstStyle/>
+            <a:p>
+              <a:pPr algn="ctr"/>
+              <a:endParaRPr lang="de-CH">
+                <a:solidFill>
+                  <a:schemeClr val="tx1"/>
+                </a:solidFill>
+              </a:endParaRPr>
+            </a:p>
+          </p:txBody>
+        </p:sp>
+      </p:grpSp>
+    </p:spTree>
+  </p:cSld>
+  <p:clrMapOvr>
+    <a:masterClrMapping/>
+  </p:clrMapOvr>
+</p:sld>
+</file>
+
+<file path=ppt/slides/slide6.xml><?xml version="1.0" encoding="utf-8"?>
+<p:sld xmlns:a="http://schemas.openxmlformats.org/drawingml/2006/main" xmlns:r="http://schemas.openxmlformats.org/officeDocument/2006/relationships" xmlns:p="http://schemas.openxmlformats.org/presentationml/2006/main">
+  <p:cSld>
+    <p:spTree>
+      <p:nvGrpSpPr>
+        <p:cNvPr id="1" name=""/>
+        <p:cNvGrpSpPr/>
+        <p:nvPr/>
+      </p:nvGrpSpPr>
+      <p:grpSpPr>
+        <a:xfrm>
+          <a:off x="0" y="0"/>
+          <a:ext cx="0" cy="0"/>
+          <a:chOff x="0" y="0"/>
+          <a:chExt cx="0" cy="0"/>
+        </a:xfrm>
+      </p:grpSpPr>
+      <p:sp>
+        <p:nvSpPr>
+          <p:cNvPr id="2" name="Titel 1"/>
+          <p:cNvSpPr>
+            <a:spLocks noGrp="1"/>
+          </p:cNvSpPr>
+          <p:nvPr>
+            <p:ph type="title"/>
+          </p:nvPr>
+        </p:nvSpPr>
+        <p:spPr/>
+        <p:txBody>
+          <a:bodyPr/>
+          <a:lstStyle/>
+          <a:p>
+            <a:r>
+              <a:rPr lang="de-CH" dirty="0" err="1" smtClean="0"/>
+              <a:t>Implementation</a:t>
+            </a:r>
+            <a:endParaRPr lang="de-CH" dirty="0"/>
+          </a:p>
+        </p:txBody>
+      </p:sp>
+      <p:sp>
+        <p:nvSpPr>
+          <p:cNvPr id="3" name="Inhaltsplatzhalter 2"/>
+          <p:cNvSpPr>
+            <a:spLocks noGrp="1"/>
+          </p:cNvSpPr>
+          <p:nvPr>
+            <p:ph idx="1"/>
+          </p:nvPr>
+        </p:nvSpPr>
+        <p:spPr/>
+        <p:txBody>
+          <a:bodyPr/>
+          <a:lstStyle/>
+          <a:p>
+            <a:r>
+              <a:rPr lang="de-CH" dirty="0" smtClean="0"/>
+              <a:t>Weisses Rauschen</a:t>
+            </a:r>
+          </a:p>
+          <a:p>
+            <a:r>
+              <a:rPr lang="de-CH" dirty="0" smtClean="0"/>
+              <a:t>Echo ist eine Verzögerung um 8 Samples und Amplitude von 0.4:</a:t>
+            </a:r>
+          </a:p>
+          <a:p>
+            <a:pPr lvl="1"/>
+            <a:r>
+              <a:rPr lang="de-CH" dirty="0" smtClean="0"/>
+              <a:t>g = [1 0 0 0 0 0 0 0.4]</a:t>
+            </a:r>
+          </a:p>
+          <a:p>
+            <a:r>
+              <a:rPr lang="de-CH" dirty="0" smtClean="0"/>
+              <a:t>Konvergenzgeschwindigkeit ist abhängig von u</a:t>
+            </a:r>
+          </a:p>
+          <a:p>
+            <a:pPr lvl="1"/>
+            <a:r>
+              <a:rPr lang="de-CH" dirty="0" smtClean="0"/>
+              <a:t>U klein: genau aber </a:t>
+            </a:r>
+          </a:p>
+          <a:p>
+            <a:pPr lvl="1"/>
+            <a:r>
+              <a:rPr lang="de-CH" dirty="0" smtClean="0"/>
+              <a:t>U gross: schnell aber ungenau</a:t>
+            </a:r>
+          </a:p>
+        </p:txBody>
+      </p:sp>
+    </p:spTree>
+  </p:cSld>
+  <p:clrMapOvr>
+    <a:masterClrMapping/>
+  </p:clrMapOvr>
+</p:sld>
+</file>
+
+<file path=ppt/slides/slide7.xml><?xml version="1.0" encoding="utf-8"?>
 <p:sld xmlns:a="http://schemas.openxmlformats.org/drawingml/2006/main" xmlns:r="http://schemas.openxmlformats.org/officeDocument/2006/relationships" xmlns:p="http://schemas.openxmlformats.org/presentationml/2006/main">
   <p:cSld>
     <p:spTree>
@@ -3520,7 +3924,7 @@
 </p:sld>
 </file>
 
-<file path=ppt/slides/slide6.xml><?xml version="1.0" encoding="utf-8"?>
+<file path=ppt/slides/slide8.xml><?xml version="1.0" encoding="utf-8"?>
 <p:sld xmlns:a="http://schemas.openxmlformats.org/drawingml/2006/main" xmlns:r="http://schemas.openxmlformats.org/officeDocument/2006/relationships" xmlns:p="http://schemas.openxmlformats.org/presentationml/2006/main">
   <p:cSld>
     <p:spTree>

</xml_diff>

<commit_message>
finished noise HL implementation PPT part
</commit_message>
<xml_diff>
--- a/Pr�sentation/Echo Cancellation.pptx
+++ b/Pr�sentation/Echo Cancellation.pptx
@@ -13,6 +13,8 @@
     <p:sldId id="259" r:id="rId7"/>
     <p:sldId id="260" r:id="rId8"/>
     <p:sldId id="261" r:id="rId9"/>
+    <p:sldId id="264" r:id="rId10"/>
+    <p:sldId id="265" r:id="rId11"/>
   </p:sldIdLst>
   <p:sldSz cx="9144000" cy="6858000" type="screen4x3"/>
   <p:notesSz cx="6858000" cy="9144000"/>
@@ -296,7 +298,7 @@
             <a:fld id="{F27091F6-B986-4D50-AC85-4EB94450ED44}" type="datetimeFigureOut">
               <a:rPr lang="de-CH" smtClean="0"/>
               <a:pPr/>
-              <a:t>08.10.2013</a:t>
+              <a:t>30.10.2013</a:t>
             </a:fld>
             <a:endParaRPr lang="de-CH"/>
           </a:p>
@@ -463,7 +465,7 @@
             <a:fld id="{F27091F6-B986-4D50-AC85-4EB94450ED44}" type="datetimeFigureOut">
               <a:rPr lang="de-CH" smtClean="0"/>
               <a:pPr/>
-              <a:t>08.10.2013</a:t>
+              <a:t>30.10.2013</a:t>
             </a:fld>
             <a:endParaRPr lang="de-CH"/>
           </a:p>
@@ -640,7 +642,7 @@
             <a:fld id="{F27091F6-B986-4D50-AC85-4EB94450ED44}" type="datetimeFigureOut">
               <a:rPr lang="de-CH" smtClean="0"/>
               <a:pPr/>
-              <a:t>08.10.2013</a:t>
+              <a:t>30.10.2013</a:t>
             </a:fld>
             <a:endParaRPr lang="de-CH"/>
           </a:p>
@@ -807,7 +809,7 @@
             <a:fld id="{F27091F6-B986-4D50-AC85-4EB94450ED44}" type="datetimeFigureOut">
               <a:rPr lang="de-CH" smtClean="0"/>
               <a:pPr/>
-              <a:t>08.10.2013</a:t>
+              <a:t>30.10.2013</a:t>
             </a:fld>
             <a:endParaRPr lang="de-CH"/>
           </a:p>
@@ -1050,7 +1052,7 @@
             <a:fld id="{F27091F6-B986-4D50-AC85-4EB94450ED44}" type="datetimeFigureOut">
               <a:rPr lang="de-CH" smtClean="0"/>
               <a:pPr/>
-              <a:t>08.10.2013</a:t>
+              <a:t>30.10.2013</a:t>
             </a:fld>
             <a:endParaRPr lang="de-CH"/>
           </a:p>
@@ -1335,7 +1337,7 @@
             <a:fld id="{F27091F6-B986-4D50-AC85-4EB94450ED44}" type="datetimeFigureOut">
               <a:rPr lang="de-CH" smtClean="0"/>
               <a:pPr/>
-              <a:t>08.10.2013</a:t>
+              <a:t>30.10.2013</a:t>
             </a:fld>
             <a:endParaRPr lang="de-CH"/>
           </a:p>
@@ -1754,7 +1756,7 @@
             <a:fld id="{F27091F6-B986-4D50-AC85-4EB94450ED44}" type="datetimeFigureOut">
               <a:rPr lang="de-CH" smtClean="0"/>
               <a:pPr/>
-              <a:t>08.10.2013</a:t>
+              <a:t>30.10.2013</a:t>
             </a:fld>
             <a:endParaRPr lang="de-CH"/>
           </a:p>
@@ -1869,7 +1871,7 @@
             <a:fld id="{F27091F6-B986-4D50-AC85-4EB94450ED44}" type="datetimeFigureOut">
               <a:rPr lang="de-CH" smtClean="0"/>
               <a:pPr/>
-              <a:t>08.10.2013</a:t>
+              <a:t>30.10.2013</a:t>
             </a:fld>
             <a:endParaRPr lang="de-CH"/>
           </a:p>
@@ -1961,7 +1963,7 @@
             <a:fld id="{F27091F6-B986-4D50-AC85-4EB94450ED44}" type="datetimeFigureOut">
               <a:rPr lang="de-CH" smtClean="0"/>
               <a:pPr/>
-              <a:t>08.10.2013</a:t>
+              <a:t>30.10.2013</a:t>
             </a:fld>
             <a:endParaRPr lang="de-CH"/>
           </a:p>
@@ -2235,7 +2237,7 @@
             <a:fld id="{F27091F6-B986-4D50-AC85-4EB94450ED44}" type="datetimeFigureOut">
               <a:rPr lang="de-CH" smtClean="0"/>
               <a:pPr/>
-              <a:t>08.10.2013</a:t>
+              <a:t>30.10.2013</a:t>
             </a:fld>
             <a:endParaRPr lang="de-CH"/>
           </a:p>
@@ -2485,7 +2487,7 @@
             <a:fld id="{F27091F6-B986-4D50-AC85-4EB94450ED44}" type="datetimeFigureOut">
               <a:rPr lang="de-CH" smtClean="0"/>
               <a:pPr/>
-              <a:t>08.10.2013</a:t>
+              <a:t>30.10.2013</a:t>
             </a:fld>
             <a:endParaRPr lang="de-CH"/>
           </a:p>
@@ -2695,7 +2697,7 @@
             <a:fld id="{F27091F6-B986-4D50-AC85-4EB94450ED44}" type="datetimeFigureOut">
               <a:rPr lang="de-CH" smtClean="0"/>
               <a:pPr/>
-              <a:t>08.10.2013</a:t>
+              <a:t>30.10.2013</a:t>
             </a:fld>
             <a:endParaRPr lang="de-CH"/>
           </a:p>
@@ -3117,6 +3119,168 @@
   <p:clrMapOvr>
     <a:masterClrMapping/>
   </p:clrMapOvr>
+  <p:timing>
+    <p:tnLst>
+      <p:par>
+        <p:cTn id="1" dur="indefinite" restart="never" nodeType="tmRoot"/>
+      </p:par>
+    </p:tnLst>
+  </p:timing>
+</p:sld>
+</file>
+
+<file path=ppt/slides/slide10.xml><?xml version="1.0" encoding="utf-8"?>
+<p:sld xmlns:a="http://schemas.openxmlformats.org/drawingml/2006/main" xmlns:r="http://schemas.openxmlformats.org/officeDocument/2006/relationships" xmlns:p="http://schemas.openxmlformats.org/presentationml/2006/main">
+  <p:cSld>
+    <p:spTree>
+      <p:nvGrpSpPr>
+        <p:cNvPr id="1" name=""/>
+        <p:cNvGrpSpPr/>
+        <p:nvPr/>
+      </p:nvGrpSpPr>
+      <p:grpSpPr>
+        <a:xfrm>
+          <a:off x="0" y="0"/>
+          <a:ext cx="0" cy="0"/>
+          <a:chOff x="0" y="0"/>
+          <a:chExt cx="0" cy="0"/>
+        </a:xfrm>
+      </p:grpSpPr>
+      <p:sp>
+        <p:nvSpPr>
+          <p:cNvPr id="2" name="Titel 1"/>
+          <p:cNvSpPr>
+            <a:spLocks noGrp="1"/>
+          </p:cNvSpPr>
+          <p:nvPr>
+            <p:ph type="title"/>
+          </p:nvPr>
+        </p:nvSpPr>
+        <p:spPr/>
+        <p:txBody>
+          <a:bodyPr/>
+          <a:lstStyle/>
+          <a:p>
+            <a:r>
+              <a:rPr lang="de-CH" dirty="0" smtClean="0"/>
+              <a:t>Resultate HL</a:t>
+            </a:r>
+            <a:endParaRPr lang="de-CH" dirty="0"/>
+          </a:p>
+        </p:txBody>
+      </p:sp>
+      <p:sp>
+        <p:nvSpPr>
+          <p:cNvPr id="6" name="Textfeld 5"/>
+          <p:cNvSpPr txBox="1"/>
+          <p:nvPr/>
+        </p:nvSpPr>
+        <p:spPr>
+          <a:xfrm>
+            <a:off x="251520" y="5373216"/>
+            <a:ext cx="5688632" cy="1077218"/>
+          </a:xfrm>
+          <a:prstGeom prst="rect">
+            <a:avLst/>
+          </a:prstGeom>
+          <a:noFill/>
+          <a:ln>
+            <a:noFill/>
+          </a:ln>
+        </p:spPr>
+        <p:txBody>
+          <a:bodyPr wrap="square" rtlCol="0">
+            <a:spAutoFit/>
+          </a:bodyPr>
+          <a:lstStyle/>
+          <a:p>
+            <a:pPr>
+              <a:buFont typeface="Arial" pitchFamily="34" charset="0"/>
+              <a:buChar char="•"/>
+            </a:pPr>
+            <a:r>
+              <a:rPr lang="de-CH" sz="3200" dirty="0" smtClean="0"/>
+              <a:t>Sprachsignal</a:t>
+            </a:r>
+            <a:endParaRPr lang="de-CH" sz="3200" dirty="0" smtClean="0"/>
+          </a:p>
+          <a:p>
+            <a:pPr>
+              <a:buFont typeface="Arial" pitchFamily="34" charset="0"/>
+              <a:buChar char="•"/>
+            </a:pPr>
+            <a:r>
+              <a:rPr lang="de-CH" sz="3200" dirty="0" smtClean="0"/>
+              <a:t>u = 0.008 (gross)</a:t>
+            </a:r>
+            <a:endParaRPr lang="de-CH" sz="3200" dirty="0"/>
+          </a:p>
+        </p:txBody>
+      </p:sp>
+      <p:pic>
+        <p:nvPicPr>
+          <p:cNvPr id="17410" name="Picture 2" descr="D:\BFH\DSV\EchoCancellation\Präsentation\Konvergenz_u_hoch_0.008.png"/>
+          <p:cNvPicPr>
+            <a:picLocks noChangeAspect="1" noChangeArrowheads="1"/>
+          </p:cNvPicPr>
+          <p:nvPr/>
+        </p:nvPicPr>
+        <p:blipFill>
+          <a:blip r:embed="rId2" cstate="print"/>
+          <a:srcRect/>
+          <a:stretch>
+            <a:fillRect/>
+          </a:stretch>
+        </p:blipFill>
+        <p:spPr bwMode="auto">
+          <a:xfrm>
+            <a:off x="-324544" y="1196752"/>
+            <a:ext cx="7892800" cy="3960439"/>
+          </a:xfrm>
+          <a:prstGeom prst="rect">
+            <a:avLst/>
+          </a:prstGeom>
+          <a:noFill/>
+        </p:spPr>
+      </p:pic>
+      <p:pic>
+        <p:nvPicPr>
+          <p:cNvPr id="17411" name="Picture 3" descr="D:\BFH\DSV\EchoCancellation\Präsentation\Koeffizienten_u_hoch_0.008.png"/>
+          <p:cNvPicPr>
+            <a:picLocks noChangeAspect="1" noChangeArrowheads="1"/>
+          </p:cNvPicPr>
+          <p:nvPr/>
+        </p:nvPicPr>
+        <p:blipFill>
+          <a:blip r:embed="rId3" cstate="print"/>
+          <a:srcRect/>
+          <a:stretch>
+            <a:fillRect/>
+          </a:stretch>
+        </p:blipFill>
+        <p:spPr bwMode="auto">
+          <a:xfrm>
+            <a:off x="5868144" y="4432872"/>
+            <a:ext cx="3275856" cy="2452512"/>
+          </a:xfrm>
+          <a:prstGeom prst="rect">
+            <a:avLst/>
+          </a:prstGeom>
+          <a:noFill/>
+        </p:spPr>
+      </p:pic>
+    </p:spTree>
+  </p:cSld>
+  <p:clrMapOvr>
+    <a:masterClrMapping/>
+  </p:clrMapOvr>
+  <p:timing>
+    <p:tnLst>
+      <p:par>
+        <p:cTn id="1" dur="indefinite" restart="never" nodeType="tmRoot"/>
+      </p:par>
+    </p:tnLst>
+  </p:timing>
 </p:sld>
 </file>
 
@@ -3173,7 +3337,7 @@
         <p:spPr/>
         <p:txBody>
           <a:bodyPr>
-            <a:normAutofit lnSpcReduction="10000"/>
+            <a:normAutofit/>
           </a:bodyPr>
           <a:lstStyle/>
           <a:p>
@@ -3198,7 +3362,15 @@
           <a:p>
             <a:r>
               <a:rPr lang="de-CH" dirty="0" smtClean="0"/>
-              <a:t>Aus beiden Signalen soll nun die Charakteristik des Echos ermittelt werden und das ursprüngliche Signal x wiederhergestellt werden.</a:t>
+              <a:t>Aus beiden Signalen soll nun die Charakteristik des Echos ermittelt </a:t>
+            </a:r>
+            <a:r>
+              <a:rPr lang="de-CH" dirty="0" smtClean="0"/>
+              <a:t>und </a:t>
+            </a:r>
+            <a:r>
+              <a:rPr lang="de-CH" dirty="0" smtClean="0"/>
+              <a:t>das ursprüngliche Signal x wiederhergestellt werden.</a:t>
             </a:r>
             <a:endParaRPr lang="de-CH" dirty="0"/>
           </a:p>
@@ -3209,6 +3381,13 @@
   <p:clrMapOvr>
     <a:masterClrMapping/>
   </p:clrMapOvr>
+  <p:timing>
+    <p:tnLst>
+      <p:par>
+        <p:cTn id="1" dur="indefinite" restart="never" nodeType="tmRoot"/>
+      </p:par>
+    </p:tnLst>
+  </p:timing>
 </p:sld>
 </file>
 
@@ -3271,10 +3450,31 @@
           <a:p>
             <a:r>
               <a:rPr lang="de-CH" dirty="0" smtClean="0"/>
-              <a:t>Echo:</a:t>
-            </a:r>
-          </a:p>
-          <a:p>
+              <a:t>Echo</a:t>
+            </a:r>
+            <a:r>
+              <a:rPr lang="de-CH" dirty="0" smtClean="0"/>
+              <a:t>:</a:t>
+            </a:r>
+          </a:p>
+          <a:p>
+            <a:pPr lvl="1"/>
+            <a:r>
+              <a:rPr lang="de-CH" dirty="0" smtClean="0"/>
+              <a:t>Echo-Verzögerung: 8/</a:t>
+            </a:r>
+            <a:r>
+              <a:rPr lang="de-CH" dirty="0" err="1" smtClean="0"/>
+              <a:t>fs</a:t>
+            </a:r>
+            <a:endParaRPr lang="de-CH" dirty="0" smtClean="0"/>
+          </a:p>
+          <a:p>
+            <a:pPr lvl="1"/>
+            <a:r>
+              <a:rPr lang="de-CH" dirty="0" smtClean="0"/>
+              <a:t>Echo-Amplitude: 0.4</a:t>
+            </a:r>
             <a:endParaRPr lang="de-CH" dirty="0"/>
           </a:p>
         </p:txBody>
@@ -3296,8 +3496,8 @@
         </p:blipFill>
         <p:spPr bwMode="auto">
           <a:xfrm>
-            <a:off x="1907704" y="2204864"/>
-            <a:ext cx="5343525" cy="4000500"/>
+            <a:off x="4174396" y="2956892"/>
+            <a:ext cx="4574068" cy="3424436"/>
           </a:xfrm>
           <a:prstGeom prst="rect">
             <a:avLst/>
@@ -3310,6 +3510,13 @@
   <p:clrMapOvr>
     <a:masterClrMapping/>
   </p:clrMapOvr>
+  <p:timing>
+    <p:tnLst>
+      <p:par>
+        <p:cTn id="1" dur="indefinite" restart="never" nodeType="tmRoot"/>
+      </p:par>
+    </p:tnLst>
+  </p:timing>
 </p:sld>
 </file>
 
@@ -3377,11 +3584,7 @@
             <a:pPr lvl="1"/>
             <a:r>
               <a:rPr lang="de-CH" dirty="0" smtClean="0"/>
-              <a:t>Das Signal y und das Signal y^ werden nun verglichen und auf das Filter zurückgeführt</a:t>
-            </a:r>
-            <a:r>
-              <a:rPr lang="de-CH" dirty="0" smtClean="0"/>
-              <a:t>.</a:t>
+              <a:t>Das Signal y und das Signal y^ werden nun verglichen und auf das Filter zurückgeführt.</a:t>
             </a:r>
           </a:p>
           <a:p>
@@ -3398,7 +3601,6 @@
               <a:rPr lang="de-CH" dirty="0" smtClean="0"/>
               <a:t> 0 herauskommen:</a:t>
             </a:r>
-            <a:endParaRPr lang="de-CH" dirty="0" smtClean="0"/>
           </a:p>
         </p:txBody>
       </p:sp>
@@ -3433,6 +3635,13 @@
   <p:clrMapOvr>
     <a:masterClrMapping/>
   </p:clrMapOvr>
+  <p:timing>
+    <p:tnLst>
+      <p:par>
+        <p:cTn id="1" dur="indefinite" restart="never" nodeType="tmRoot"/>
+      </p:par>
+    </p:tnLst>
+  </p:timing>
 </p:sld>
 </file>
 
@@ -3501,30 +3710,26 @@
             </a:r>
             <a:r>
               <a:rPr lang="de-CH" dirty="0" smtClean="0"/>
-              <a:t> mit Adaptivem LMS-Filt</a:t>
-            </a:r>
+              <a:t> mit Adaptivem LMS-Filter</a:t>
+            </a:r>
+          </a:p>
+          <a:p>
+            <a:pPr lvl="1"/>
             <a:r>
               <a:rPr lang="de-CH" dirty="0" smtClean="0"/>
-              <a:t>er</a:t>
-            </a:r>
-          </a:p>
-          <a:p>
-            <a:pPr lvl="1"/>
+              <a:t>Wenn nun das </a:t>
+            </a:r>
             <a:r>
               <a:rPr lang="de-CH" dirty="0" smtClean="0"/>
-              <a:t>Wenn nun das Originalsignal (der erste Filter-Tab) nicht eingeschlossen wird, erhält man als Resultat das Originalsignal, da dieses nun nicht mehr „</a:t>
-            </a:r>
-            <a:r>
-              <a:rPr lang="de-CH" dirty="0" err="1" smtClean="0"/>
-              <a:t>herausgerechne</a:t>
-            </a:r>
-            <a:r>
-              <a:rPr lang="de-CH" dirty="0" err="1" smtClean="0"/>
-              <a:t>t</a:t>
+              <a:t>erste Filter-Tab ignoriert wird, </a:t>
             </a:r>
             <a:r>
               <a:rPr lang="de-CH" dirty="0" smtClean="0"/>
-              <a:t>“ wird:</a:t>
+              <a:t>erhält man als Resultat das Originalsignal, da </a:t>
+            </a:r>
+            <a:r>
+              <a:rPr lang="de-CH" dirty="0" smtClean="0"/>
+              <a:t>nur noch das Echo nachgebildet und von y subtrahiert wird:</a:t>
             </a:r>
             <a:endParaRPr lang="de-CH" dirty="0" smtClean="0"/>
           </a:p>
@@ -3538,7 +3743,7 @@
         </p:nvGrpSpPr>
         <p:grpSpPr>
           <a:xfrm>
-            <a:off x="683568" y="4005064"/>
+            <a:off x="2843808" y="3861048"/>
             <a:ext cx="3527926" cy="2641228"/>
             <a:chOff x="1691680" y="4005064"/>
             <a:chExt cx="3527926" cy="2641228"/>
@@ -3664,6 +3869,13 @@
   <p:clrMapOvr>
     <a:masterClrMapping/>
   </p:clrMapOvr>
+  <p:timing>
+    <p:tnLst>
+      <p:par>
+        <p:cTn id="1" dur="indefinite" restart="never" nodeType="tmRoot"/>
+      </p:par>
+    </p:tnLst>
+  </p:timing>
 </p:sld>
 </file>
 
@@ -3703,6 +3915,10 @@
               <a:rPr lang="de-CH" dirty="0" err="1" smtClean="0"/>
               <a:t>Implementation</a:t>
             </a:r>
+            <a:r>
+              <a:rPr lang="de-CH" dirty="0" smtClean="0"/>
+              <a:t> HL</a:t>
+            </a:r>
             <a:endParaRPr lang="de-CH" dirty="0"/>
           </a:p>
         </p:txBody>
@@ -3750,15 +3966,37 @@
             <a:pPr lvl="1"/>
             <a:r>
               <a:rPr lang="de-CH" dirty="0" smtClean="0"/>
-              <a:t>U klein: genau aber </a:t>
-            </a:r>
+              <a:t>u </a:t>
+            </a:r>
+            <a:r>
+              <a:rPr lang="de-CH" dirty="0" smtClean="0"/>
+              <a:t>klein: genau aber </a:t>
+            </a:r>
+            <a:r>
+              <a:rPr lang="de-CH" dirty="0" smtClean="0"/>
+              <a:t>langsam</a:t>
+            </a:r>
+            <a:endParaRPr lang="de-CH" dirty="0" smtClean="0"/>
           </a:p>
           <a:p>
             <a:pPr lvl="1"/>
             <a:r>
               <a:rPr lang="de-CH" dirty="0" smtClean="0"/>
-              <a:t>U gross: schnell aber ungenau</a:t>
-            </a:r>
+              <a:t>u</a:t>
+            </a:r>
+            <a:r>
+              <a:rPr lang="de-CH" dirty="0" smtClean="0"/>
+              <a:t> </a:t>
+            </a:r>
+            <a:r>
+              <a:rPr lang="de-CH" dirty="0" smtClean="0"/>
+              <a:t>gross: schnell aber </a:t>
+            </a:r>
+            <a:r>
+              <a:rPr lang="de-CH" dirty="0" smtClean="0"/>
+              <a:t>ungenau (und evtl. unstabil)</a:t>
+            </a:r>
+            <a:endParaRPr lang="de-CH" dirty="0" smtClean="0"/>
           </a:p>
         </p:txBody>
       </p:sp>
@@ -3767,6 +4005,13 @@
   <p:clrMapOvr>
     <a:masterClrMapping/>
   </p:clrMapOvr>
+  <p:timing>
+    <p:tnLst>
+      <p:par>
+        <p:cTn id="1" dur="indefinite" restart="never" nodeType="tmRoot"/>
+      </p:par>
+    </p:tnLst>
+  </p:timing>
 </p:sld>
 </file>
 
@@ -3804,7 +4049,7 @@
           <a:p>
             <a:r>
               <a:rPr lang="de-CH" dirty="0" smtClean="0"/>
-              <a:t>Resultate</a:t>
+              <a:t>Resultate HL</a:t>
             </a:r>
             <a:endParaRPr lang="de-CH" dirty="0"/>
           </a:p>
@@ -3958,7 +4203,7 @@
           <a:p>
             <a:r>
               <a:rPr lang="de-CH" dirty="0" smtClean="0"/>
-              <a:t>Resultate</a:t>
+              <a:t>Resultate HL</a:t>
             </a:r>
             <a:endParaRPr lang="de-CH" dirty="0"/>
           </a:p>
@@ -4063,6 +4308,161 @@
           <a:noFill/>
         </p:spPr>
       </p:pic>
+    </p:spTree>
+  </p:cSld>
+  <p:clrMapOvr>
+    <a:masterClrMapping/>
+  </p:clrMapOvr>
+  <p:timing>
+    <p:tnLst>
+      <p:par>
+        <p:cTn id="1" dur="indefinite" restart="never" nodeType="tmRoot"/>
+      </p:par>
+    </p:tnLst>
+  </p:timing>
+</p:sld>
+</file>
+
+<file path=ppt/slides/slide9.xml><?xml version="1.0" encoding="utf-8"?>
+<p:sld xmlns:a="http://schemas.openxmlformats.org/drawingml/2006/main" xmlns:r="http://schemas.openxmlformats.org/officeDocument/2006/relationships" xmlns:p="http://schemas.openxmlformats.org/presentationml/2006/main">
+  <p:cSld>
+    <p:spTree>
+      <p:nvGrpSpPr>
+        <p:cNvPr id="1" name=""/>
+        <p:cNvGrpSpPr/>
+        <p:nvPr/>
+      </p:nvGrpSpPr>
+      <p:grpSpPr>
+        <a:xfrm>
+          <a:off x="0" y="0"/>
+          <a:ext cx="0" cy="0"/>
+          <a:chOff x="0" y="0"/>
+          <a:chExt cx="0" cy="0"/>
+        </a:xfrm>
+      </p:grpSpPr>
+      <p:sp>
+        <p:nvSpPr>
+          <p:cNvPr id="2" name="Titel 1"/>
+          <p:cNvSpPr>
+            <a:spLocks noGrp="1"/>
+          </p:cNvSpPr>
+          <p:nvPr>
+            <p:ph type="title"/>
+          </p:nvPr>
+        </p:nvSpPr>
+        <p:spPr/>
+        <p:txBody>
+          <a:bodyPr/>
+          <a:lstStyle/>
+          <a:p>
+            <a:r>
+              <a:rPr lang="de-CH" dirty="0" smtClean="0"/>
+              <a:t>Resultate HL</a:t>
+            </a:r>
+            <a:endParaRPr lang="de-CH" dirty="0"/>
+          </a:p>
+        </p:txBody>
+      </p:sp>
+      <p:pic>
+        <p:nvPicPr>
+          <p:cNvPr id="16386" name="Picture 2" descr="D:\BFH\DSV\EchoCancellation\Präsentation\Konvergenz_u_tief_0.00008.png"/>
+          <p:cNvPicPr>
+            <a:picLocks noChangeAspect="1" noChangeArrowheads="1"/>
+          </p:cNvPicPr>
+          <p:nvPr/>
+        </p:nvPicPr>
+        <p:blipFill>
+          <a:blip r:embed="rId2" cstate="print"/>
+          <a:srcRect/>
+          <a:stretch>
+            <a:fillRect/>
+          </a:stretch>
+        </p:blipFill>
+        <p:spPr bwMode="auto">
+          <a:xfrm>
+            <a:off x="-324544" y="1196752"/>
+            <a:ext cx="7920880" cy="3974530"/>
+          </a:xfrm>
+          <a:prstGeom prst="rect">
+            <a:avLst/>
+          </a:prstGeom>
+          <a:noFill/>
+        </p:spPr>
+      </p:pic>
+      <p:pic>
+        <p:nvPicPr>
+          <p:cNvPr id="16387" name="Picture 3" descr="D:\BFH\DSV\EchoCancellation\Präsentation\Koeffizienten_u_tief_0.00008.png"/>
+          <p:cNvPicPr>
+            <a:picLocks noChangeAspect="1" noChangeArrowheads="1"/>
+          </p:cNvPicPr>
+          <p:nvPr/>
+        </p:nvPicPr>
+        <p:blipFill>
+          <a:blip r:embed="rId3" cstate="print"/>
+          <a:srcRect/>
+          <a:stretch>
+            <a:fillRect/>
+          </a:stretch>
+        </p:blipFill>
+        <p:spPr bwMode="auto">
+          <a:xfrm>
+            <a:off x="5874889" y="4437112"/>
+            <a:ext cx="3233615" cy="2420888"/>
+          </a:xfrm>
+          <a:prstGeom prst="rect">
+            <a:avLst/>
+          </a:prstGeom>
+          <a:noFill/>
+        </p:spPr>
+      </p:pic>
+      <p:sp>
+        <p:nvSpPr>
+          <p:cNvPr id="6" name="Textfeld 5"/>
+          <p:cNvSpPr txBox="1"/>
+          <p:nvPr/>
+        </p:nvSpPr>
+        <p:spPr>
+          <a:xfrm>
+            <a:off x="251520" y="5373216"/>
+            <a:ext cx="5688632" cy="1077218"/>
+          </a:xfrm>
+          <a:prstGeom prst="rect">
+            <a:avLst/>
+          </a:prstGeom>
+          <a:noFill/>
+          <a:ln>
+            <a:noFill/>
+          </a:ln>
+        </p:spPr>
+        <p:txBody>
+          <a:bodyPr wrap="square" rtlCol="0">
+            <a:spAutoFit/>
+          </a:bodyPr>
+          <a:lstStyle/>
+          <a:p>
+            <a:pPr>
+              <a:buFont typeface="Arial" pitchFamily="34" charset="0"/>
+              <a:buChar char="•"/>
+            </a:pPr>
+            <a:r>
+              <a:rPr lang="de-CH" sz="3200" dirty="0" smtClean="0"/>
+              <a:t>Sprachsignal</a:t>
+            </a:r>
+            <a:endParaRPr lang="de-CH" sz="3200" dirty="0" smtClean="0"/>
+          </a:p>
+          <a:p>
+            <a:pPr>
+              <a:buFont typeface="Arial" pitchFamily="34" charset="0"/>
+              <a:buChar char="•"/>
+            </a:pPr>
+            <a:r>
+              <a:rPr lang="de-CH" sz="3200" dirty="0" smtClean="0"/>
+              <a:t>u = 0.00008 (klein)</a:t>
+            </a:r>
+            <a:endParaRPr lang="de-CH" sz="3200" dirty="0"/>
+          </a:p>
+        </p:txBody>
+      </p:sp>
     </p:spTree>
   </p:cSld>
   <p:clrMapOvr>

</xml_diff>

<commit_message>
drawn some random stuff
</commit_message>
<xml_diff>
--- a/Pr�sentation/Echo Cancellation.pptx
+++ b/Pr�sentation/Echo Cancellation.pptx
@@ -6,15 +6,18 @@
   </p:sldMasterIdLst>
   <p:sldIdLst>
     <p:sldId id="256" r:id="rId2"/>
-    <p:sldId id="257" r:id="rId3"/>
-    <p:sldId id="263" r:id="rId4"/>
-    <p:sldId id="258" r:id="rId5"/>
-    <p:sldId id="262" r:id="rId6"/>
-    <p:sldId id="259" r:id="rId7"/>
-    <p:sldId id="260" r:id="rId8"/>
-    <p:sldId id="261" r:id="rId9"/>
-    <p:sldId id="264" r:id="rId10"/>
-    <p:sldId id="265" r:id="rId11"/>
+    <p:sldId id="268" r:id="rId3"/>
+    <p:sldId id="257" r:id="rId4"/>
+    <p:sldId id="263" r:id="rId5"/>
+    <p:sldId id="258" r:id="rId6"/>
+    <p:sldId id="262" r:id="rId7"/>
+    <p:sldId id="259" r:id="rId8"/>
+    <p:sldId id="260" r:id="rId9"/>
+    <p:sldId id="261" r:id="rId10"/>
+    <p:sldId id="264" r:id="rId11"/>
+    <p:sldId id="265" r:id="rId12"/>
+    <p:sldId id="266" r:id="rId13"/>
+    <p:sldId id="267" r:id="rId14"/>
   </p:sldIdLst>
   <p:sldSz cx="9144000" cy="6858000" type="screen4x3"/>
   <p:notesSz cx="6858000" cy="9144000"/>
@@ -3169,6 +3172,58 @@
           </a:p>
         </p:txBody>
       </p:sp>
+      <p:pic>
+        <p:nvPicPr>
+          <p:cNvPr id="16386" name="Picture 2" descr="D:\BFH\DSV\EchoCancellation\Präsentation\Konvergenz_u_tief_0.00008.png"/>
+          <p:cNvPicPr>
+            <a:picLocks noChangeAspect="1" noChangeArrowheads="1"/>
+          </p:cNvPicPr>
+          <p:nvPr/>
+        </p:nvPicPr>
+        <p:blipFill>
+          <a:blip r:embed="rId2" cstate="print"/>
+          <a:srcRect/>
+          <a:stretch>
+            <a:fillRect/>
+          </a:stretch>
+        </p:blipFill>
+        <p:spPr bwMode="auto">
+          <a:xfrm>
+            <a:off x="-324544" y="1196752"/>
+            <a:ext cx="7920880" cy="3974530"/>
+          </a:xfrm>
+          <a:prstGeom prst="rect">
+            <a:avLst/>
+          </a:prstGeom>
+          <a:noFill/>
+        </p:spPr>
+      </p:pic>
+      <p:pic>
+        <p:nvPicPr>
+          <p:cNvPr id="16387" name="Picture 3" descr="D:\BFH\DSV\EchoCancellation\Präsentation\Koeffizienten_u_tief_0.00008.png"/>
+          <p:cNvPicPr>
+            <a:picLocks noChangeAspect="1" noChangeArrowheads="1"/>
+          </p:cNvPicPr>
+          <p:nvPr/>
+        </p:nvPicPr>
+        <p:blipFill>
+          <a:blip r:embed="rId3" cstate="print"/>
+          <a:srcRect/>
+          <a:stretch>
+            <a:fillRect/>
+          </a:stretch>
+        </p:blipFill>
+        <p:spPr bwMode="auto">
+          <a:xfrm>
+            <a:off x="5874889" y="4437112"/>
+            <a:ext cx="3233615" cy="2420888"/>
+          </a:xfrm>
+          <a:prstGeom prst="rect">
+            <a:avLst/>
+          </a:prstGeom>
+          <a:noFill/>
+        </p:spPr>
+      </p:pic>
       <p:sp>
         <p:nvSpPr>
           <p:cNvPr id="6" name="Textfeld 5"/>
@@ -3202,7 +3257,108 @@
               <a:rPr lang="de-CH" sz="3200" dirty="0" smtClean="0"/>
               <a:t>Sprachsignal</a:t>
             </a:r>
-            <a:endParaRPr lang="de-CH" sz="3200" dirty="0" smtClean="0"/>
+          </a:p>
+          <a:p>
+            <a:pPr>
+              <a:buFont typeface="Arial" pitchFamily="34" charset="0"/>
+              <a:buChar char="•"/>
+            </a:pPr>
+            <a:r>
+              <a:rPr lang="de-CH" sz="3200" dirty="0" smtClean="0"/>
+              <a:t>u = 0.00008 (klein)</a:t>
+            </a:r>
+            <a:endParaRPr lang="de-CH" sz="3200" dirty="0"/>
+          </a:p>
+        </p:txBody>
+      </p:sp>
+    </p:spTree>
+  </p:cSld>
+  <p:clrMapOvr>
+    <a:masterClrMapping/>
+  </p:clrMapOvr>
+  <p:timing>
+    <p:tnLst>
+      <p:par>
+        <p:cTn id="1" dur="indefinite" restart="never" nodeType="tmRoot"/>
+      </p:par>
+    </p:tnLst>
+  </p:timing>
+</p:sld>
+</file>
+
+<file path=ppt/slides/slide11.xml><?xml version="1.0" encoding="utf-8"?>
+<p:sld xmlns:a="http://schemas.openxmlformats.org/drawingml/2006/main" xmlns:r="http://schemas.openxmlformats.org/officeDocument/2006/relationships" xmlns:p="http://schemas.openxmlformats.org/presentationml/2006/main">
+  <p:cSld>
+    <p:spTree>
+      <p:nvGrpSpPr>
+        <p:cNvPr id="1" name=""/>
+        <p:cNvGrpSpPr/>
+        <p:nvPr/>
+      </p:nvGrpSpPr>
+      <p:grpSpPr>
+        <a:xfrm>
+          <a:off x="0" y="0"/>
+          <a:ext cx="0" cy="0"/>
+          <a:chOff x="0" y="0"/>
+          <a:chExt cx="0" cy="0"/>
+        </a:xfrm>
+      </p:grpSpPr>
+      <p:sp>
+        <p:nvSpPr>
+          <p:cNvPr id="2" name="Titel 1"/>
+          <p:cNvSpPr>
+            <a:spLocks noGrp="1"/>
+          </p:cNvSpPr>
+          <p:nvPr>
+            <p:ph type="title"/>
+          </p:nvPr>
+        </p:nvSpPr>
+        <p:spPr/>
+        <p:txBody>
+          <a:bodyPr/>
+          <a:lstStyle/>
+          <a:p>
+            <a:r>
+              <a:rPr lang="de-CH" dirty="0" smtClean="0"/>
+              <a:t>Resultate HL</a:t>
+            </a:r>
+            <a:endParaRPr lang="de-CH" dirty="0"/>
+          </a:p>
+        </p:txBody>
+      </p:sp>
+      <p:sp>
+        <p:nvSpPr>
+          <p:cNvPr id="6" name="Textfeld 5"/>
+          <p:cNvSpPr txBox="1"/>
+          <p:nvPr/>
+        </p:nvSpPr>
+        <p:spPr>
+          <a:xfrm>
+            <a:off x="251520" y="5373216"/>
+            <a:ext cx="5688632" cy="1077218"/>
+          </a:xfrm>
+          <a:prstGeom prst="rect">
+            <a:avLst/>
+          </a:prstGeom>
+          <a:noFill/>
+          <a:ln>
+            <a:noFill/>
+          </a:ln>
+        </p:spPr>
+        <p:txBody>
+          <a:bodyPr wrap="square" rtlCol="0">
+            <a:spAutoFit/>
+          </a:bodyPr>
+          <a:lstStyle/>
+          <a:p>
+            <a:pPr>
+              <a:buFont typeface="Arial" pitchFamily="34" charset="0"/>
+              <a:buChar char="•"/>
+            </a:pPr>
+            <a:r>
+              <a:rPr lang="de-CH" sz="3200" dirty="0" smtClean="0"/>
+              <a:t>Sprachsignal</a:t>
+            </a:r>
           </a:p>
           <a:p>
             <a:pPr>
@@ -3284,6 +3440,242 @@
 </p:sld>
 </file>
 
+<file path=ppt/slides/slide12.xml><?xml version="1.0" encoding="utf-8"?>
+<p:sld xmlns:a="http://schemas.openxmlformats.org/drawingml/2006/main" xmlns:r="http://schemas.openxmlformats.org/officeDocument/2006/relationships" xmlns:p="http://schemas.openxmlformats.org/presentationml/2006/main">
+  <p:cSld>
+    <p:spTree>
+      <p:nvGrpSpPr>
+        <p:cNvPr id="1" name=""/>
+        <p:cNvGrpSpPr/>
+        <p:nvPr/>
+      </p:nvGrpSpPr>
+      <p:grpSpPr>
+        <a:xfrm>
+          <a:off x="0" y="0"/>
+          <a:ext cx="0" cy="0"/>
+          <a:chOff x="0" y="0"/>
+          <a:chExt cx="0" cy="0"/>
+        </a:xfrm>
+      </p:grpSpPr>
+      <p:sp>
+        <p:nvSpPr>
+          <p:cNvPr id="2" name="Titel 1"/>
+          <p:cNvSpPr>
+            <a:spLocks noGrp="1"/>
+          </p:cNvSpPr>
+          <p:nvPr>
+            <p:ph type="title"/>
+          </p:nvPr>
+        </p:nvSpPr>
+        <p:spPr/>
+        <p:txBody>
+          <a:bodyPr/>
+          <a:lstStyle/>
+          <a:p>
+            <a:r>
+              <a:rPr lang="de-CH" dirty="0" smtClean="0"/>
+              <a:t>Implementation LL</a:t>
+            </a:r>
+            <a:endParaRPr lang="en-US" dirty="0"/>
+          </a:p>
+        </p:txBody>
+      </p:sp>
+      <p:sp>
+        <p:nvSpPr>
+          <p:cNvPr id="3" name="Inhaltsplatzhalter 2"/>
+          <p:cNvSpPr>
+            <a:spLocks noGrp="1"/>
+          </p:cNvSpPr>
+          <p:nvPr>
+            <p:ph idx="1"/>
+          </p:nvPr>
+        </p:nvSpPr>
+        <p:spPr/>
+        <p:txBody>
+          <a:bodyPr/>
+          <a:lstStyle/>
+          <a:p>
+            <a:r>
+              <a:rPr lang="de-CH" dirty="0" smtClean="0"/>
+              <a:t>2 ARM Boards</a:t>
+            </a:r>
+          </a:p>
+          <a:p>
+            <a:pPr lvl="1"/>
+            <a:r>
+              <a:rPr lang="de-CH" dirty="0" smtClean="0"/>
+              <a:t>Je eins für Delay und LMS</a:t>
+            </a:r>
+            <a:endParaRPr lang="en-US" dirty="0" smtClean="0"/>
+          </a:p>
+          <a:p>
+            <a:r>
+              <a:rPr lang="de-CH" dirty="0" smtClean="0"/>
+              <a:t>Headset</a:t>
+            </a:r>
+          </a:p>
+          <a:p>
+            <a:r>
+              <a:rPr lang="de-CH" dirty="0" smtClean="0"/>
+              <a:t>Mikrofon </a:t>
+            </a:r>
+            <a:r>
+              <a:rPr lang="de-CH" dirty="0" err="1" smtClean="0"/>
+              <a:t>Preamp</a:t>
+            </a:r>
+            <a:endParaRPr lang="de-CH" dirty="0" smtClean="0"/>
+          </a:p>
+        </p:txBody>
+      </p:sp>
+      <p:graphicFrame>
+        <p:nvGraphicFramePr>
+          <p:cNvPr id="4" name="Objekt 3"/>
+          <p:cNvGraphicFramePr>
+            <a:graphicFrameLocks noChangeAspect="1"/>
+          </p:cNvGraphicFramePr>
+          <p:nvPr>
+            <p:extLst>
+              <p:ext uri="{D42A27DB-BD31-4B8C-83A1-F6EECF244321}">
+                <p14:modId xmlns:p14="http://schemas.microsoft.com/office/powerpoint/2010/main" val="588458436"/>
+              </p:ext>
+            </p:extLst>
+          </p:nvPr>
+        </p:nvGraphicFramePr>
+        <p:xfrm>
+          <a:off x="1043608" y="4149080"/>
+          <a:ext cx="7349631" cy="1610990"/>
+        </p:xfrm>
+        <a:graphic>
+          <a:graphicData uri="http://schemas.openxmlformats.org/presentationml/2006/ole">
+            <mc:AlternateContent xmlns:mc="http://schemas.openxmlformats.org/markup-compatibility/2006">
+              <mc:Choice xmlns:v="urn:schemas-microsoft-com:vml" Requires="v">
+                <p:oleObj spid="_x0000_s1029" name="Visio" r:id="rId3" imgW="5726008" imgH="1260900" progId="Visio.Drawing.11">
+                  <p:embed/>
+                </p:oleObj>
+              </mc:Choice>
+              <mc:Fallback>
+                <p:oleObj name="Visio" r:id="rId3" imgW="5726008" imgH="1260900" progId="Visio.Drawing.11">
+                  <p:embed/>
+                  <p:pic>
+                    <p:nvPicPr>
+                      <p:cNvPr id="0" name=""/>
+                      <p:cNvPicPr/>
+                      <p:nvPr/>
+                    </p:nvPicPr>
+                    <p:blipFill>
+                      <a:blip r:embed="rId4"/>
+                      <a:stretch>
+                        <a:fillRect/>
+                      </a:stretch>
+                    </p:blipFill>
+                    <p:spPr>
+                      <a:xfrm>
+                        <a:off x="1043608" y="4149080"/>
+                        <a:ext cx="7349631" cy="1610990"/>
+                      </a:xfrm>
+                      <a:prstGeom prst="rect">
+                        <a:avLst/>
+                      </a:prstGeom>
+                    </p:spPr>
+                  </p:pic>
+                </p:oleObj>
+              </mc:Fallback>
+            </mc:AlternateContent>
+          </a:graphicData>
+        </a:graphic>
+      </p:graphicFrame>
+    </p:spTree>
+    <p:extLst>
+      <p:ext uri="{BB962C8B-B14F-4D97-AF65-F5344CB8AC3E}">
+        <p14:creationId xmlns:p14="http://schemas.microsoft.com/office/powerpoint/2010/main" val="334745486"/>
+      </p:ext>
+    </p:extLst>
+  </p:cSld>
+  <p:clrMapOvr>
+    <a:masterClrMapping/>
+  </p:clrMapOvr>
+</p:sld>
+</file>
+
+<file path=ppt/slides/slide13.xml><?xml version="1.0" encoding="utf-8"?>
+<p:sld xmlns:a="http://schemas.openxmlformats.org/drawingml/2006/main" xmlns:r="http://schemas.openxmlformats.org/officeDocument/2006/relationships" xmlns:p="http://schemas.openxmlformats.org/presentationml/2006/main">
+  <p:cSld>
+    <p:spTree>
+      <p:nvGrpSpPr>
+        <p:cNvPr id="1" name=""/>
+        <p:cNvGrpSpPr/>
+        <p:nvPr/>
+      </p:nvGrpSpPr>
+      <p:grpSpPr>
+        <a:xfrm>
+          <a:off x="0" y="0"/>
+          <a:ext cx="0" cy="0"/>
+          <a:chOff x="0" y="0"/>
+          <a:chExt cx="0" cy="0"/>
+        </a:xfrm>
+      </p:grpSpPr>
+      <p:sp>
+        <p:nvSpPr>
+          <p:cNvPr id="2" name="Titel 1"/>
+          <p:cNvSpPr>
+            <a:spLocks noGrp="1"/>
+          </p:cNvSpPr>
+          <p:nvPr>
+            <p:ph type="title"/>
+          </p:nvPr>
+        </p:nvSpPr>
+        <p:spPr/>
+        <p:txBody>
+          <a:bodyPr/>
+          <a:lstStyle/>
+          <a:p>
+            <a:r>
+              <a:rPr lang="de-CH" dirty="0" smtClean="0"/>
+              <a:t>Delay</a:t>
+            </a:r>
+            <a:endParaRPr lang="en-US" dirty="0"/>
+          </a:p>
+        </p:txBody>
+      </p:sp>
+      <p:sp>
+        <p:nvSpPr>
+          <p:cNvPr id="3" name="Inhaltsplatzhalter 2"/>
+          <p:cNvSpPr>
+            <a:spLocks noGrp="1"/>
+          </p:cNvSpPr>
+          <p:nvPr>
+            <p:ph idx="1"/>
+          </p:nvPr>
+        </p:nvSpPr>
+        <p:spPr/>
+        <p:txBody>
+          <a:bodyPr/>
+          <a:lstStyle/>
+          <a:p>
+            <a:r>
+              <a:rPr lang="de-CH" dirty="0" smtClean="0"/>
+              <a:t>FIR-Filter</a:t>
+            </a:r>
+          </a:p>
+          <a:p>
+            <a:pPr lvl="1"/>
+            <a:endParaRPr lang="en-US" dirty="0"/>
+          </a:p>
+        </p:txBody>
+      </p:sp>
+    </p:spTree>
+    <p:extLst>
+      <p:ext uri="{BB962C8B-B14F-4D97-AF65-F5344CB8AC3E}">
+        <p14:creationId xmlns:p14="http://schemas.microsoft.com/office/powerpoint/2010/main" val="786059088"/>
+      </p:ext>
+    </p:extLst>
+  </p:cSld>
+  <p:clrMapOvr>
+    <a:masterClrMapping/>
+  </p:clrMapOvr>
+</p:sld>
+</file>
+
 <file path=ppt/slides/slide2.xml><?xml version="1.0" encoding="utf-8"?>
 <p:sld xmlns:a="http://schemas.openxmlformats.org/drawingml/2006/main" xmlns:r="http://schemas.openxmlformats.org/officeDocument/2006/relationships" xmlns:p="http://schemas.openxmlformats.org/presentationml/2006/main">
   <p:cSld>
@@ -3320,7 +3712,7 @@
               <a:rPr lang="de-CH" dirty="0" smtClean="0"/>
               <a:t>Problematik</a:t>
             </a:r>
-            <a:endParaRPr lang="de-CH" dirty="0"/>
+            <a:endParaRPr lang="en-US" dirty="0"/>
           </a:p>
         </p:txBody>
       </p:sp>
@@ -3336,58 +3728,137 @@
         </p:nvSpPr>
         <p:spPr/>
         <p:txBody>
-          <a:bodyPr>
-            <a:normAutofit/>
-          </a:bodyPr>
-          <a:lstStyle/>
-          <a:p>
-            <a:r>
-              <a:rPr lang="de-CH" dirty="0" smtClean="0"/>
-              <a:t>Ein Signal x wird mit einem Echo versehen.</a:t>
-            </a:r>
-          </a:p>
-          <a:p>
-            <a:pPr lvl="1"/>
-            <a:r>
-              <a:rPr lang="de-CH" dirty="0" smtClean="0"/>
-              <a:t>Ein Echo ist einfach eine verzögerte und eventuell abgedämpfte Kopie von x.</a:t>
-            </a:r>
-          </a:p>
-          <a:p>
-            <a:r>
-              <a:rPr lang="de-CH" dirty="0" smtClean="0"/>
-              <a:t>Das Signal x und das resultierende Signal y sind bekannt.</a:t>
-            </a:r>
-          </a:p>
-          <a:p>
-            <a:r>
-              <a:rPr lang="de-CH" dirty="0" smtClean="0"/>
-              <a:t>Aus beiden Signalen soll nun die Charakteristik des Echos ermittelt </a:t>
-            </a:r>
-            <a:r>
-              <a:rPr lang="de-CH" dirty="0" smtClean="0"/>
-              <a:t>und </a:t>
-            </a:r>
-            <a:r>
-              <a:rPr lang="de-CH" dirty="0" smtClean="0"/>
-              <a:t>das ursprüngliche Signal x wiederhergestellt werden.</a:t>
-            </a:r>
-            <a:endParaRPr lang="de-CH" dirty="0"/>
-          </a:p>
-        </p:txBody>
-      </p:sp>
+          <a:bodyPr/>
+          <a:lstStyle/>
+          <a:p>
+            <a:endParaRPr lang="en-US"/>
+          </a:p>
+        </p:txBody>
+      </p:sp>
+      <p:graphicFrame>
+        <p:nvGraphicFramePr>
+          <p:cNvPr id="4" name="Objekt 3"/>
+          <p:cNvGraphicFramePr>
+            <a:graphicFrameLocks noChangeAspect="1"/>
+          </p:cNvGraphicFramePr>
+          <p:nvPr>
+            <p:extLst>
+              <p:ext uri="{D42A27DB-BD31-4B8C-83A1-F6EECF244321}">
+                <p14:modId xmlns:p14="http://schemas.microsoft.com/office/powerpoint/2010/main" val="836563750"/>
+              </p:ext>
+            </p:extLst>
+          </p:nvPr>
+        </p:nvGraphicFramePr>
+        <p:xfrm>
+          <a:off x="611560" y="2132856"/>
+          <a:ext cx="7976513" cy="1917874"/>
+        </p:xfrm>
+        <a:graphic>
+          <a:graphicData uri="http://schemas.openxmlformats.org/presentationml/2006/ole">
+            <mc:AlternateContent xmlns:mc="http://schemas.openxmlformats.org/markup-compatibility/2006">
+              <mc:Choice xmlns:v="urn:schemas-microsoft-com:vml" Requires="v">
+                <p:oleObj spid="_x0000_s2051" name="Visio" r:id="rId3" imgW="5770040" imgH="1387260" progId="Visio.Drawing.11">
+                  <p:embed/>
+                </p:oleObj>
+              </mc:Choice>
+              <mc:Fallback>
+                <p:oleObj name="Visio" r:id="rId3" imgW="5770040" imgH="1387260" progId="Visio.Drawing.11">
+                  <p:embed/>
+                  <p:pic>
+                    <p:nvPicPr>
+                      <p:cNvPr id="0" name=""/>
+                      <p:cNvPicPr/>
+                      <p:nvPr/>
+                    </p:nvPicPr>
+                    <p:blipFill>
+                      <a:blip r:embed="rId4"/>
+                      <a:stretch>
+                        <a:fillRect/>
+                      </a:stretch>
+                    </p:blipFill>
+                    <p:spPr>
+                      <a:xfrm>
+                        <a:off x="611560" y="2132856"/>
+                        <a:ext cx="7976513" cy="1917874"/>
+                      </a:xfrm>
+                      <a:prstGeom prst="rect">
+                        <a:avLst/>
+                      </a:prstGeom>
+                    </p:spPr>
+                  </p:pic>
+                </p:oleObj>
+              </mc:Fallback>
+            </mc:AlternateContent>
+          </a:graphicData>
+        </a:graphic>
+      </p:graphicFrame>
+      <p:graphicFrame>
+        <p:nvGraphicFramePr>
+          <p:cNvPr id="5" name="Objekt 4"/>
+          <p:cNvGraphicFramePr>
+            <a:graphicFrameLocks noChangeAspect="1"/>
+          </p:cNvGraphicFramePr>
+          <p:nvPr>
+            <p:extLst>
+              <p:ext uri="{D42A27DB-BD31-4B8C-83A1-F6EECF244321}">
+                <p14:modId xmlns:p14="http://schemas.microsoft.com/office/powerpoint/2010/main" val="2666585826"/>
+              </p:ext>
+            </p:extLst>
+          </p:nvPr>
+        </p:nvGraphicFramePr>
+        <p:xfrm>
+          <a:off x="683568" y="4365104"/>
+          <a:ext cx="8006659" cy="1755006"/>
+        </p:xfrm>
+        <a:graphic>
+          <a:graphicData uri="http://schemas.openxmlformats.org/presentationml/2006/ole">
+            <mc:AlternateContent xmlns:mc="http://schemas.openxmlformats.org/markup-compatibility/2006">
+              <mc:Choice xmlns:v="urn:schemas-microsoft-com:vml" Requires="v">
+                <p:oleObj spid="_x0000_s2052" name="Visio" r:id="rId5" imgW="5706828" imgH="1251450" progId="Visio.Drawing.11">
+                  <p:embed/>
+                </p:oleObj>
+              </mc:Choice>
+              <mc:Fallback>
+                <p:oleObj name="Visio" r:id="rId5" imgW="5706828" imgH="1251450" progId="Visio.Drawing.11">
+                  <p:embed/>
+                  <p:pic>
+                    <p:nvPicPr>
+                      <p:cNvPr id="0" name=""/>
+                      <p:cNvPicPr/>
+                      <p:nvPr/>
+                    </p:nvPicPr>
+                    <p:blipFill>
+                      <a:blip r:embed="rId6"/>
+                      <a:stretch>
+                        <a:fillRect/>
+                      </a:stretch>
+                    </p:blipFill>
+                    <p:spPr>
+                      <a:xfrm>
+                        <a:off x="683568" y="4365104"/>
+                        <a:ext cx="8006659" cy="1755006"/>
+                      </a:xfrm>
+                      <a:prstGeom prst="rect">
+                        <a:avLst/>
+                      </a:prstGeom>
+                    </p:spPr>
+                  </p:pic>
+                </p:oleObj>
+              </mc:Fallback>
+            </mc:AlternateContent>
+          </a:graphicData>
+        </a:graphic>
+      </p:graphicFrame>
     </p:spTree>
+    <p:extLst>
+      <p:ext uri="{BB962C8B-B14F-4D97-AF65-F5344CB8AC3E}">
+        <p14:creationId xmlns:p14="http://schemas.microsoft.com/office/powerpoint/2010/main" val="387133026"/>
+      </p:ext>
+    </p:extLst>
   </p:cSld>
   <p:clrMapOvr>
     <a:masterClrMapping/>
   </p:clrMapOvr>
-  <p:timing>
-    <p:tnLst>
-      <p:par>
-        <p:cTn id="1" dur="indefinite" restart="never" nodeType="tmRoot"/>
-      </p:par>
-    </p:tnLst>
-  </p:timing>
 </p:sld>
 </file>
 
@@ -3450,11 +3921,106 @@
           <a:p>
             <a:r>
               <a:rPr lang="de-CH" dirty="0" smtClean="0"/>
-              <a:t>Echo</a:t>
-            </a:r>
+              <a:t>Ein Signal x wird mit einem Echo versehen.</a:t>
+            </a:r>
+          </a:p>
+          <a:p>
+            <a:pPr lvl="1"/>
             <a:r>
               <a:rPr lang="de-CH" dirty="0" smtClean="0"/>
-              <a:t>:</a:t>
+              <a:t>Ein Echo ist einfach eine verzögerte und eventuell abgedämpfte Kopie von x.</a:t>
+            </a:r>
+          </a:p>
+          <a:p>
+            <a:r>
+              <a:rPr lang="de-CH" dirty="0" smtClean="0"/>
+              <a:t>Das Signal x und das resultierende Signal y sind bekannt.</a:t>
+            </a:r>
+          </a:p>
+          <a:p>
+            <a:r>
+              <a:rPr lang="de-CH" dirty="0" smtClean="0"/>
+              <a:t>Aus beiden Signalen soll nun die Charakteristik des Echos ermittelt und das ursprüngliche Signal x wiederhergestellt werden.</a:t>
+            </a:r>
+            <a:endParaRPr lang="de-CH" dirty="0"/>
+          </a:p>
+        </p:txBody>
+      </p:sp>
+    </p:spTree>
+  </p:cSld>
+  <p:clrMapOvr>
+    <a:masterClrMapping/>
+  </p:clrMapOvr>
+  <p:timing>
+    <p:tnLst>
+      <p:par>
+        <p:cTn id="1" dur="indefinite" restart="never" nodeType="tmRoot"/>
+      </p:par>
+    </p:tnLst>
+  </p:timing>
+</p:sld>
+</file>
+
+<file path=ppt/slides/slide4.xml><?xml version="1.0" encoding="utf-8"?>
+<p:sld xmlns:a="http://schemas.openxmlformats.org/drawingml/2006/main" xmlns:r="http://schemas.openxmlformats.org/officeDocument/2006/relationships" xmlns:p="http://schemas.openxmlformats.org/presentationml/2006/main">
+  <p:cSld>
+    <p:spTree>
+      <p:nvGrpSpPr>
+        <p:cNvPr id="1" name=""/>
+        <p:cNvGrpSpPr/>
+        <p:nvPr/>
+      </p:nvGrpSpPr>
+      <p:grpSpPr>
+        <a:xfrm>
+          <a:off x="0" y="0"/>
+          <a:ext cx="0" cy="0"/>
+          <a:chOff x="0" y="0"/>
+          <a:chExt cx="0" cy="0"/>
+        </a:xfrm>
+      </p:grpSpPr>
+      <p:sp>
+        <p:nvSpPr>
+          <p:cNvPr id="2" name="Titel 1"/>
+          <p:cNvSpPr>
+            <a:spLocks noGrp="1"/>
+          </p:cNvSpPr>
+          <p:nvPr>
+            <p:ph type="title"/>
+          </p:nvPr>
+        </p:nvSpPr>
+        <p:spPr/>
+        <p:txBody>
+          <a:bodyPr/>
+          <a:lstStyle/>
+          <a:p>
+            <a:r>
+              <a:rPr lang="de-CH" dirty="0" smtClean="0"/>
+              <a:t>Problematik</a:t>
+            </a:r>
+            <a:endParaRPr lang="de-CH" dirty="0"/>
+          </a:p>
+        </p:txBody>
+      </p:sp>
+      <p:sp>
+        <p:nvSpPr>
+          <p:cNvPr id="3" name="Inhaltsplatzhalter 2"/>
+          <p:cNvSpPr>
+            <a:spLocks noGrp="1"/>
+          </p:cNvSpPr>
+          <p:nvPr>
+            <p:ph idx="1"/>
+          </p:nvPr>
+        </p:nvSpPr>
+        <p:spPr/>
+        <p:txBody>
+          <a:bodyPr>
+            <a:normAutofit/>
+          </a:bodyPr>
+          <a:lstStyle/>
+          <a:p>
+            <a:r>
+              <a:rPr lang="de-CH" dirty="0" smtClean="0"/>
+              <a:t>Echo:</a:t>
             </a:r>
           </a:p>
           <a:p>
@@ -3520,7 +4086,7 @@
 </p:sld>
 </file>
 
-<file path=ppt/slides/slide4.xml><?xml version="1.0" encoding="utf-8"?>
+<file path=ppt/slides/slide5.xml><?xml version="1.0" encoding="utf-8"?>
 <p:sld xmlns:a="http://schemas.openxmlformats.org/drawingml/2006/main" xmlns:r="http://schemas.openxmlformats.org/officeDocument/2006/relationships" xmlns:p="http://schemas.openxmlformats.org/presentationml/2006/main">
   <p:cSld>
     <p:spTree>
@@ -3645,7 +4211,7 @@
 </p:sld>
 </file>
 
-<file path=ppt/slides/slide5.xml><?xml version="1.0" encoding="utf-8"?>
+<file path=ppt/slides/slide6.xml><?xml version="1.0" encoding="utf-8"?>
 <p:sld xmlns:a="http://schemas.openxmlformats.org/drawingml/2006/main" xmlns:r="http://schemas.openxmlformats.org/officeDocument/2006/relationships" xmlns:p="http://schemas.openxmlformats.org/presentationml/2006/main">
   <p:cSld>
     <p:spTree>
@@ -3717,21 +4283,8 @@
             <a:pPr lvl="1"/>
             <a:r>
               <a:rPr lang="de-CH" dirty="0" smtClean="0"/>
-              <a:t>Wenn nun das </a:t>
-            </a:r>
-            <a:r>
-              <a:rPr lang="de-CH" dirty="0" smtClean="0"/>
-              <a:t>erste Filter-Tab ignoriert wird, </a:t>
-            </a:r>
-            <a:r>
-              <a:rPr lang="de-CH" dirty="0" smtClean="0"/>
-              <a:t>erhält man als Resultat das Originalsignal, da </a:t>
-            </a:r>
-            <a:r>
-              <a:rPr lang="de-CH" dirty="0" smtClean="0"/>
-              <a:t>nur noch das Echo nachgebildet und von y subtrahiert wird:</a:t>
-            </a:r>
-            <a:endParaRPr lang="de-CH" dirty="0" smtClean="0"/>
+              <a:t>Wenn nun das erste Filter-Tab ignoriert wird, erhält man als Resultat das Originalsignal, da nur noch das Echo nachgebildet und von y subtrahiert wird:</a:t>
+            </a:r>
           </a:p>
         </p:txBody>
       </p:sp>
@@ -3879,7 +4432,7 @@
 </p:sld>
 </file>
 
-<file path=ppt/slides/slide6.xml><?xml version="1.0" encoding="utf-8"?>
+<file path=ppt/slides/slide7.xml><?xml version="1.0" encoding="utf-8"?>
 <p:sld xmlns:a="http://schemas.openxmlformats.org/drawingml/2006/main" xmlns:r="http://schemas.openxmlformats.org/officeDocument/2006/relationships" xmlns:p="http://schemas.openxmlformats.org/presentationml/2006/main">
   <p:cSld>
     <p:spTree>
@@ -3966,37 +4519,15 @@
             <a:pPr lvl="1"/>
             <a:r>
               <a:rPr lang="de-CH" dirty="0" smtClean="0"/>
-              <a:t>u </a:t>
-            </a:r>
+              <a:t>u klein: genau aber langsam</a:t>
+            </a:r>
+          </a:p>
+          <a:p>
+            <a:pPr lvl="1"/>
             <a:r>
               <a:rPr lang="de-CH" dirty="0" smtClean="0"/>
-              <a:t>klein: genau aber </a:t>
-            </a:r>
-            <a:r>
-              <a:rPr lang="de-CH" dirty="0" smtClean="0"/>
-              <a:t>langsam</a:t>
-            </a:r>
-            <a:endParaRPr lang="de-CH" dirty="0" smtClean="0"/>
-          </a:p>
-          <a:p>
-            <a:pPr lvl="1"/>
-            <a:r>
-              <a:rPr lang="de-CH" dirty="0" smtClean="0"/>
-              <a:t>u</a:t>
-            </a:r>
-            <a:r>
-              <a:rPr lang="de-CH" dirty="0" smtClean="0"/>
-              <a:t> </a:t>
-            </a:r>
-            <a:r>
-              <a:rPr lang="de-CH" dirty="0" smtClean="0"/>
-              <a:t>gross: schnell aber </a:t>
-            </a:r>
-            <a:r>
-              <a:rPr lang="de-CH" dirty="0" smtClean="0"/>
-              <a:t>ungenau (und evtl. unstabil)</a:t>
-            </a:r>
-            <a:endParaRPr lang="de-CH" dirty="0" smtClean="0"/>
+              <a:t>u gross: schnell aber ungenau (und evtl. unstabil)</a:t>
+            </a:r>
           </a:p>
         </p:txBody>
       </p:sp>
@@ -4015,7 +4546,7 @@
 </p:sld>
 </file>
 
-<file path=ppt/slides/slide7.xml><?xml version="1.0" encoding="utf-8"?>
+<file path=ppt/slides/slide8.xml><?xml version="1.0" encoding="utf-8"?>
 <p:sld xmlns:a="http://schemas.openxmlformats.org/drawingml/2006/main" xmlns:r="http://schemas.openxmlformats.org/officeDocument/2006/relationships" xmlns:p="http://schemas.openxmlformats.org/presentationml/2006/main">
   <p:cSld>
     <p:spTree>
@@ -4169,7 +4700,7 @@
 </p:sld>
 </file>
 
-<file path=ppt/slides/slide8.xml><?xml version="1.0" encoding="utf-8"?>
+<file path=ppt/slides/slide9.xml><?xml version="1.0" encoding="utf-8"?>
 <p:sld xmlns:a="http://schemas.openxmlformats.org/drawingml/2006/main" xmlns:r="http://schemas.openxmlformats.org/officeDocument/2006/relationships" xmlns:p="http://schemas.openxmlformats.org/presentationml/2006/main">
   <p:cSld>
     <p:spTree>
@@ -4308,161 +4839,6 @@
           <a:noFill/>
         </p:spPr>
       </p:pic>
-    </p:spTree>
-  </p:cSld>
-  <p:clrMapOvr>
-    <a:masterClrMapping/>
-  </p:clrMapOvr>
-  <p:timing>
-    <p:tnLst>
-      <p:par>
-        <p:cTn id="1" dur="indefinite" restart="never" nodeType="tmRoot"/>
-      </p:par>
-    </p:tnLst>
-  </p:timing>
-</p:sld>
-</file>
-
-<file path=ppt/slides/slide9.xml><?xml version="1.0" encoding="utf-8"?>
-<p:sld xmlns:a="http://schemas.openxmlformats.org/drawingml/2006/main" xmlns:r="http://schemas.openxmlformats.org/officeDocument/2006/relationships" xmlns:p="http://schemas.openxmlformats.org/presentationml/2006/main">
-  <p:cSld>
-    <p:spTree>
-      <p:nvGrpSpPr>
-        <p:cNvPr id="1" name=""/>
-        <p:cNvGrpSpPr/>
-        <p:nvPr/>
-      </p:nvGrpSpPr>
-      <p:grpSpPr>
-        <a:xfrm>
-          <a:off x="0" y="0"/>
-          <a:ext cx="0" cy="0"/>
-          <a:chOff x="0" y="0"/>
-          <a:chExt cx="0" cy="0"/>
-        </a:xfrm>
-      </p:grpSpPr>
-      <p:sp>
-        <p:nvSpPr>
-          <p:cNvPr id="2" name="Titel 1"/>
-          <p:cNvSpPr>
-            <a:spLocks noGrp="1"/>
-          </p:cNvSpPr>
-          <p:nvPr>
-            <p:ph type="title"/>
-          </p:nvPr>
-        </p:nvSpPr>
-        <p:spPr/>
-        <p:txBody>
-          <a:bodyPr/>
-          <a:lstStyle/>
-          <a:p>
-            <a:r>
-              <a:rPr lang="de-CH" dirty="0" smtClean="0"/>
-              <a:t>Resultate HL</a:t>
-            </a:r>
-            <a:endParaRPr lang="de-CH" dirty="0"/>
-          </a:p>
-        </p:txBody>
-      </p:sp>
-      <p:pic>
-        <p:nvPicPr>
-          <p:cNvPr id="16386" name="Picture 2" descr="D:\BFH\DSV\EchoCancellation\Präsentation\Konvergenz_u_tief_0.00008.png"/>
-          <p:cNvPicPr>
-            <a:picLocks noChangeAspect="1" noChangeArrowheads="1"/>
-          </p:cNvPicPr>
-          <p:nvPr/>
-        </p:nvPicPr>
-        <p:blipFill>
-          <a:blip r:embed="rId2" cstate="print"/>
-          <a:srcRect/>
-          <a:stretch>
-            <a:fillRect/>
-          </a:stretch>
-        </p:blipFill>
-        <p:spPr bwMode="auto">
-          <a:xfrm>
-            <a:off x="-324544" y="1196752"/>
-            <a:ext cx="7920880" cy="3974530"/>
-          </a:xfrm>
-          <a:prstGeom prst="rect">
-            <a:avLst/>
-          </a:prstGeom>
-          <a:noFill/>
-        </p:spPr>
-      </p:pic>
-      <p:pic>
-        <p:nvPicPr>
-          <p:cNvPr id="16387" name="Picture 3" descr="D:\BFH\DSV\EchoCancellation\Präsentation\Koeffizienten_u_tief_0.00008.png"/>
-          <p:cNvPicPr>
-            <a:picLocks noChangeAspect="1" noChangeArrowheads="1"/>
-          </p:cNvPicPr>
-          <p:nvPr/>
-        </p:nvPicPr>
-        <p:blipFill>
-          <a:blip r:embed="rId3" cstate="print"/>
-          <a:srcRect/>
-          <a:stretch>
-            <a:fillRect/>
-          </a:stretch>
-        </p:blipFill>
-        <p:spPr bwMode="auto">
-          <a:xfrm>
-            <a:off x="5874889" y="4437112"/>
-            <a:ext cx="3233615" cy="2420888"/>
-          </a:xfrm>
-          <a:prstGeom prst="rect">
-            <a:avLst/>
-          </a:prstGeom>
-          <a:noFill/>
-        </p:spPr>
-      </p:pic>
-      <p:sp>
-        <p:nvSpPr>
-          <p:cNvPr id="6" name="Textfeld 5"/>
-          <p:cNvSpPr txBox="1"/>
-          <p:nvPr/>
-        </p:nvSpPr>
-        <p:spPr>
-          <a:xfrm>
-            <a:off x="251520" y="5373216"/>
-            <a:ext cx="5688632" cy="1077218"/>
-          </a:xfrm>
-          <a:prstGeom prst="rect">
-            <a:avLst/>
-          </a:prstGeom>
-          <a:noFill/>
-          <a:ln>
-            <a:noFill/>
-          </a:ln>
-        </p:spPr>
-        <p:txBody>
-          <a:bodyPr wrap="square" rtlCol="0">
-            <a:spAutoFit/>
-          </a:bodyPr>
-          <a:lstStyle/>
-          <a:p>
-            <a:pPr>
-              <a:buFont typeface="Arial" pitchFamily="34" charset="0"/>
-              <a:buChar char="•"/>
-            </a:pPr>
-            <a:r>
-              <a:rPr lang="de-CH" sz="3200" dirty="0" smtClean="0"/>
-              <a:t>Sprachsignal</a:t>
-            </a:r>
-            <a:endParaRPr lang="de-CH" sz="3200" dirty="0" smtClean="0"/>
-          </a:p>
-          <a:p>
-            <a:pPr>
-              <a:buFont typeface="Arial" pitchFamily="34" charset="0"/>
-              <a:buChar char="•"/>
-            </a:pPr>
-            <a:r>
-              <a:rPr lang="de-CH" sz="3200" dirty="0" smtClean="0"/>
-              <a:t>u = 0.00008 (klein)</a:t>
-            </a:r>
-            <a:endParaRPr lang="de-CH" sz="3200" dirty="0"/>
-          </a:p>
-        </p:txBody>
-      </p:sp>
     </p:spTree>
   </p:cSld>
   <p:clrMapOvr>

</xml_diff>

<commit_message>
merged PPT with HL implementation in temp file, added cheater-image
</commit_message>
<xml_diff>
--- a/Pr�sentation/Echo Cancellation.pptx
+++ b/Pr�sentation/Echo Cancellation.pptx
@@ -11,13 +11,18 @@
     <p:sldId id="263" r:id="rId5"/>
     <p:sldId id="258" r:id="rId6"/>
     <p:sldId id="262" r:id="rId7"/>
-    <p:sldId id="259" r:id="rId8"/>
-    <p:sldId id="260" r:id="rId9"/>
-    <p:sldId id="261" r:id="rId10"/>
-    <p:sldId id="264" r:id="rId11"/>
-    <p:sldId id="265" r:id="rId12"/>
-    <p:sldId id="266" r:id="rId13"/>
-    <p:sldId id="267" r:id="rId14"/>
+    <p:sldId id="269" r:id="rId8"/>
+    <p:sldId id="270" r:id="rId9"/>
+    <p:sldId id="271" r:id="rId10"/>
+    <p:sldId id="272" r:id="rId11"/>
+    <p:sldId id="273" r:id="rId12"/>
+    <p:sldId id="274" r:id="rId13"/>
+    <p:sldId id="275" r:id="rId14"/>
+    <p:sldId id="276" r:id="rId15"/>
+    <p:sldId id="266" r:id="rId16"/>
+    <p:sldId id="267" r:id="rId17"/>
+    <p:sldId id="277" r:id="rId18"/>
+    <p:sldId id="278" r:id="rId19"/>
   </p:sldIdLst>
   <p:sldSz cx="9144000" cy="6858000" type="screen4x3"/>
   <p:notesSz cx="6858000" cy="9144000"/>
@@ -3165,113 +3170,171 @@
           <a:lstStyle/>
           <a:p>
             <a:r>
-              <a:rPr lang="de-CH" dirty="0" smtClean="0"/>
-              <a:t>Resultate HL</a:t>
+              <a:rPr lang="de-CH" dirty="0" err="1" smtClean="0"/>
+              <a:t>Implementation</a:t>
+            </a:r>
+            <a:r>
+              <a:rPr lang="de-CH" dirty="0" smtClean="0"/>
+              <a:t> HL (</a:t>
+            </a:r>
+            <a:r>
+              <a:rPr lang="de-CH" dirty="0" err="1" smtClean="0"/>
+              <a:t>voice</a:t>
+            </a:r>
+            <a:r>
+              <a:rPr lang="de-CH" dirty="0" smtClean="0"/>
+              <a:t>)</a:t>
             </a:r>
             <a:endParaRPr lang="de-CH" dirty="0"/>
           </a:p>
         </p:txBody>
       </p:sp>
-      <p:pic>
-        <p:nvPicPr>
-          <p:cNvPr id="16386" name="Picture 2" descr="D:\BFH\DSV\EchoCancellation\Präsentation\Konvergenz_u_tief_0.00008.png"/>
-          <p:cNvPicPr>
-            <a:picLocks noChangeAspect="1" noChangeArrowheads="1"/>
-          </p:cNvPicPr>
+      <p:sp>
+        <p:nvSpPr>
+          <p:cNvPr id="3" name="Inhaltsplatzhalter 2"/>
+          <p:cNvSpPr>
+            <a:spLocks noGrp="1"/>
+          </p:cNvSpPr>
+          <p:nvPr>
+            <p:ph idx="1"/>
+          </p:nvPr>
+        </p:nvSpPr>
+        <p:spPr/>
+        <p:txBody>
+          <a:bodyPr>
+            <a:normAutofit/>
+          </a:bodyPr>
+          <a:lstStyle/>
+          <a:p>
+            <a:r>
+              <a:rPr lang="de-CH" dirty="0" err="1" smtClean="0"/>
+              <a:t>Lorem</a:t>
+            </a:r>
+            <a:r>
+              <a:rPr lang="de-CH" dirty="0" smtClean="0"/>
+              <a:t> </a:t>
+            </a:r>
+            <a:r>
+              <a:rPr lang="de-CH" dirty="0" err="1" smtClean="0"/>
+              <a:t>Ipsum</a:t>
+            </a:r>
+            <a:r>
+              <a:rPr lang="de-CH" dirty="0" smtClean="0"/>
+              <a:t>, 2*5 Sekunden hintereinander</a:t>
+            </a:r>
+          </a:p>
+          <a:p>
+            <a:r>
+              <a:rPr lang="de-CH" dirty="0" smtClean="0"/>
+              <a:t>Echo ist eine Verzögerung um 1470 Samples (200ms bei einer Samplefrequenz von 7350Hz) und Amplitude von 0.4:</a:t>
+            </a:r>
+          </a:p>
+          <a:p>
+            <a:pPr lvl="1"/>
+            <a:r>
+              <a:rPr lang="de-CH" dirty="0" smtClean="0"/>
+              <a:t>g = </a:t>
+            </a:r>
+            <a:r>
+              <a:rPr lang="de-CH" dirty="0" err="1" smtClean="0"/>
+              <a:t>zeros</a:t>
+            </a:r>
+            <a:r>
+              <a:rPr lang="de-CH" dirty="0" smtClean="0"/>
+              <a:t>(2000,1);   g(1) = 1;   g(1600) = 0.4;</a:t>
+            </a:r>
+          </a:p>
+          <a:p>
+            <a:r>
+              <a:rPr lang="de-CH" dirty="0" smtClean="0"/>
+              <a:t>Konvergenzgeschwindigkeit ist abhängig von u</a:t>
+            </a:r>
+          </a:p>
+          <a:p>
+            <a:pPr lvl="1"/>
+            <a:r>
+              <a:rPr lang="de-CH" dirty="0" smtClean="0"/>
+              <a:t>u sollte                     nicht überschreiten</a:t>
+            </a:r>
+          </a:p>
+        </p:txBody>
+      </p:sp>
+      <p:graphicFrame>
+        <p:nvGraphicFramePr>
+          <p:cNvPr id="1028" name="Object 4"/>
+          <p:cNvGraphicFramePr>
+            <a:graphicFrameLocks noChangeAspect="1"/>
+          </p:cNvGraphicFramePr>
           <p:nvPr/>
-        </p:nvPicPr>
-        <p:blipFill>
-          <a:blip r:embed="rId2" cstate="print"/>
-          <a:srcRect/>
-          <a:stretch>
-            <a:fillRect/>
-          </a:stretch>
-        </p:blipFill>
-        <p:spPr bwMode="auto">
-          <a:xfrm>
-            <a:off x="-324544" y="1196752"/>
-            <a:ext cx="7920880" cy="3974530"/>
-          </a:xfrm>
-          <a:prstGeom prst="rect">
-            <a:avLst/>
-          </a:prstGeom>
-          <a:noFill/>
-        </p:spPr>
-      </p:pic>
-      <p:pic>
-        <p:nvPicPr>
-          <p:cNvPr id="16387" name="Picture 3" descr="D:\BFH\DSV\EchoCancellation\Präsentation\Koeffizienten_u_tief_0.00008.png"/>
-          <p:cNvPicPr>
-            <a:picLocks noChangeAspect="1" noChangeArrowheads="1"/>
-          </p:cNvPicPr>
-          <p:nvPr/>
-        </p:nvPicPr>
-        <p:blipFill>
-          <a:blip r:embed="rId3" cstate="print"/>
-          <a:srcRect/>
-          <a:stretch>
-            <a:fillRect/>
-          </a:stretch>
-        </p:blipFill>
-        <p:spPr bwMode="auto">
-          <a:xfrm>
-            <a:off x="5874889" y="4437112"/>
-            <a:ext cx="3233615" cy="2420888"/>
-          </a:xfrm>
-          <a:prstGeom prst="rect">
-            <a:avLst/>
-          </a:prstGeom>
-          <a:noFill/>
-        </p:spPr>
-      </p:pic>
-      <p:sp>
-        <p:nvSpPr>
-          <p:cNvPr id="6" name="Textfeld 5"/>
-          <p:cNvSpPr txBox="1"/>
-          <p:nvPr/>
-        </p:nvSpPr>
-        <p:spPr>
-          <a:xfrm>
-            <a:off x="251520" y="5373216"/>
-            <a:ext cx="5688632" cy="1077218"/>
-          </a:xfrm>
-          <a:prstGeom prst="rect">
-            <a:avLst/>
-          </a:prstGeom>
-          <a:noFill/>
-          <a:ln>
-            <a:noFill/>
-          </a:ln>
-        </p:spPr>
-        <p:txBody>
-          <a:bodyPr wrap="square" rtlCol="0">
-            <a:spAutoFit/>
-          </a:bodyPr>
-          <a:lstStyle/>
-          <a:p>
-            <a:pPr>
-              <a:buFont typeface="Arial" pitchFamily="34" charset="0"/>
-              <a:buChar char="•"/>
-            </a:pPr>
-            <a:r>
-              <a:rPr lang="de-CH" sz="3200" dirty="0" smtClean="0"/>
-              <a:t>Sprachsignal</a:t>
-            </a:r>
-          </a:p>
-          <a:p>
-            <a:pPr>
-              <a:buFont typeface="Arial" pitchFamily="34" charset="0"/>
-              <a:buChar char="•"/>
-            </a:pPr>
-            <a:r>
-              <a:rPr lang="de-CH" sz="3200" dirty="0" smtClean="0"/>
-              <a:t>u = 0.00008 (klein)</a:t>
-            </a:r>
-            <a:endParaRPr lang="de-CH" sz="3200" dirty="0"/>
-          </a:p>
-        </p:txBody>
-      </p:sp>
+        </p:nvGraphicFramePr>
+        <p:xfrm>
+          <a:off x="2411760" y="4743374"/>
+          <a:ext cx="1584176" cy="701850"/>
+        </p:xfrm>
+        <a:graphic>
+          <a:graphicData uri="http://schemas.openxmlformats.org/presentationml/2006/ole">
+            <mc:AlternateContent xmlns:mc="http://schemas.openxmlformats.org/markup-compatibility/2006">
+              <mc:Choice xmlns:v="urn:schemas-microsoft-com:vml" Requires="v">
+                <p:oleObj spid="_x0000_s4100" name="Formel" r:id="rId3" imgW="1002960" imgH="444240" progId="Equation.3">
+                  <p:embed/>
+                </p:oleObj>
+              </mc:Choice>
+              <mc:Fallback>
+                <p:oleObj name="Formel" r:id="rId3" imgW="1002960" imgH="444240" progId="Equation.3">
+                  <p:embed/>
+                  <p:pic>
+                    <p:nvPicPr>
+                      <p:cNvPr id="0" name=""/>
+                      <p:cNvPicPr>
+                        <a:picLocks noChangeAspect="1" noChangeArrowheads="1"/>
+                      </p:cNvPicPr>
+                      <p:nvPr/>
+                    </p:nvPicPr>
+                    <p:blipFill>
+                      <a:blip r:embed="rId4">
+                        <a:extLst>
+                          <a:ext uri="{28A0092B-C50C-407E-A947-70E740481C1C}">
+                            <a14:useLocalDpi xmlns:a14="http://schemas.microsoft.com/office/drawing/2010/main" val="0"/>
+                          </a:ext>
+                        </a:extLst>
+                      </a:blip>
+                      <a:srcRect/>
+                      <a:stretch>
+                        <a:fillRect/>
+                      </a:stretch>
+                    </p:blipFill>
+                    <p:spPr bwMode="auto">
+                      <a:xfrm>
+                        <a:off x="2411760" y="4743374"/>
+                        <a:ext cx="1584176" cy="701850"/>
+                      </a:xfrm>
+                      <a:prstGeom prst="rect">
+                        <a:avLst/>
+                      </a:prstGeom>
+                      <a:noFill/>
+                      <a:extLst>
+                        <a:ext uri="{909E8E84-426E-40DD-AFC4-6F175D3DCCD1}">
+                          <a14:hiddenFill xmlns:a14="http://schemas.microsoft.com/office/drawing/2010/main">
+                            <a:solidFill>
+                              <a:srgbClr val="FFFFFF"/>
+                            </a:solidFill>
+                          </a14:hiddenFill>
+                        </a:ext>
+                      </a:extLst>
+                    </p:spPr>
+                  </p:pic>
+                </p:oleObj>
+              </mc:Fallback>
+            </mc:AlternateContent>
+          </a:graphicData>
+        </a:graphic>
+      </p:graphicFrame>
     </p:spTree>
+    <p:extLst>
+      <p:ext uri="{BB962C8B-B14F-4D97-AF65-F5344CB8AC3E}">
+        <p14:creationId xmlns:p14="http://schemas.microsoft.com/office/powerpoint/2010/main" val="4255640864"/>
+      </p:ext>
+    </p:extLst>
   </p:cSld>
   <p:clrMapOvr>
     <a:masterClrMapping/>
@@ -3320,69 +3383,41 @@
           <a:p>
             <a:r>
               <a:rPr lang="de-CH" dirty="0" smtClean="0"/>
-              <a:t>Resultate HL</a:t>
+              <a:t>Resultate HL (</a:t>
+            </a:r>
+            <a:r>
+              <a:rPr lang="de-CH" dirty="0" err="1" smtClean="0"/>
+              <a:t>voice</a:t>
+            </a:r>
+            <a:r>
+              <a:rPr lang="de-CH" dirty="0" smtClean="0"/>
+              <a:t>)</a:t>
             </a:r>
             <a:endParaRPr lang="de-CH" dirty="0"/>
-          </a:p>
-        </p:txBody>
-      </p:sp>
-      <p:sp>
-        <p:nvSpPr>
-          <p:cNvPr id="6" name="Textfeld 5"/>
-          <p:cNvSpPr txBox="1"/>
-          <p:nvPr/>
-        </p:nvSpPr>
-        <p:spPr>
-          <a:xfrm>
-            <a:off x="251520" y="5373216"/>
-            <a:ext cx="5688632" cy="1077218"/>
-          </a:xfrm>
-          <a:prstGeom prst="rect">
-            <a:avLst/>
-          </a:prstGeom>
-          <a:noFill/>
-          <a:ln>
-            <a:noFill/>
-          </a:ln>
-        </p:spPr>
-        <p:txBody>
-          <a:bodyPr wrap="square" rtlCol="0">
-            <a:spAutoFit/>
-          </a:bodyPr>
-          <a:lstStyle/>
-          <a:p>
-            <a:pPr>
-              <a:buFont typeface="Arial" pitchFamily="34" charset="0"/>
-              <a:buChar char="•"/>
-            </a:pPr>
-            <a:r>
-              <a:rPr lang="de-CH" sz="3200" dirty="0" smtClean="0"/>
-              <a:t>Sprachsignal</a:t>
-            </a:r>
-          </a:p>
-          <a:p>
-            <a:pPr>
-              <a:buFont typeface="Arial" pitchFamily="34" charset="0"/>
-              <a:buChar char="•"/>
-            </a:pPr>
-            <a:r>
-              <a:rPr lang="de-CH" sz="3200" dirty="0" smtClean="0"/>
-              <a:t>u = 0.008 (gross)</a:t>
-            </a:r>
-            <a:endParaRPr lang="de-CH" sz="3200" dirty="0"/>
           </a:p>
         </p:txBody>
       </p:sp>
       <p:pic>
         <p:nvPicPr>
-          <p:cNvPr id="17410" name="Picture 2" descr="D:\BFH\DSV\EchoCancellation\Präsentation\Konvergenz_u_hoch_0.008.png"/>
+          <p:cNvPr id="3074" name="Picture 2" descr="D:\BFH\DSV\EchoCancellation\Matlab\konvergenz_unstabil_3007-3420.png"/>
           <p:cNvPicPr>
             <a:picLocks noChangeAspect="1" noChangeArrowheads="1"/>
           </p:cNvPicPr>
           <p:nvPr/>
         </p:nvPicPr>
         <p:blipFill>
-          <a:blip r:embed="rId2" cstate="print"/>
+          <a:blip r:embed="rId3" cstate="print">
+            <a:clrChange>
+              <a:clrFrom>
+                <a:srgbClr val="FFFFFF"/>
+              </a:clrFrom>
+              <a:clrTo>
+                <a:srgbClr val="FFFFFF">
+                  <a:alpha val="0"/>
+                </a:srgbClr>
+              </a:clrTo>
+            </a:clrChange>
+          </a:blip>
           <a:srcRect/>
           <a:stretch>
             <a:fillRect/>
@@ -3390,8 +3425,8 @@
         </p:blipFill>
         <p:spPr bwMode="auto">
           <a:xfrm>
-            <a:off x="-324544" y="1196752"/>
-            <a:ext cx="7892800" cy="3960439"/>
+            <a:off x="971600" y="3356992"/>
+            <a:ext cx="7206416" cy="3616026"/>
           </a:xfrm>
           <a:prstGeom prst="rect">
             <a:avLst/>
@@ -3399,33 +3434,141 @@
           <a:noFill/>
         </p:spPr>
       </p:pic>
-      <p:pic>
-        <p:nvPicPr>
-          <p:cNvPr id="17411" name="Picture 3" descr="D:\BFH\DSV\EchoCancellation\Präsentation\Koeffizienten_u_hoch_0.008.png"/>
-          <p:cNvPicPr>
-            <a:picLocks noChangeAspect="1" noChangeArrowheads="1"/>
-          </p:cNvPicPr>
+      <p:sp>
+        <p:nvSpPr>
+          <p:cNvPr id="9" name="Inhaltsplatzhalter 2"/>
+          <p:cNvSpPr>
+            <a:spLocks noGrp="1"/>
+          </p:cNvSpPr>
+          <p:nvPr>
+            <p:ph idx="1"/>
+          </p:nvPr>
+        </p:nvSpPr>
+        <p:spPr>
+          <a:xfrm>
+            <a:off x="467544" y="1340768"/>
+            <a:ext cx="8229600" cy="4525963"/>
+          </a:xfrm>
+        </p:spPr>
+        <p:txBody>
+          <a:bodyPr>
+            <a:normAutofit/>
+          </a:bodyPr>
+          <a:lstStyle/>
+          <a:p>
+            <a:r>
+              <a:rPr lang="de-CH" dirty="0" smtClean="0"/>
+              <a:t>Sprachsignal</a:t>
+            </a:r>
+          </a:p>
+          <a:p>
+            <a:r>
+              <a:rPr lang="de-CH" dirty="0" smtClean="0"/>
+              <a:t>u =                      = 0.1074</a:t>
+            </a:r>
+          </a:p>
+          <a:p>
+            <a:r>
+              <a:rPr lang="de-CH" dirty="0" smtClean="0">
+                <a:sym typeface="Wingdings" pitchFamily="2" charset="2"/>
+              </a:rPr>
+              <a:t>u</a:t>
+            </a:r>
+            <a:r>
+              <a:rPr lang="de-CH" dirty="0" smtClean="0"/>
+              <a:t>nstabil! </a:t>
+            </a:r>
+            <a:r>
+              <a:rPr lang="de-CH" dirty="0" smtClean="0">
+                <a:sym typeface="Wingdings" pitchFamily="2" charset="2"/>
+              </a:rPr>
+              <a:t> die Varianz ist nur quasi-stationär</a:t>
+            </a:r>
+          </a:p>
+          <a:p>
+            <a:r>
+              <a:rPr lang="de-CH" dirty="0" smtClean="0"/>
+              <a:t>Wir haben ermittelt, ab wo das Filter „ausschlägt“:</a:t>
+            </a:r>
+          </a:p>
+        </p:txBody>
+      </p:sp>
+      <p:graphicFrame>
+        <p:nvGraphicFramePr>
+          <p:cNvPr id="3075" name="Object 3"/>
+          <p:cNvGraphicFramePr>
+            <a:graphicFrameLocks noChangeAspect="1"/>
+          </p:cNvGraphicFramePr>
           <p:nvPr/>
-        </p:nvPicPr>
-        <p:blipFill>
-          <a:blip r:embed="rId3" cstate="print"/>
-          <a:srcRect/>
-          <a:stretch>
-            <a:fillRect/>
-          </a:stretch>
-        </p:blipFill>
-        <p:spPr bwMode="auto">
-          <a:xfrm>
-            <a:off x="5868144" y="4432872"/>
-            <a:ext cx="3275856" cy="2452512"/>
-          </a:xfrm>
-          <a:prstGeom prst="rect">
-            <a:avLst/>
-          </a:prstGeom>
-          <a:noFill/>
-        </p:spPr>
-      </p:pic>
+        </p:nvGraphicFramePr>
+        <p:xfrm>
+          <a:off x="1475656" y="1844824"/>
+          <a:ext cx="1909501" cy="845691"/>
+        </p:xfrm>
+        <a:graphic>
+          <a:graphicData uri="http://schemas.openxmlformats.org/presentationml/2006/ole">
+            <mc:AlternateContent xmlns:mc="http://schemas.openxmlformats.org/markup-compatibility/2006">
+              <mc:Choice xmlns:v="urn:schemas-microsoft-com:vml" Requires="v">
+                <p:oleObj spid="_x0000_s5124" name="Formel" r:id="rId4" imgW="1002960" imgH="444240" progId="Equation.3">
+                  <p:embed/>
+                </p:oleObj>
+              </mc:Choice>
+              <mc:Fallback>
+                <p:oleObj name="Formel" r:id="rId4" imgW="1002960" imgH="444240" progId="Equation.3">
+                  <p:embed/>
+                  <p:pic>
+                    <p:nvPicPr>
+                      <p:cNvPr id="0" name=""/>
+                      <p:cNvPicPr>
+                        <a:picLocks noChangeAspect="1" noChangeArrowheads="1"/>
+                      </p:cNvPicPr>
+                      <p:nvPr/>
+                    </p:nvPicPr>
+                    <p:blipFill>
+                      <a:blip r:embed="rId5">
+                        <a:extLst>
+                          <a:ext uri="{28A0092B-C50C-407E-A947-70E740481C1C}">
+                            <a14:useLocalDpi xmlns:a14="http://schemas.microsoft.com/office/drawing/2010/main" val="0"/>
+                          </a:ext>
+                        </a:extLst>
+                      </a:blip>
+                      <a:srcRect/>
+                      <a:stretch>
+                        <a:fillRect/>
+                      </a:stretch>
+                    </p:blipFill>
+                    <p:spPr bwMode="auto">
+                      <a:xfrm>
+                        <a:off x="1475656" y="1844824"/>
+                        <a:ext cx="1909501" cy="845691"/>
+                      </a:xfrm>
+                      <a:prstGeom prst="rect">
+                        <a:avLst/>
+                      </a:prstGeom>
+                      <a:noFill/>
+                      <a:extLst>
+                        <a:ext uri="{909E8E84-426E-40DD-AFC4-6F175D3DCCD1}">
+                          <a14:hiddenFill xmlns:a14="http://schemas.microsoft.com/office/drawing/2010/main">
+                            <a:solidFill>
+                              <a:srgbClr val="FFFFFF"/>
+                            </a:solidFill>
+                          </a14:hiddenFill>
+                        </a:ext>
+                      </a:extLst>
+                    </p:spPr>
+                  </p:pic>
+                </p:oleObj>
+              </mc:Fallback>
+            </mc:AlternateContent>
+          </a:graphicData>
+        </a:graphic>
+      </p:graphicFrame>
     </p:spTree>
+    <p:extLst>
+      <p:ext uri="{BB962C8B-B14F-4D97-AF65-F5344CB8AC3E}">
+        <p14:creationId xmlns:p14="http://schemas.microsoft.com/office/powerpoint/2010/main" val="484890485"/>
+      </p:ext>
+    </p:extLst>
   </p:cSld>
   <p:clrMapOvr>
     <a:masterClrMapping/>
@@ -3474,6 +3617,676 @@
           <a:p>
             <a:r>
               <a:rPr lang="de-CH" dirty="0" smtClean="0"/>
+              <a:t>Resultate HL (</a:t>
+            </a:r>
+            <a:r>
+              <a:rPr lang="de-CH" dirty="0" err="1" smtClean="0"/>
+              <a:t>voice</a:t>
+            </a:r>
+            <a:r>
+              <a:rPr lang="de-CH" dirty="0" smtClean="0"/>
+              <a:t>)</a:t>
+            </a:r>
+            <a:endParaRPr lang="de-CH" dirty="0"/>
+          </a:p>
+        </p:txBody>
+      </p:sp>
+      <p:sp>
+        <p:nvSpPr>
+          <p:cNvPr id="9" name="Inhaltsplatzhalter 2"/>
+          <p:cNvSpPr>
+            <a:spLocks noGrp="1"/>
+          </p:cNvSpPr>
+          <p:nvPr>
+            <p:ph idx="1"/>
+          </p:nvPr>
+        </p:nvSpPr>
+        <p:spPr>
+          <a:xfrm>
+            <a:off x="467544" y="1340768"/>
+            <a:ext cx="8229600" cy="4525963"/>
+          </a:xfrm>
+        </p:spPr>
+        <p:txBody>
+          <a:bodyPr>
+            <a:normAutofit/>
+          </a:bodyPr>
+          <a:lstStyle/>
+          <a:p>
+            <a:r>
+              <a:rPr lang="de-CH" dirty="0" smtClean="0"/>
+              <a:t>Die Varianz dort lokal bestimmt und noch einmal                      ausgerechnet = </a:t>
+            </a:r>
+            <a:r>
+              <a:rPr lang="de-CH" b="1" dirty="0" smtClean="0"/>
+              <a:t>0.0241</a:t>
+            </a:r>
+          </a:p>
+          <a:p>
+            <a:r>
+              <a:rPr lang="de-CH" dirty="0" smtClean="0"/>
+              <a:t>Interessant: Bei empirischem Anpassen des Konvergenzparameters erhielten wir noch bis </a:t>
+            </a:r>
+            <a:r>
+              <a:rPr lang="de-CH" b="1" dirty="0" smtClean="0"/>
+              <a:t>0.0284</a:t>
+            </a:r>
+            <a:r>
+              <a:rPr lang="de-CH" dirty="0" smtClean="0"/>
+              <a:t> stabile Resultate</a:t>
+            </a:r>
+          </a:p>
+          <a:p>
+            <a:r>
+              <a:rPr lang="de-CH" dirty="0" smtClean="0"/>
+              <a:t>Recht nahe beieinander</a:t>
+            </a:r>
+          </a:p>
+          <a:p>
+            <a:r>
+              <a:rPr lang="de-CH" dirty="0" smtClean="0"/>
+              <a:t>Resultat bei stabiler Echo-</a:t>
+            </a:r>
+            <a:r>
+              <a:rPr lang="de-CH" dirty="0" err="1" smtClean="0"/>
+              <a:t>Cancellation</a:t>
+            </a:r>
+            <a:r>
+              <a:rPr lang="de-CH" dirty="0" smtClean="0"/>
+              <a:t>:</a:t>
+            </a:r>
+          </a:p>
+        </p:txBody>
+      </p:sp>
+      <p:graphicFrame>
+        <p:nvGraphicFramePr>
+          <p:cNvPr id="3075" name="Object 3"/>
+          <p:cNvGraphicFramePr>
+            <a:graphicFrameLocks noChangeAspect="1"/>
+          </p:cNvGraphicFramePr>
+          <p:nvPr/>
+        </p:nvGraphicFramePr>
+        <p:xfrm>
+          <a:off x="2123728" y="1772817"/>
+          <a:ext cx="1765485" cy="781908"/>
+        </p:xfrm>
+        <a:graphic>
+          <a:graphicData uri="http://schemas.openxmlformats.org/presentationml/2006/ole">
+            <mc:AlternateContent xmlns:mc="http://schemas.openxmlformats.org/markup-compatibility/2006">
+              <mc:Choice xmlns:v="urn:schemas-microsoft-com:vml" Requires="v">
+                <p:oleObj spid="_x0000_s6148" name="Formel" r:id="rId3" imgW="1002960" imgH="444240" progId="Equation.3">
+                  <p:embed/>
+                </p:oleObj>
+              </mc:Choice>
+              <mc:Fallback>
+                <p:oleObj name="Formel" r:id="rId3" imgW="1002960" imgH="444240" progId="Equation.3">
+                  <p:embed/>
+                  <p:pic>
+                    <p:nvPicPr>
+                      <p:cNvPr id="0" name=""/>
+                      <p:cNvPicPr>
+                        <a:picLocks noChangeAspect="1" noChangeArrowheads="1"/>
+                      </p:cNvPicPr>
+                      <p:nvPr/>
+                    </p:nvPicPr>
+                    <p:blipFill>
+                      <a:blip r:embed="rId4">
+                        <a:extLst>
+                          <a:ext uri="{28A0092B-C50C-407E-A947-70E740481C1C}">
+                            <a14:useLocalDpi xmlns:a14="http://schemas.microsoft.com/office/drawing/2010/main" val="0"/>
+                          </a:ext>
+                        </a:extLst>
+                      </a:blip>
+                      <a:srcRect/>
+                      <a:stretch>
+                        <a:fillRect/>
+                      </a:stretch>
+                    </p:blipFill>
+                    <p:spPr bwMode="auto">
+                      <a:xfrm>
+                        <a:off x="2123728" y="1772817"/>
+                        <a:ext cx="1765485" cy="781908"/>
+                      </a:xfrm>
+                      <a:prstGeom prst="rect">
+                        <a:avLst/>
+                      </a:prstGeom>
+                      <a:noFill/>
+                      <a:extLst>
+                        <a:ext uri="{909E8E84-426E-40DD-AFC4-6F175D3DCCD1}">
+                          <a14:hiddenFill xmlns:a14="http://schemas.microsoft.com/office/drawing/2010/main">
+                            <a:solidFill>
+                              <a:srgbClr val="FFFFFF"/>
+                            </a:solidFill>
+                          </a14:hiddenFill>
+                        </a:ext>
+                      </a:extLst>
+                    </p:spPr>
+                  </p:pic>
+                </p:oleObj>
+              </mc:Fallback>
+            </mc:AlternateContent>
+          </a:graphicData>
+        </a:graphic>
+      </p:graphicFrame>
+    </p:spTree>
+    <p:extLst>
+      <p:ext uri="{BB962C8B-B14F-4D97-AF65-F5344CB8AC3E}">
+        <p14:creationId xmlns:p14="http://schemas.microsoft.com/office/powerpoint/2010/main" val="959315056"/>
+      </p:ext>
+    </p:extLst>
+  </p:cSld>
+  <p:clrMapOvr>
+    <a:masterClrMapping/>
+  </p:clrMapOvr>
+  <p:timing>
+    <p:tnLst>
+      <p:par>
+        <p:cTn id="1" dur="indefinite" restart="never" nodeType="tmRoot"/>
+      </p:par>
+    </p:tnLst>
+  </p:timing>
+</p:sld>
+</file>
+
+<file path=ppt/slides/slide13.xml><?xml version="1.0" encoding="utf-8"?>
+<p:sld xmlns:a="http://schemas.openxmlformats.org/drawingml/2006/main" xmlns:r="http://schemas.openxmlformats.org/officeDocument/2006/relationships" xmlns:p="http://schemas.openxmlformats.org/presentationml/2006/main">
+  <p:cSld>
+    <p:spTree>
+      <p:nvGrpSpPr>
+        <p:cNvPr id="1" name=""/>
+        <p:cNvGrpSpPr/>
+        <p:nvPr/>
+      </p:nvGrpSpPr>
+      <p:grpSpPr>
+        <a:xfrm>
+          <a:off x="0" y="0"/>
+          <a:ext cx="0" cy="0"/>
+          <a:chOff x="0" y="0"/>
+          <a:chExt cx="0" cy="0"/>
+        </a:xfrm>
+      </p:grpSpPr>
+      <p:sp>
+        <p:nvSpPr>
+          <p:cNvPr id="2" name="Titel 1"/>
+          <p:cNvSpPr>
+            <a:spLocks noGrp="1"/>
+          </p:cNvSpPr>
+          <p:nvPr>
+            <p:ph type="title"/>
+          </p:nvPr>
+        </p:nvSpPr>
+        <p:spPr/>
+        <p:txBody>
+          <a:bodyPr/>
+          <a:lstStyle/>
+          <a:p>
+            <a:r>
+              <a:rPr lang="de-CH" dirty="0" smtClean="0"/>
+              <a:t>Resultate HL (</a:t>
+            </a:r>
+            <a:r>
+              <a:rPr lang="de-CH" dirty="0" err="1" smtClean="0"/>
+              <a:t>voice</a:t>
+            </a:r>
+            <a:r>
+              <a:rPr lang="de-CH" dirty="0" smtClean="0"/>
+              <a:t>)</a:t>
+            </a:r>
+            <a:endParaRPr lang="de-CH" dirty="0"/>
+          </a:p>
+        </p:txBody>
+      </p:sp>
+      <p:sp>
+        <p:nvSpPr>
+          <p:cNvPr id="6" name="Textfeld 5"/>
+          <p:cNvSpPr txBox="1"/>
+          <p:nvPr/>
+        </p:nvSpPr>
+        <p:spPr>
+          <a:xfrm>
+            <a:off x="251520" y="5373216"/>
+            <a:ext cx="5688632" cy="1077218"/>
+          </a:xfrm>
+          <a:prstGeom prst="rect">
+            <a:avLst/>
+          </a:prstGeom>
+          <a:noFill/>
+          <a:ln>
+            <a:noFill/>
+          </a:ln>
+        </p:spPr>
+        <p:txBody>
+          <a:bodyPr wrap="square" rtlCol="0">
+            <a:spAutoFit/>
+          </a:bodyPr>
+          <a:lstStyle/>
+          <a:p>
+            <a:pPr>
+              <a:buFont typeface="Arial" pitchFamily="34" charset="0"/>
+              <a:buChar char="•"/>
+            </a:pPr>
+            <a:r>
+              <a:rPr lang="de-CH" sz="3200" dirty="0" smtClean="0"/>
+              <a:t>Sprachsignal</a:t>
+            </a:r>
+          </a:p>
+          <a:p>
+            <a:pPr>
+              <a:buFont typeface="Arial" pitchFamily="34" charset="0"/>
+              <a:buChar char="•"/>
+            </a:pPr>
+            <a:r>
+              <a:rPr lang="de-CH" sz="3200" dirty="0" smtClean="0"/>
+              <a:t>u = 0.0285 (empirisch)</a:t>
+            </a:r>
+            <a:endParaRPr lang="de-CH" sz="3200" dirty="0"/>
+          </a:p>
+        </p:txBody>
+      </p:sp>
+      <p:pic>
+        <p:nvPicPr>
+          <p:cNvPr id="2050" name="Picture 2" descr="D:\BFH\DSV\EchoCancellation\Matlab\konvergenz_stabil.png"/>
+          <p:cNvPicPr>
+            <a:picLocks noChangeAspect="1" noChangeArrowheads="1"/>
+          </p:cNvPicPr>
+          <p:nvPr/>
+        </p:nvPicPr>
+        <p:blipFill>
+          <a:blip r:embed="rId2" cstate="print"/>
+          <a:srcRect/>
+          <a:stretch>
+            <a:fillRect/>
+          </a:stretch>
+        </p:blipFill>
+        <p:spPr bwMode="auto">
+          <a:xfrm>
+            <a:off x="-612576" y="1196752"/>
+            <a:ext cx="7892802" cy="3960440"/>
+          </a:xfrm>
+          <a:prstGeom prst="rect">
+            <a:avLst/>
+          </a:prstGeom>
+          <a:noFill/>
+        </p:spPr>
+      </p:pic>
+      <p:pic>
+        <p:nvPicPr>
+          <p:cNvPr id="2051" name="Picture 3" descr="D:\BFH\DSV\EchoCancellation\Matlab\konvergenz_stabil_end.png"/>
+          <p:cNvPicPr>
+            <a:picLocks noChangeAspect="1" noChangeArrowheads="1"/>
+          </p:cNvPicPr>
+          <p:nvPr/>
+        </p:nvPicPr>
+        <p:blipFill>
+          <a:blip r:embed="rId3" cstate="print">
+            <a:clrChange>
+              <a:clrFrom>
+                <a:srgbClr val="FFFFFF"/>
+              </a:clrFrom>
+              <a:clrTo>
+                <a:srgbClr val="FFFFFF">
+                  <a:alpha val="0"/>
+                </a:srgbClr>
+              </a:clrTo>
+            </a:clrChange>
+          </a:blip>
+          <a:srcRect/>
+          <a:stretch>
+            <a:fillRect/>
+          </a:stretch>
+        </p:blipFill>
+        <p:spPr bwMode="auto">
+          <a:xfrm>
+            <a:off x="5406802" y="4224973"/>
+            <a:ext cx="3773710" cy="2732419"/>
+          </a:xfrm>
+          <a:prstGeom prst="rect">
+            <a:avLst/>
+          </a:prstGeom>
+          <a:noFill/>
+        </p:spPr>
+      </p:pic>
+      <p:pic>
+        <p:nvPicPr>
+          <p:cNvPr id="2052" name="Picture 4" descr="D:\BFH\DSV\EchoCancellation\Matlab\konvergenz_stabil_end_zoom.png"/>
+          <p:cNvPicPr>
+            <a:picLocks noChangeAspect="1" noChangeArrowheads="1"/>
+          </p:cNvPicPr>
+          <p:nvPr/>
+        </p:nvPicPr>
+        <p:blipFill>
+          <a:blip r:embed="rId4" cstate="print"/>
+          <a:srcRect l="36015" t="5454" r="28558" b="3237"/>
+          <a:stretch>
+            <a:fillRect/>
+          </a:stretch>
+        </p:blipFill>
+        <p:spPr bwMode="auto">
+          <a:xfrm>
+            <a:off x="6987396" y="1492370"/>
+            <a:ext cx="2044461" cy="2380890"/>
+          </a:xfrm>
+          <a:prstGeom prst="rect">
+            <a:avLst/>
+          </a:prstGeom>
+          <a:ln>
+            <a:noFill/>
+          </a:ln>
+          <a:effectLst>
+            <a:softEdge rad="112500"/>
+          </a:effectLst>
+        </p:spPr>
+      </p:pic>
+      <p:sp>
+        <p:nvSpPr>
+          <p:cNvPr id="9" name="Ellipse 8"/>
+          <p:cNvSpPr/>
+          <p:nvPr/>
+        </p:nvSpPr>
+        <p:spPr>
+          <a:xfrm>
+            <a:off x="7901620" y="5568988"/>
+            <a:ext cx="288032" cy="1080120"/>
+          </a:xfrm>
+          <a:prstGeom prst="ellipse">
+            <a:avLst/>
+          </a:prstGeom>
+          <a:noFill/>
+        </p:spPr>
+        <p:style>
+          <a:lnRef idx="2">
+            <a:schemeClr val="accent2"/>
+          </a:lnRef>
+          <a:fillRef idx="1">
+            <a:schemeClr val="lt1"/>
+          </a:fillRef>
+          <a:effectRef idx="0">
+            <a:schemeClr val="accent2"/>
+          </a:effectRef>
+          <a:fontRef idx="minor">
+            <a:schemeClr val="dk1"/>
+          </a:fontRef>
+        </p:style>
+        <p:txBody>
+          <a:bodyPr rtlCol="0" anchor="ctr"/>
+          <a:lstStyle/>
+          <a:p>
+            <a:pPr algn="ctr"/>
+            <a:endParaRPr lang="de-CH"/>
+          </a:p>
+        </p:txBody>
+      </p:sp>
+      <p:sp>
+        <p:nvSpPr>
+          <p:cNvPr id="11" name="Ellipse 10"/>
+          <p:cNvSpPr/>
+          <p:nvPr/>
+        </p:nvSpPr>
+        <p:spPr>
+          <a:xfrm>
+            <a:off x="6588224" y="1268760"/>
+            <a:ext cx="2880320" cy="2880320"/>
+          </a:xfrm>
+          <a:prstGeom prst="ellipse">
+            <a:avLst/>
+          </a:prstGeom>
+          <a:noFill/>
+        </p:spPr>
+        <p:style>
+          <a:lnRef idx="2">
+            <a:schemeClr val="accent2"/>
+          </a:lnRef>
+          <a:fillRef idx="1">
+            <a:schemeClr val="lt1"/>
+          </a:fillRef>
+          <a:effectRef idx="0">
+            <a:schemeClr val="accent2"/>
+          </a:effectRef>
+          <a:fontRef idx="minor">
+            <a:schemeClr val="dk1"/>
+          </a:fontRef>
+        </p:style>
+        <p:txBody>
+          <a:bodyPr rtlCol="0" anchor="ctr"/>
+          <a:lstStyle/>
+          <a:p>
+            <a:pPr algn="ctr"/>
+            <a:endParaRPr lang="de-CH"/>
+          </a:p>
+        </p:txBody>
+      </p:sp>
+      <p:cxnSp>
+        <p:nvCxnSpPr>
+          <p:cNvPr id="13" name="Gerade Verbindung mit Pfeil 12"/>
+          <p:cNvCxnSpPr>
+            <a:stCxn id="9" idx="0"/>
+            <a:endCxn id="11" idx="4"/>
+          </p:cNvCxnSpPr>
+          <p:nvPr/>
+        </p:nvCxnSpPr>
+        <p:spPr>
+          <a:xfrm flipH="1" flipV="1">
+            <a:off x="8028384" y="4149080"/>
+            <a:ext cx="17252" cy="1419908"/>
+          </a:xfrm>
+          <a:prstGeom prst="straightConnector1">
+            <a:avLst/>
+          </a:prstGeom>
+          <a:ln w="28575">
+            <a:tailEnd type="arrow"/>
+          </a:ln>
+        </p:spPr>
+        <p:style>
+          <a:lnRef idx="1">
+            <a:schemeClr val="accent2"/>
+          </a:lnRef>
+          <a:fillRef idx="0">
+            <a:schemeClr val="accent2"/>
+          </a:fillRef>
+          <a:effectRef idx="0">
+            <a:schemeClr val="accent2"/>
+          </a:effectRef>
+          <a:fontRef idx="minor">
+            <a:schemeClr val="tx1"/>
+          </a:fontRef>
+        </p:style>
+      </p:cxnSp>
+      <p:sp>
+        <p:nvSpPr>
+          <p:cNvPr id="14" name="Ellipse 13"/>
+          <p:cNvSpPr/>
+          <p:nvPr/>
+        </p:nvSpPr>
+        <p:spPr>
+          <a:xfrm>
+            <a:off x="5750006" y="6335198"/>
+            <a:ext cx="432048" cy="432048"/>
+          </a:xfrm>
+          <a:prstGeom prst="ellipse">
+            <a:avLst/>
+          </a:prstGeom>
+          <a:noFill/>
+        </p:spPr>
+        <p:style>
+          <a:lnRef idx="2">
+            <a:schemeClr val="accent6"/>
+          </a:lnRef>
+          <a:fillRef idx="1">
+            <a:schemeClr val="lt1"/>
+          </a:fillRef>
+          <a:effectRef idx="0">
+            <a:schemeClr val="accent6"/>
+          </a:effectRef>
+          <a:fontRef idx="minor">
+            <a:schemeClr val="dk1"/>
+          </a:fontRef>
+        </p:style>
+        <p:txBody>
+          <a:bodyPr rtlCol="0" anchor="ctr"/>
+          <a:lstStyle/>
+          <a:p>
+            <a:pPr algn="ctr"/>
+            <a:endParaRPr lang="de-CH"/>
+          </a:p>
+        </p:txBody>
+      </p:sp>
+    </p:spTree>
+    <p:extLst>
+      <p:ext uri="{BB962C8B-B14F-4D97-AF65-F5344CB8AC3E}">
+        <p14:creationId xmlns:p14="http://schemas.microsoft.com/office/powerpoint/2010/main" val="3730123226"/>
+      </p:ext>
+    </p:extLst>
+  </p:cSld>
+  <p:clrMapOvr>
+    <a:masterClrMapping/>
+  </p:clrMapOvr>
+  <p:timing>
+    <p:tnLst>
+      <p:par>
+        <p:cTn id="1" dur="indefinite" restart="never" nodeType="tmRoot"/>
+      </p:par>
+    </p:tnLst>
+  </p:timing>
+</p:sld>
+</file>
+
+<file path=ppt/slides/slide14.xml><?xml version="1.0" encoding="utf-8"?>
+<p:sld xmlns:a="http://schemas.openxmlformats.org/drawingml/2006/main" xmlns:r="http://schemas.openxmlformats.org/officeDocument/2006/relationships" xmlns:p="http://schemas.openxmlformats.org/presentationml/2006/main">
+  <p:cSld>
+    <p:spTree>
+      <p:nvGrpSpPr>
+        <p:cNvPr id="1" name=""/>
+        <p:cNvGrpSpPr/>
+        <p:nvPr/>
+      </p:nvGrpSpPr>
+      <p:grpSpPr>
+        <a:xfrm>
+          <a:off x="0" y="0"/>
+          <a:ext cx="0" cy="0"/>
+          <a:chOff x="0" y="0"/>
+          <a:chExt cx="0" cy="0"/>
+        </a:xfrm>
+      </p:grpSpPr>
+      <p:sp>
+        <p:nvSpPr>
+          <p:cNvPr id="2" name="Titel 1"/>
+          <p:cNvSpPr>
+            <a:spLocks noGrp="1"/>
+          </p:cNvSpPr>
+          <p:nvPr>
+            <p:ph type="title"/>
+          </p:nvPr>
+        </p:nvSpPr>
+        <p:spPr/>
+        <p:txBody>
+          <a:bodyPr/>
+          <a:lstStyle/>
+          <a:p>
+            <a:r>
+              <a:rPr lang="de-CH" dirty="0" smtClean="0"/>
+              <a:t>Resultate HL (</a:t>
+            </a:r>
+            <a:r>
+              <a:rPr lang="de-CH" dirty="0" err="1" smtClean="0"/>
+              <a:t>voice</a:t>
+            </a:r>
+            <a:r>
+              <a:rPr lang="de-CH" dirty="0" smtClean="0"/>
+              <a:t>)</a:t>
+            </a:r>
+            <a:endParaRPr lang="de-CH" dirty="0"/>
+          </a:p>
+        </p:txBody>
+      </p:sp>
+      <p:sp>
+        <p:nvSpPr>
+          <p:cNvPr id="9" name="Inhaltsplatzhalter 2"/>
+          <p:cNvSpPr>
+            <a:spLocks noGrp="1"/>
+          </p:cNvSpPr>
+          <p:nvPr>
+            <p:ph idx="1"/>
+          </p:nvPr>
+        </p:nvSpPr>
+        <p:spPr>
+          <a:xfrm>
+            <a:off x="467544" y="1340768"/>
+            <a:ext cx="8229600" cy="4525963"/>
+          </a:xfrm>
+        </p:spPr>
+        <p:txBody>
+          <a:bodyPr>
+            <a:normAutofit/>
+          </a:bodyPr>
+          <a:lstStyle/>
+          <a:p>
+            <a:r>
+              <a:rPr lang="de-CH" dirty="0" smtClean="0"/>
+              <a:t>Leider nur ca. 60% des Echos herausgefiltert</a:t>
+            </a:r>
+          </a:p>
+          <a:p>
+            <a:r>
+              <a:rPr lang="de-CH" dirty="0" smtClean="0"/>
+              <a:t>Relativ schnell: nach 2 Sekunden ist ca. 80% dieser Filterung erreicht</a:t>
+            </a:r>
+          </a:p>
+        </p:txBody>
+      </p:sp>
+    </p:spTree>
+    <p:extLst>
+      <p:ext uri="{BB962C8B-B14F-4D97-AF65-F5344CB8AC3E}">
+        <p14:creationId xmlns:p14="http://schemas.microsoft.com/office/powerpoint/2010/main" val="541257800"/>
+      </p:ext>
+    </p:extLst>
+  </p:cSld>
+  <p:clrMapOvr>
+    <a:masterClrMapping/>
+  </p:clrMapOvr>
+  <p:timing>
+    <p:tnLst>
+      <p:par>
+        <p:cTn id="1" dur="indefinite" restart="never" nodeType="tmRoot"/>
+      </p:par>
+    </p:tnLst>
+  </p:timing>
+</p:sld>
+</file>
+
+<file path=ppt/slides/slide15.xml><?xml version="1.0" encoding="utf-8"?>
+<p:sld xmlns:a="http://schemas.openxmlformats.org/drawingml/2006/main" xmlns:r="http://schemas.openxmlformats.org/officeDocument/2006/relationships" xmlns:p="http://schemas.openxmlformats.org/presentationml/2006/main">
+  <p:cSld>
+    <p:spTree>
+      <p:nvGrpSpPr>
+        <p:cNvPr id="1" name=""/>
+        <p:cNvGrpSpPr/>
+        <p:nvPr/>
+      </p:nvGrpSpPr>
+      <p:grpSpPr>
+        <a:xfrm>
+          <a:off x="0" y="0"/>
+          <a:ext cx="0" cy="0"/>
+          <a:chOff x="0" y="0"/>
+          <a:chExt cx="0" cy="0"/>
+        </a:xfrm>
+      </p:grpSpPr>
+      <p:sp>
+        <p:nvSpPr>
+          <p:cNvPr id="2" name="Titel 1"/>
+          <p:cNvSpPr>
+            <a:spLocks noGrp="1"/>
+          </p:cNvSpPr>
+          <p:nvPr>
+            <p:ph type="title"/>
+          </p:nvPr>
+        </p:nvSpPr>
+        <p:spPr/>
+        <p:txBody>
+          <a:bodyPr/>
+          <a:lstStyle/>
+          <a:p>
+            <a:r>
+              <a:rPr lang="de-CH" dirty="0" smtClean="0"/>
               <a:t>Implementation LL</a:t>
             </a:r>
             <a:endParaRPr lang="en-US" dirty="0"/>
@@ -3549,7 +4362,7 @@
           <a:graphicData uri="http://schemas.openxmlformats.org/presentationml/2006/ole">
             <mc:AlternateContent xmlns:mc="http://schemas.openxmlformats.org/markup-compatibility/2006">
               <mc:Choice xmlns:v="urn:schemas-microsoft-com:vml" Requires="v">
-                <p:oleObj spid="_x0000_s1029" name="Visio" r:id="rId3" imgW="5726008" imgH="1260900" progId="Visio.Drawing.11">
+                <p:oleObj spid="_x0000_s1032" name="Visio" r:id="rId3" imgW="5726008" imgH="1260900" progId="Visio.Drawing.11">
                   <p:embed/>
                 </p:oleObj>
               </mc:Choice>
@@ -3597,7 +4410,7 @@
 </p:sld>
 </file>
 
-<file path=ppt/slides/slide13.xml><?xml version="1.0" encoding="utf-8"?>
+<file path=ppt/slides/slide16.xml><?xml version="1.0" encoding="utf-8"?>
 <p:sld xmlns:a="http://schemas.openxmlformats.org/drawingml/2006/main" xmlns:r="http://schemas.openxmlformats.org/officeDocument/2006/relationships" xmlns:p="http://schemas.openxmlformats.org/presentationml/2006/main">
   <p:cSld>
     <p:spTree>
@@ -3631,7 +4444,7 @@
           <a:p>
             <a:r>
               <a:rPr lang="de-CH" dirty="0" smtClean="0"/>
-              <a:t>Delay</a:t>
+              <a:t>Implementation Delay</a:t>
             </a:r>
             <a:endParaRPr lang="en-US" dirty="0"/>
           </a:p>
@@ -3656,6 +4469,35 @@
               <a:rPr lang="de-CH" dirty="0" smtClean="0"/>
               <a:t>FIR-Filter</a:t>
             </a:r>
+          </a:p>
+          <a:p>
+            <a:r>
+              <a:rPr lang="de-CH" dirty="0" smtClean="0"/>
+              <a:t>Max. 200ms -&gt; N = 1600 mit </a:t>
+            </a:r>
+            <a:r>
+              <a:rPr lang="de-CH" dirty="0" err="1" smtClean="0"/>
+              <a:t>fs</a:t>
+            </a:r>
+            <a:r>
+              <a:rPr lang="de-CH" dirty="0" smtClean="0"/>
+              <a:t> = 8kHz</a:t>
+            </a:r>
+          </a:p>
+          <a:p>
+            <a:r>
+              <a:rPr lang="en-US" dirty="0" smtClean="0"/>
+              <a:t>arm_fir_q15</a:t>
+            </a:r>
+          </a:p>
+          <a:p>
+            <a:r>
+              <a:rPr lang="de-CH" dirty="0" smtClean="0"/>
+              <a:t>funktioniert</a:t>
+            </a:r>
+          </a:p>
+          <a:p>
+            <a:endParaRPr lang="de-CH" dirty="0" smtClean="0"/>
           </a:p>
           <a:p>
             <a:pPr lvl="1"/>
@@ -3667,6 +4509,224 @@
     <p:extLst>
       <p:ext uri="{BB962C8B-B14F-4D97-AF65-F5344CB8AC3E}">
         <p14:creationId xmlns:p14="http://schemas.microsoft.com/office/powerpoint/2010/main" val="786059088"/>
+      </p:ext>
+    </p:extLst>
+  </p:cSld>
+  <p:clrMapOvr>
+    <a:masterClrMapping/>
+  </p:clrMapOvr>
+</p:sld>
+</file>
+
+<file path=ppt/slides/slide17.xml><?xml version="1.0" encoding="utf-8"?>
+<p:sld xmlns:a="http://schemas.openxmlformats.org/drawingml/2006/main" xmlns:r="http://schemas.openxmlformats.org/officeDocument/2006/relationships" xmlns:p="http://schemas.openxmlformats.org/presentationml/2006/main">
+  <p:cSld>
+    <p:spTree>
+      <p:nvGrpSpPr>
+        <p:cNvPr id="1" name=""/>
+        <p:cNvGrpSpPr/>
+        <p:nvPr/>
+      </p:nvGrpSpPr>
+      <p:grpSpPr>
+        <a:xfrm>
+          <a:off x="0" y="0"/>
+          <a:ext cx="0" cy="0"/>
+          <a:chOff x="0" y="0"/>
+          <a:chExt cx="0" cy="0"/>
+        </a:xfrm>
+      </p:grpSpPr>
+      <p:sp>
+        <p:nvSpPr>
+          <p:cNvPr id="2" name="Titel 1"/>
+          <p:cNvSpPr>
+            <a:spLocks noGrp="1"/>
+          </p:cNvSpPr>
+          <p:nvPr>
+            <p:ph type="title"/>
+          </p:nvPr>
+        </p:nvSpPr>
+        <p:spPr/>
+        <p:txBody>
+          <a:bodyPr/>
+          <a:lstStyle/>
+          <a:p>
+            <a:r>
+              <a:rPr lang="de-CH" dirty="0"/>
+              <a:t>Implementation </a:t>
+            </a:r>
+            <a:r>
+              <a:rPr lang="de-CH" dirty="0" smtClean="0"/>
+              <a:t>LMS</a:t>
+            </a:r>
+            <a:endParaRPr lang="en-US" dirty="0"/>
+          </a:p>
+        </p:txBody>
+      </p:sp>
+      <p:sp>
+        <p:nvSpPr>
+          <p:cNvPr id="3" name="Inhaltsplatzhalter 2"/>
+          <p:cNvSpPr>
+            <a:spLocks noGrp="1"/>
+          </p:cNvSpPr>
+          <p:nvPr>
+            <p:ph idx="1"/>
+          </p:nvPr>
+        </p:nvSpPr>
+        <p:spPr/>
+        <p:txBody>
+          <a:bodyPr/>
+          <a:lstStyle/>
+          <a:p>
+            <a:r>
+              <a:rPr lang="de-CH" dirty="0" smtClean="0"/>
+              <a:t>Samplebasiert  (DMA-Blocksize = 1)</a:t>
+            </a:r>
+          </a:p>
+          <a:p>
+            <a:pPr lvl="1"/>
+            <a:r>
+              <a:rPr lang="de-CH" dirty="0" err="1" smtClean="0"/>
+              <a:t>Skalarprodukt</a:t>
+            </a:r>
+            <a:r>
+              <a:rPr lang="de-CH" dirty="0" smtClean="0"/>
+              <a:t> des Eingangs und der Filterkoeffizienten</a:t>
+            </a:r>
+          </a:p>
+          <a:p>
+            <a:pPr lvl="1"/>
+            <a:endParaRPr lang="de-CH" dirty="0"/>
+          </a:p>
+          <a:p>
+            <a:pPr lvl="1"/>
+            <a:endParaRPr lang="de-CH" dirty="0" smtClean="0"/>
+          </a:p>
+          <a:p>
+            <a:r>
+              <a:rPr lang="de-CH" dirty="0" smtClean="0"/>
+              <a:t>Funktioniert nicht</a:t>
+            </a:r>
+            <a:endParaRPr lang="en-US" dirty="0"/>
+          </a:p>
+        </p:txBody>
+      </p:sp>
+      <p:pic>
+        <p:nvPicPr>
+          <p:cNvPr id="7170" name="Picture 2" descr="C:\Users\Marcel\Pictures\Screenpresso\2013-10-30_11h23_34.png"/>
+          <p:cNvPicPr>
+            <a:picLocks noChangeAspect="1" noChangeArrowheads="1"/>
+          </p:cNvPicPr>
+          <p:nvPr/>
+        </p:nvPicPr>
+        <p:blipFill>
+          <a:blip r:embed="rId2">
+            <a:extLst>
+              <a:ext uri="{28A0092B-C50C-407E-A947-70E740481C1C}">
+                <a14:useLocalDpi xmlns:a14="http://schemas.microsoft.com/office/drawing/2010/main" val="0"/>
+              </a:ext>
+            </a:extLst>
+          </a:blip>
+          <a:srcRect/>
+          <a:stretch>
+            <a:fillRect/>
+          </a:stretch>
+        </p:blipFill>
+        <p:spPr bwMode="auto">
+          <a:xfrm>
+            <a:off x="2771800" y="2996952"/>
+            <a:ext cx="3384376" cy="932368"/>
+          </a:xfrm>
+          <a:prstGeom prst="rect">
+            <a:avLst/>
+          </a:prstGeom>
+          <a:noFill/>
+          <a:extLst>
+            <a:ext uri="{909E8E84-426E-40DD-AFC4-6F175D3DCCD1}">
+              <a14:hiddenFill xmlns:a14="http://schemas.microsoft.com/office/drawing/2010/main">
+                <a:solidFill>
+                  <a:srgbClr val="FFFFFF"/>
+                </a:solidFill>
+              </a14:hiddenFill>
+            </a:ext>
+          </a:extLst>
+        </p:spPr>
+      </p:pic>
+    </p:spTree>
+    <p:extLst>
+      <p:ext uri="{BB962C8B-B14F-4D97-AF65-F5344CB8AC3E}">
+        <p14:creationId xmlns:p14="http://schemas.microsoft.com/office/powerpoint/2010/main" val="1889050203"/>
+      </p:ext>
+    </p:extLst>
+  </p:cSld>
+  <p:clrMapOvr>
+    <a:masterClrMapping/>
+  </p:clrMapOvr>
+</p:sld>
+</file>
+
+<file path=ppt/slides/slide18.xml><?xml version="1.0" encoding="utf-8"?>
+<p:sld xmlns:a="http://schemas.openxmlformats.org/drawingml/2006/main" xmlns:r="http://schemas.openxmlformats.org/officeDocument/2006/relationships" xmlns:p="http://schemas.openxmlformats.org/presentationml/2006/main">
+  <p:cSld>
+    <p:spTree>
+      <p:nvGrpSpPr>
+        <p:cNvPr id="1" name=""/>
+        <p:cNvGrpSpPr/>
+        <p:nvPr/>
+      </p:nvGrpSpPr>
+      <p:grpSpPr>
+        <a:xfrm>
+          <a:off x="0" y="0"/>
+          <a:ext cx="0" cy="0"/>
+          <a:chOff x="0" y="0"/>
+          <a:chExt cx="0" cy="0"/>
+        </a:xfrm>
+      </p:grpSpPr>
+      <p:sp>
+        <p:nvSpPr>
+          <p:cNvPr id="2" name="Titel 1"/>
+          <p:cNvSpPr>
+            <a:spLocks noGrp="1"/>
+          </p:cNvSpPr>
+          <p:nvPr>
+            <p:ph type="title"/>
+          </p:nvPr>
+        </p:nvSpPr>
+        <p:spPr/>
+        <p:txBody>
+          <a:bodyPr/>
+          <a:lstStyle/>
+          <a:p>
+            <a:r>
+              <a:rPr lang="de-CH" smtClean="0"/>
+              <a:t>Demonstration </a:t>
+            </a:r>
+            <a:endParaRPr lang="en-US" dirty="0"/>
+          </a:p>
+        </p:txBody>
+      </p:sp>
+      <p:sp>
+        <p:nvSpPr>
+          <p:cNvPr id="3" name="Inhaltsplatzhalter 2"/>
+          <p:cNvSpPr>
+            <a:spLocks noGrp="1"/>
+          </p:cNvSpPr>
+          <p:nvPr>
+            <p:ph idx="1"/>
+          </p:nvPr>
+        </p:nvSpPr>
+        <p:spPr/>
+        <p:txBody>
+          <a:bodyPr/>
+          <a:lstStyle/>
+          <a:p>
+            <a:endParaRPr lang="en-US"/>
+          </a:p>
+        </p:txBody>
+      </p:sp>
+    </p:spTree>
+    <p:extLst>
+      <p:ext uri="{BB962C8B-B14F-4D97-AF65-F5344CB8AC3E}">
+        <p14:creationId xmlns:p14="http://schemas.microsoft.com/office/powerpoint/2010/main" val="3256245483"/>
       </p:ext>
     </p:extLst>
   </p:cSld>
@@ -3757,7 +4817,7 @@
           <a:graphicData uri="http://schemas.openxmlformats.org/presentationml/2006/ole">
             <mc:AlternateContent xmlns:mc="http://schemas.openxmlformats.org/markup-compatibility/2006">
               <mc:Choice xmlns:v="urn:schemas-microsoft-com:vml" Requires="v">
-                <p:oleObj spid="_x0000_s2051" name="Visio" r:id="rId3" imgW="5770040" imgH="1387260" progId="Visio.Drawing.11">
+                <p:oleObj spid="_x0000_s2057" name="Visio" r:id="rId3" imgW="5770040" imgH="1387260" progId="Visio.Drawing.11">
                   <p:embed/>
                 </p:oleObj>
               </mc:Choice>
@@ -3814,7 +4874,7 @@
           <a:graphicData uri="http://schemas.openxmlformats.org/presentationml/2006/ole">
             <mc:AlternateContent xmlns:mc="http://schemas.openxmlformats.org/markup-compatibility/2006">
               <mc:Choice xmlns:v="urn:schemas-microsoft-com:vml" Requires="v">
-                <p:oleObj spid="_x0000_s2052" name="Visio" r:id="rId5" imgW="5706828" imgH="1251450" progId="Visio.Drawing.11">
+                <p:oleObj spid="_x0000_s2058" name="Visio" r:id="rId5" imgW="5706828" imgH="1251450" progId="Visio.Drawing.11">
                   <p:embed/>
                 </p:oleObj>
               </mc:Choice>
@@ -4062,7 +5122,7 @@
         </p:blipFill>
         <p:spPr bwMode="auto">
           <a:xfrm>
-            <a:off x="4174396" y="2956892"/>
+            <a:off x="4246404" y="2956892"/>
             <a:ext cx="4574068" cy="3424436"/>
           </a:xfrm>
           <a:prstGeom prst="rect">
@@ -4143,14 +5203,22 @@
           <a:p>
             <a:r>
               <a:rPr lang="de-CH" dirty="0" smtClean="0"/>
-              <a:t>Adaptives LMS-Filter</a:t>
+              <a:t>Adaptives </a:t>
+            </a:r>
+            <a:r>
+              <a:rPr lang="de-CH" dirty="0" smtClean="0"/>
+              <a:t>LMS-Filter</a:t>
             </a:r>
           </a:p>
           <a:p>
             <a:pPr lvl="1"/>
             <a:r>
               <a:rPr lang="de-CH" dirty="0" smtClean="0"/>
-              <a:t>Das Signal y und das Signal y^ werden nun verglichen und auf das Filter zurückgeführt.</a:t>
+              <a:t>Das </a:t>
+            </a:r>
+            <a:r>
+              <a:rPr lang="de-CH" dirty="0" smtClean="0"/>
+              <a:t>Signal y und das Signal y^ werden nun verglichen und auf das Filter zurückgeführt.</a:t>
             </a:r>
           </a:p>
           <a:p>
@@ -4165,37 +5233,72 @@
             </a:r>
             <a:r>
               <a:rPr lang="de-CH" dirty="0" smtClean="0"/>
-              <a:t> 0 herauskommen:</a:t>
-            </a:r>
-          </a:p>
-        </p:txBody>
-      </p:sp>
-      <p:pic>
-        <p:nvPicPr>
-          <p:cNvPr id="1026" name="Picture 2" descr="D:\BFH\DSV\EchoCancellation\Präsentation\err_Verlauf.png"/>
-          <p:cNvPicPr>
-            <a:picLocks noChangeAspect="1" noChangeArrowheads="1"/>
-          </p:cNvPicPr>
-          <p:nvPr/>
-        </p:nvPicPr>
-        <p:blipFill>
-          <a:blip r:embed="rId2" cstate="print"/>
-          <a:srcRect/>
-          <a:stretch>
-            <a:fillRect/>
-          </a:stretch>
-        </p:blipFill>
-        <p:spPr bwMode="auto">
-          <a:xfrm>
-            <a:off x="2393817" y="4005064"/>
-            <a:ext cx="3618343" cy="2708920"/>
-          </a:xfrm>
-          <a:prstGeom prst="rect">
-            <a:avLst/>
-          </a:prstGeom>
-          <a:noFill/>
-        </p:spPr>
-      </p:pic>
+              <a:t> </a:t>
+            </a:r>
+            <a:r>
+              <a:rPr lang="de-CH" dirty="0" smtClean="0"/>
+              <a:t>0 herauskommen:</a:t>
+            </a:r>
+          </a:p>
+        </p:txBody>
+      </p:sp>
+      <p:graphicFrame>
+        <p:nvGraphicFramePr>
+          <p:cNvPr id="4" name="Objekt 3"/>
+          <p:cNvGraphicFramePr>
+            <a:graphicFrameLocks noChangeAspect="1"/>
+          </p:cNvGraphicFramePr>
+          <p:nvPr>
+            <p:extLst>
+              <p:ext uri="{D42A27DB-BD31-4B8C-83A1-F6EECF244321}">
+                <p14:modId xmlns:p14="http://schemas.microsoft.com/office/powerpoint/2010/main" val="3937119484"/>
+              </p:ext>
+            </p:extLst>
+          </p:nvPr>
+        </p:nvGraphicFramePr>
+        <p:xfrm>
+          <a:off x="1619672" y="4077072"/>
+          <a:ext cx="5844289" cy="2352080"/>
+        </p:xfrm>
+        <a:graphic>
+          <a:graphicData uri="http://schemas.openxmlformats.org/presentationml/2006/ole">
+            <mc:AlternateContent xmlns:mc="http://schemas.openxmlformats.org/markup-compatibility/2006">
+              <mc:Choice xmlns:v="urn:schemas-microsoft-com:vml" Requires="v">
+                <p:oleObj spid="_x0000_s3077" name="Visio" r:id="rId3" imgW="3099775" imgH="1248480" progId="Visio.Drawing.11">
+                  <p:embed/>
+                </p:oleObj>
+              </mc:Choice>
+              <mc:Fallback>
+                <p:oleObj name="Visio" r:id="rId3" imgW="3099775" imgH="1248480" progId="Visio.Drawing.11">
+                  <p:embed/>
+                  <p:pic>
+                    <p:nvPicPr>
+                      <p:cNvPr id="0" name=""/>
+                      <p:cNvPicPr/>
+                      <p:nvPr/>
+                    </p:nvPicPr>
+                    <p:blipFill>
+                      <a:blip r:embed="rId4"/>
+                      <a:stretch>
+                        <a:fillRect/>
+                      </a:stretch>
+                    </p:blipFill>
+                    <p:spPr>
+                      <a:xfrm>
+                        <a:off x="1619672" y="4077072"/>
+                        <a:ext cx="5844289" cy="2352080"/>
+                      </a:xfrm>
+                      <a:prstGeom prst="rect">
+                        <a:avLst/>
+                      </a:prstGeom>
+                    </p:spPr>
+                  </p:pic>
+                </p:oleObj>
+              </mc:Fallback>
+            </mc:AlternateContent>
+          </a:graphicData>
+        </a:graphic>
+      </p:graphicFrame>
     </p:spTree>
   </p:cSld>
   <p:clrMapOvr>
@@ -4470,7 +5573,15 @@
             </a:r>
             <a:r>
               <a:rPr lang="de-CH" dirty="0" smtClean="0"/>
-              <a:t> HL</a:t>
+              <a:t> HL (</a:t>
+            </a:r>
+            <a:r>
+              <a:rPr lang="de-CH" dirty="0" err="1" smtClean="0"/>
+              <a:t>noise</a:t>
+            </a:r>
+            <a:r>
+              <a:rPr lang="de-CH" dirty="0" smtClean="0"/>
+              <a:t>)</a:t>
             </a:r>
             <a:endParaRPr lang="de-CH" dirty="0"/>
           </a:p>
@@ -4532,6 +5643,11 @@
         </p:txBody>
       </p:sp>
     </p:spTree>
+    <p:extLst>
+      <p:ext uri="{BB962C8B-B14F-4D97-AF65-F5344CB8AC3E}">
+        <p14:creationId xmlns:p14="http://schemas.microsoft.com/office/powerpoint/2010/main" val="770896185"/>
+      </p:ext>
+    </p:extLst>
   </p:cSld>
   <p:clrMapOvr>
     <a:masterClrMapping/>
@@ -4580,7 +5696,7 @@
           <a:p>
             <a:r>
               <a:rPr lang="de-CH" dirty="0" smtClean="0"/>
-              <a:t>Resultate HL</a:t>
+              <a:t>Resultate HL (Noise)</a:t>
             </a:r>
             <a:endParaRPr lang="de-CH" dirty="0"/>
           </a:p>
@@ -4686,6 +5802,11 @@
         </p:txBody>
       </p:sp>
     </p:spTree>
+    <p:extLst>
+      <p:ext uri="{BB962C8B-B14F-4D97-AF65-F5344CB8AC3E}">
+        <p14:creationId xmlns:p14="http://schemas.microsoft.com/office/powerpoint/2010/main" val="3796069438"/>
+      </p:ext>
+    </p:extLst>
   </p:cSld>
   <p:clrMapOvr>
     <a:masterClrMapping/>
@@ -4734,7 +5855,7 @@
           <a:p>
             <a:r>
               <a:rPr lang="de-CH" dirty="0" smtClean="0"/>
-              <a:t>Resultate HL</a:t>
+              <a:t>Resultate HL (Noise)</a:t>
             </a:r>
             <a:endParaRPr lang="de-CH" dirty="0"/>
           </a:p>
@@ -4840,6 +5961,11 @@
         </p:spPr>
       </p:pic>
     </p:spTree>
+    <p:extLst>
+      <p:ext uri="{BB962C8B-B14F-4D97-AF65-F5344CB8AC3E}">
+        <p14:creationId xmlns:p14="http://schemas.microsoft.com/office/powerpoint/2010/main" val="408520795"/>
+      </p:ext>
+    </p:extLst>
   </p:cSld>
   <p:clrMapOvr>
     <a:masterClrMapping/>

</xml_diff>

<commit_message>
included sounddemo, ppt finished
</commit_message>
<xml_diff>
--- a/Pr�sentation/Echo Cancellation.pptx
+++ b/Pr�sentation/Echo Cancellation.pptx
@@ -19,10 +19,11 @@
     <p:sldId id="274" r:id="rId13"/>
     <p:sldId id="275" r:id="rId14"/>
     <p:sldId id="276" r:id="rId15"/>
-    <p:sldId id="266" r:id="rId16"/>
-    <p:sldId id="267" r:id="rId17"/>
-    <p:sldId id="277" r:id="rId18"/>
-    <p:sldId id="278" r:id="rId19"/>
+    <p:sldId id="279" r:id="rId16"/>
+    <p:sldId id="266" r:id="rId17"/>
+    <p:sldId id="267" r:id="rId18"/>
+    <p:sldId id="277" r:id="rId19"/>
+    <p:sldId id="278" r:id="rId20"/>
   </p:sldIdLst>
   <p:sldSz cx="9144000" cy="6858000" type="screen4x3"/>
   <p:notesSz cx="6858000" cy="9144000"/>
@@ -3118,7 +3119,26 @@
           <a:bodyPr/>
           <a:lstStyle/>
           <a:p>
-            <a:endParaRPr lang="de-CH"/>
+            <a:r>
+              <a:rPr lang="de-CH" dirty="0" smtClean="0"/>
+              <a:t>Cyril </a:t>
+            </a:r>
+            <a:r>
+              <a:rPr lang="de-CH" dirty="0" err="1" smtClean="0"/>
+              <a:t>Stoller</a:t>
+            </a:r>
+            <a:endParaRPr lang="de-CH" dirty="0" smtClean="0"/>
+          </a:p>
+          <a:p>
+            <a:r>
+              <a:rPr lang="de-CH" dirty="0" smtClean="0"/>
+              <a:t>Marcel </a:t>
+            </a:r>
+            <a:r>
+              <a:rPr lang="de-CH" dirty="0" err="1" smtClean="0"/>
+              <a:t>Bärtschi</a:t>
+            </a:r>
+            <a:endParaRPr lang="de-CH" dirty="0"/>
           </a:p>
         </p:txBody>
       </p:sp>
@@ -3275,7 +3295,7 @@
           <a:graphicData uri="http://schemas.openxmlformats.org/presentationml/2006/ole">
             <mc:AlternateContent xmlns:mc="http://schemas.openxmlformats.org/markup-compatibility/2006">
               <mc:Choice xmlns:v="urn:schemas-microsoft-com:vml" Requires="v">
-                <p:oleObj spid="_x0000_s4100" name="Formel" r:id="rId3" imgW="1002960" imgH="444240" progId="Equation.3">
+                <p:oleObj spid="_x0000_s4103" name="Formel" r:id="rId3" imgW="1002960" imgH="444240" progId="Equation.3">
                   <p:embed/>
                 </p:oleObj>
               </mc:Choice>
@@ -3509,7 +3529,7 @@
           <a:graphicData uri="http://schemas.openxmlformats.org/presentationml/2006/ole">
             <mc:AlternateContent xmlns:mc="http://schemas.openxmlformats.org/markup-compatibility/2006">
               <mc:Choice xmlns:v="urn:schemas-microsoft-com:vml" Requires="v">
-                <p:oleObj spid="_x0000_s5124" name="Formel" r:id="rId4" imgW="1002960" imgH="444240" progId="Equation.3">
+                <p:oleObj spid="_x0000_s5127" name="Formel" r:id="rId4" imgW="1002960" imgH="444240" progId="Equation.3">
                   <p:embed/>
                 </p:oleObj>
               </mc:Choice>
@@ -3714,7 +3734,7 @@
           <a:graphicData uri="http://schemas.openxmlformats.org/presentationml/2006/ole">
             <mc:AlternateContent xmlns:mc="http://schemas.openxmlformats.org/markup-compatibility/2006">
               <mc:Choice xmlns:v="urn:schemas-microsoft-com:vml" Requires="v">
-                <p:oleObj spid="_x0000_s6148" name="Formel" r:id="rId3" imgW="1002960" imgH="444240" progId="Equation.3">
+                <p:oleObj spid="_x0000_s6151" name="Formel" r:id="rId3" imgW="1002960" imgH="444240" progId="Equation.3">
                   <p:embed/>
                 </p:oleObj>
               </mc:Choice>
@@ -4228,7 +4248,11 @@
           <a:p>
             <a:r>
               <a:rPr lang="de-CH" dirty="0" smtClean="0"/>
-              <a:t>Relativ schnell: nach 2 Sekunden ist ca. 80% dieser Filterung erreicht</a:t>
+              <a:t>Relativ schnell: nach 2 Sekunden ist ca. 80% dieser Filterung </a:t>
+            </a:r>
+            <a:r>
+              <a:rPr lang="de-CH" dirty="0" smtClean="0"/>
+              <a:t>erreicht</a:t>
             </a:r>
           </a:p>
         </p:txBody>
@@ -4287,6 +4311,166 @@
           <a:p>
             <a:r>
               <a:rPr lang="de-CH" dirty="0" smtClean="0"/>
+              <a:t>Resultate HL (</a:t>
+            </a:r>
+            <a:r>
+              <a:rPr lang="de-CH" dirty="0" err="1" smtClean="0"/>
+              <a:t>voice</a:t>
+            </a:r>
+            <a:r>
+              <a:rPr lang="de-CH" dirty="0" smtClean="0"/>
+              <a:t>)</a:t>
+            </a:r>
+            <a:endParaRPr lang="de-CH" dirty="0"/>
+          </a:p>
+        </p:txBody>
+      </p:sp>
+      <p:sp>
+        <p:nvSpPr>
+          <p:cNvPr id="9" name="Inhaltsplatzhalter 2"/>
+          <p:cNvSpPr>
+            <a:spLocks noGrp="1"/>
+          </p:cNvSpPr>
+          <p:nvPr>
+            <p:ph idx="1"/>
+          </p:nvPr>
+        </p:nvSpPr>
+        <p:spPr>
+          <a:xfrm>
+            <a:off x="467544" y="1340768"/>
+            <a:ext cx="8229600" cy="4525963"/>
+          </a:xfrm>
+        </p:spPr>
+        <p:txBody>
+          <a:bodyPr>
+            <a:normAutofit/>
+          </a:bodyPr>
+          <a:lstStyle/>
+          <a:p>
+            <a:r>
+              <a:rPr lang="de-CH" dirty="0"/>
+              <a:t>Filter mit richtigem Echo-Signal initialisieren:</a:t>
+            </a:r>
+          </a:p>
+          <a:p>
+            <a:pPr lvl="1"/>
+            <a:r>
+              <a:rPr lang="de-CH" dirty="0"/>
+              <a:t>Bleibt stabil</a:t>
+            </a:r>
+          </a:p>
+          <a:p>
+            <a:pPr lvl="1"/>
+            <a:r>
+              <a:rPr lang="de-CH" dirty="0"/>
+              <a:t>Emulation einer nahezu perfekten echo-</a:t>
+            </a:r>
+            <a:r>
+              <a:rPr lang="de-CH" dirty="0" err="1"/>
+              <a:t>cancellation</a:t>
+            </a:r>
+            <a:r>
+              <a:rPr lang="de-CH" dirty="0"/>
+              <a:t>: [MATLAB DEMONSTRATION]</a:t>
+            </a:r>
+          </a:p>
+        </p:txBody>
+      </p:sp>
+      <p:pic>
+        <p:nvPicPr>
+          <p:cNvPr id="8194" name="Picture 2" descr="C:\Users\Marcel\Documents\5_Semester\DSV\EchoCancellation\Matlab\konvergenz_stabil_w_vordefiniert.png"/>
+          <p:cNvPicPr>
+            <a:picLocks noChangeAspect="1" noChangeArrowheads="1"/>
+          </p:cNvPicPr>
+          <p:nvPr/>
+        </p:nvPicPr>
+        <p:blipFill>
+          <a:blip r:embed="rId2" cstate="print">
+            <a:extLst>
+              <a:ext uri="{28A0092B-C50C-407E-A947-70E740481C1C}">
+                <a14:useLocalDpi xmlns:a14="http://schemas.microsoft.com/office/drawing/2010/main" val="0"/>
+              </a:ext>
+            </a:extLst>
+          </a:blip>
+          <a:srcRect/>
+          <a:stretch>
+            <a:fillRect/>
+          </a:stretch>
+        </p:blipFill>
+        <p:spPr bwMode="auto">
+          <a:xfrm>
+            <a:off x="971600" y="3246311"/>
+            <a:ext cx="7128792" cy="3577384"/>
+          </a:xfrm>
+          <a:prstGeom prst="rect">
+            <a:avLst/>
+          </a:prstGeom>
+          <a:noFill/>
+          <a:extLst>
+            <a:ext uri="{909E8E84-426E-40DD-AFC4-6F175D3DCCD1}">
+              <a14:hiddenFill xmlns:a14="http://schemas.microsoft.com/office/drawing/2010/main">
+                <a:solidFill>
+                  <a:srgbClr val="FFFFFF"/>
+                </a:solidFill>
+              </a14:hiddenFill>
+            </a:ext>
+          </a:extLst>
+        </p:spPr>
+      </p:pic>
+    </p:spTree>
+    <p:extLst>
+      <p:ext uri="{BB962C8B-B14F-4D97-AF65-F5344CB8AC3E}">
+        <p14:creationId xmlns:p14="http://schemas.microsoft.com/office/powerpoint/2010/main" val="1139998434"/>
+      </p:ext>
+    </p:extLst>
+  </p:cSld>
+  <p:clrMapOvr>
+    <a:masterClrMapping/>
+  </p:clrMapOvr>
+  <p:timing>
+    <p:tnLst>
+      <p:par>
+        <p:cTn id="1" dur="indefinite" restart="never" nodeType="tmRoot"/>
+      </p:par>
+    </p:tnLst>
+  </p:timing>
+</p:sld>
+</file>
+
+<file path=ppt/slides/slide16.xml><?xml version="1.0" encoding="utf-8"?>
+<p:sld xmlns:a="http://schemas.openxmlformats.org/drawingml/2006/main" xmlns:r="http://schemas.openxmlformats.org/officeDocument/2006/relationships" xmlns:p="http://schemas.openxmlformats.org/presentationml/2006/main">
+  <p:cSld>
+    <p:spTree>
+      <p:nvGrpSpPr>
+        <p:cNvPr id="1" name=""/>
+        <p:cNvGrpSpPr/>
+        <p:nvPr/>
+      </p:nvGrpSpPr>
+      <p:grpSpPr>
+        <a:xfrm>
+          <a:off x="0" y="0"/>
+          <a:ext cx="0" cy="0"/>
+          <a:chOff x="0" y="0"/>
+          <a:chExt cx="0" cy="0"/>
+        </a:xfrm>
+      </p:grpSpPr>
+      <p:sp>
+        <p:nvSpPr>
+          <p:cNvPr id="2" name="Titel 1"/>
+          <p:cNvSpPr>
+            <a:spLocks noGrp="1"/>
+          </p:cNvSpPr>
+          <p:nvPr>
+            <p:ph type="title"/>
+          </p:nvPr>
+        </p:nvSpPr>
+        <p:spPr/>
+        <p:txBody>
+          <a:bodyPr/>
+          <a:lstStyle/>
+          <a:p>
+            <a:r>
+              <a:rPr lang="de-CH" dirty="0" smtClean="0"/>
               <a:t>Implementation LL</a:t>
             </a:r>
             <a:endParaRPr lang="en-US" dirty="0"/>
@@ -4362,7 +4546,7 @@
           <a:graphicData uri="http://schemas.openxmlformats.org/presentationml/2006/ole">
             <mc:AlternateContent xmlns:mc="http://schemas.openxmlformats.org/markup-compatibility/2006">
               <mc:Choice xmlns:v="urn:schemas-microsoft-com:vml" Requires="v">
-                <p:oleObj spid="_x0000_s1032" name="Visio" r:id="rId3" imgW="5726008" imgH="1260900" progId="Visio.Drawing.11">
+                <p:oleObj spid="_x0000_s1035" name="Visio" r:id="rId3" imgW="5726008" imgH="1260900" progId="Visio.Drawing.11">
                   <p:embed/>
                 </p:oleObj>
               </mc:Choice>
@@ -4407,114 +4591,13 @@
   <p:clrMapOvr>
     <a:masterClrMapping/>
   </p:clrMapOvr>
-</p:sld>
-</file>
-
-<file path=ppt/slides/slide16.xml><?xml version="1.0" encoding="utf-8"?>
-<p:sld xmlns:a="http://schemas.openxmlformats.org/drawingml/2006/main" xmlns:r="http://schemas.openxmlformats.org/officeDocument/2006/relationships" xmlns:p="http://schemas.openxmlformats.org/presentationml/2006/main">
-  <p:cSld>
-    <p:spTree>
-      <p:nvGrpSpPr>
-        <p:cNvPr id="1" name=""/>
-        <p:cNvGrpSpPr/>
-        <p:nvPr/>
-      </p:nvGrpSpPr>
-      <p:grpSpPr>
-        <a:xfrm>
-          <a:off x="0" y="0"/>
-          <a:ext cx="0" cy="0"/>
-          <a:chOff x="0" y="0"/>
-          <a:chExt cx="0" cy="0"/>
-        </a:xfrm>
-      </p:grpSpPr>
-      <p:sp>
-        <p:nvSpPr>
-          <p:cNvPr id="2" name="Titel 1"/>
-          <p:cNvSpPr>
-            <a:spLocks noGrp="1"/>
-          </p:cNvSpPr>
-          <p:nvPr>
-            <p:ph type="title"/>
-          </p:nvPr>
-        </p:nvSpPr>
-        <p:spPr/>
-        <p:txBody>
-          <a:bodyPr/>
-          <a:lstStyle/>
-          <a:p>
-            <a:r>
-              <a:rPr lang="de-CH" dirty="0" smtClean="0"/>
-              <a:t>Implementation Delay</a:t>
-            </a:r>
-            <a:endParaRPr lang="en-US" dirty="0"/>
-          </a:p>
-        </p:txBody>
-      </p:sp>
-      <p:sp>
-        <p:nvSpPr>
-          <p:cNvPr id="3" name="Inhaltsplatzhalter 2"/>
-          <p:cNvSpPr>
-            <a:spLocks noGrp="1"/>
-          </p:cNvSpPr>
-          <p:nvPr>
-            <p:ph idx="1"/>
-          </p:nvPr>
-        </p:nvSpPr>
-        <p:spPr/>
-        <p:txBody>
-          <a:bodyPr/>
-          <a:lstStyle/>
-          <a:p>
-            <a:r>
-              <a:rPr lang="de-CH" dirty="0" smtClean="0"/>
-              <a:t>FIR-Filter</a:t>
-            </a:r>
-          </a:p>
-          <a:p>
-            <a:r>
-              <a:rPr lang="de-CH" dirty="0" smtClean="0"/>
-              <a:t>Max. 200ms -&gt; N = 1600 mit </a:t>
-            </a:r>
-            <a:r>
-              <a:rPr lang="de-CH" dirty="0" err="1" smtClean="0"/>
-              <a:t>fs</a:t>
-            </a:r>
-            <a:r>
-              <a:rPr lang="de-CH" dirty="0" smtClean="0"/>
-              <a:t> = 8kHz</a:t>
-            </a:r>
-          </a:p>
-          <a:p>
-            <a:r>
-              <a:rPr lang="en-US" dirty="0" smtClean="0"/>
-              <a:t>arm_fir_q15</a:t>
-            </a:r>
-          </a:p>
-          <a:p>
-            <a:r>
-              <a:rPr lang="de-CH" dirty="0" smtClean="0"/>
-              <a:t>funktioniert</a:t>
-            </a:r>
-          </a:p>
-          <a:p>
-            <a:endParaRPr lang="de-CH" dirty="0" smtClean="0"/>
-          </a:p>
-          <a:p>
-            <a:pPr lvl="1"/>
-            <a:endParaRPr lang="en-US" dirty="0"/>
-          </a:p>
-        </p:txBody>
-      </p:sp>
-    </p:spTree>
-    <p:extLst>
-      <p:ext uri="{BB962C8B-B14F-4D97-AF65-F5344CB8AC3E}">
-        <p14:creationId xmlns:p14="http://schemas.microsoft.com/office/powerpoint/2010/main" val="786059088"/>
-      </p:ext>
-    </p:extLst>
-  </p:cSld>
-  <p:clrMapOvr>
-    <a:masterClrMapping/>
-  </p:clrMapOvr>
+  <p:timing>
+    <p:tnLst>
+      <p:par>
+        <p:cTn id="1" dur="indefinite" restart="never" nodeType="tmRoot"/>
+      </p:par>
+    </p:tnLst>
+  </p:timing>
 </p:sld>
 </file>
 
@@ -4551,6 +4634,170 @@
           <a:lstStyle/>
           <a:p>
             <a:r>
+              <a:rPr lang="de-CH" dirty="0" smtClean="0"/>
+              <a:t>Implementation Delay</a:t>
+            </a:r>
+            <a:endParaRPr lang="en-US" dirty="0"/>
+          </a:p>
+        </p:txBody>
+      </p:sp>
+      <p:sp>
+        <p:nvSpPr>
+          <p:cNvPr id="3" name="Inhaltsplatzhalter 2"/>
+          <p:cNvSpPr>
+            <a:spLocks noGrp="1"/>
+          </p:cNvSpPr>
+          <p:nvPr>
+            <p:ph idx="1"/>
+          </p:nvPr>
+        </p:nvSpPr>
+        <p:spPr/>
+        <p:txBody>
+          <a:bodyPr/>
+          <a:lstStyle/>
+          <a:p>
+            <a:r>
+              <a:rPr lang="de-CH" dirty="0" smtClean="0"/>
+              <a:t>FIR-Filter (Raum-Simulation, «</a:t>
+            </a:r>
+            <a:r>
+              <a:rPr lang="de-CH" dirty="0" err="1" smtClean="0"/>
+              <a:t>Reverb</a:t>
+            </a:r>
+            <a:r>
+              <a:rPr lang="de-CH" dirty="0" smtClean="0"/>
+              <a:t>»)</a:t>
+            </a:r>
+          </a:p>
+          <a:p>
+            <a:r>
+              <a:rPr lang="de-CH" dirty="0" smtClean="0"/>
+              <a:t>Max. 200ms -&gt; N = 1600 mit </a:t>
+            </a:r>
+            <a:r>
+              <a:rPr lang="de-CH" dirty="0" err="1" smtClean="0"/>
+              <a:t>fs</a:t>
+            </a:r>
+            <a:r>
+              <a:rPr lang="de-CH" dirty="0" smtClean="0"/>
+              <a:t> = 8kHz</a:t>
+            </a:r>
+          </a:p>
+          <a:p>
+            <a:r>
+              <a:rPr lang="en-US" dirty="0" smtClean="0"/>
+              <a:t>arm_fir_q15</a:t>
+            </a:r>
+          </a:p>
+          <a:p>
+            <a:r>
+              <a:rPr lang="de-CH" dirty="0" smtClean="0"/>
+              <a:t>funktioniert!</a:t>
+            </a:r>
+          </a:p>
+          <a:p>
+            <a:endParaRPr lang="de-CH" dirty="0" smtClean="0"/>
+          </a:p>
+          <a:p>
+            <a:pPr lvl="1"/>
+            <a:endParaRPr lang="en-US" dirty="0"/>
+          </a:p>
+        </p:txBody>
+      </p:sp>
+      <p:pic>
+        <p:nvPicPr>
+          <p:cNvPr id="9218" name="Picture 2" descr="C:\Users\Marcel\Documents\5_Semester\DSV\EchoCancellation\Matlab\Echo.png"/>
+          <p:cNvPicPr>
+            <a:picLocks noChangeAspect="1" noChangeArrowheads="1"/>
+          </p:cNvPicPr>
+          <p:nvPr/>
+        </p:nvPicPr>
+        <p:blipFill>
+          <a:blip r:embed="rId2">
+            <a:extLst>
+              <a:ext uri="{28A0092B-C50C-407E-A947-70E740481C1C}">
+                <a14:useLocalDpi xmlns:a14="http://schemas.microsoft.com/office/drawing/2010/main" val="0"/>
+              </a:ext>
+            </a:extLst>
+          </a:blip>
+          <a:srcRect/>
+          <a:stretch>
+            <a:fillRect/>
+          </a:stretch>
+        </p:blipFill>
+        <p:spPr bwMode="auto">
+          <a:xfrm>
+            <a:off x="3203848" y="2780928"/>
+            <a:ext cx="5342858" cy="4000000"/>
+          </a:xfrm>
+          <a:prstGeom prst="rect">
+            <a:avLst/>
+          </a:prstGeom>
+          <a:noFill/>
+          <a:extLst>
+            <a:ext uri="{909E8E84-426E-40DD-AFC4-6F175D3DCCD1}">
+              <a14:hiddenFill xmlns:a14="http://schemas.microsoft.com/office/drawing/2010/main">
+                <a:solidFill>
+                  <a:srgbClr val="FFFFFF"/>
+                </a:solidFill>
+              </a14:hiddenFill>
+            </a:ext>
+          </a:extLst>
+        </p:spPr>
+      </p:pic>
+    </p:spTree>
+    <p:extLst>
+      <p:ext uri="{BB962C8B-B14F-4D97-AF65-F5344CB8AC3E}">
+        <p14:creationId xmlns:p14="http://schemas.microsoft.com/office/powerpoint/2010/main" val="786059088"/>
+      </p:ext>
+    </p:extLst>
+  </p:cSld>
+  <p:clrMapOvr>
+    <a:masterClrMapping/>
+  </p:clrMapOvr>
+  <p:timing>
+    <p:tnLst>
+      <p:par>
+        <p:cTn id="1" dur="indefinite" restart="never" nodeType="tmRoot"/>
+      </p:par>
+    </p:tnLst>
+  </p:timing>
+</p:sld>
+</file>
+
+<file path=ppt/slides/slide18.xml><?xml version="1.0" encoding="utf-8"?>
+<p:sld xmlns:a="http://schemas.openxmlformats.org/drawingml/2006/main" xmlns:r="http://schemas.openxmlformats.org/officeDocument/2006/relationships" xmlns:p="http://schemas.openxmlformats.org/presentationml/2006/main">
+  <p:cSld>
+    <p:spTree>
+      <p:nvGrpSpPr>
+        <p:cNvPr id="1" name=""/>
+        <p:cNvGrpSpPr/>
+        <p:nvPr/>
+      </p:nvGrpSpPr>
+      <p:grpSpPr>
+        <a:xfrm>
+          <a:off x="0" y="0"/>
+          <a:ext cx="0" cy="0"/>
+          <a:chOff x="0" y="0"/>
+          <a:chExt cx="0" cy="0"/>
+        </a:xfrm>
+      </p:grpSpPr>
+      <p:sp>
+        <p:nvSpPr>
+          <p:cNvPr id="2" name="Titel 1"/>
+          <p:cNvSpPr>
+            <a:spLocks noGrp="1"/>
+          </p:cNvSpPr>
+          <p:nvPr>
+            <p:ph type="title"/>
+          </p:nvPr>
+        </p:nvSpPr>
+        <p:spPr/>
+        <p:txBody>
+          <a:bodyPr/>
+          <a:lstStyle/>
+          <a:p>
+            <a:r>
               <a:rPr lang="de-CH" dirty="0"/>
               <a:t>Implementation </a:t>
             </a:r>
@@ -4574,7 +4821,9 @@
         </p:nvSpPr>
         <p:spPr/>
         <p:txBody>
-          <a:bodyPr/>
+          <a:bodyPr>
+            <a:normAutofit lnSpcReduction="10000"/>
+          </a:bodyPr>
           <a:lstStyle/>
           <a:p>
             <a:r>
@@ -4604,8 +4853,37 @@
           <a:p>
             <a:r>
               <a:rPr lang="de-CH" dirty="0" smtClean="0"/>
-              <a:t>Funktioniert nicht</a:t>
-            </a:r>
+              <a:t>Funktioniert noch nicht</a:t>
+            </a:r>
+            <a:r>
+              <a:rPr lang="de-CH" dirty="0"/>
+              <a:t> </a:t>
+            </a:r>
+            <a:r>
+              <a:rPr lang="de-CH" dirty="0" smtClean="0">
+                <a:sym typeface="Wingdings" panose="05000000000000000000" pitchFamily="2" charset="2"/>
+              </a:rPr>
+              <a:t></a:t>
+            </a:r>
+            <a:r>
+              <a:rPr lang="de-CH" dirty="0" smtClean="0"/>
+              <a:t> Zeitmangel</a:t>
+            </a:r>
+          </a:p>
+          <a:p>
+            <a:r>
+              <a:rPr lang="de-CH" dirty="0" smtClean="0"/>
+              <a:t>CMSIS DSP Library enthält bereits eine optimierte LMS-Implementation</a:t>
+            </a:r>
+          </a:p>
+          <a:p>
+            <a:pPr lvl="1"/>
+            <a:r>
+              <a:rPr lang="de-CH" dirty="0" smtClean="0"/>
+              <a:t>Noch nicht getestet</a:t>
+            </a:r>
+          </a:p>
+          <a:p>
             <a:endParaRPr lang="en-US" dirty="0"/>
           </a:p>
         </p:txBody>
@@ -4661,10 +4939,17 @@
   <p:clrMapOvr>
     <a:masterClrMapping/>
   </p:clrMapOvr>
+  <p:timing>
+    <p:tnLst>
+      <p:par>
+        <p:cTn id="1" dur="indefinite" restart="never" nodeType="tmRoot"/>
+      </p:par>
+    </p:tnLst>
+  </p:timing>
 </p:sld>
 </file>
 
-<file path=ppt/slides/slide18.xml><?xml version="1.0" encoding="utf-8"?>
+<file path=ppt/slides/slide19.xml><?xml version="1.0" encoding="utf-8"?>
 <p:sld xmlns:a="http://schemas.openxmlformats.org/drawingml/2006/main" xmlns:r="http://schemas.openxmlformats.org/officeDocument/2006/relationships" xmlns:p="http://schemas.openxmlformats.org/presentationml/2006/main">
   <p:cSld>
     <p:spTree>
@@ -4697,8 +4982,8 @@
           <a:lstStyle/>
           <a:p>
             <a:r>
-              <a:rPr lang="de-CH" smtClean="0"/>
-              <a:t>Demonstration </a:t>
+              <a:rPr lang="de-CH" dirty="0" smtClean="0"/>
+              <a:t>Demonstration</a:t>
             </a:r>
             <a:endParaRPr lang="en-US" dirty="0"/>
           </a:p>
@@ -4719,7 +5004,11 @@
           <a:bodyPr/>
           <a:lstStyle/>
           <a:p>
-            <a:endParaRPr lang="en-US"/>
+            <a:r>
+              <a:rPr lang="de-CH" dirty="0" smtClean="0"/>
+              <a:t>Leider nur Echo-Generierung</a:t>
+            </a:r>
+            <a:endParaRPr lang="en-US" dirty="0"/>
           </a:p>
         </p:txBody>
       </p:sp>
@@ -4733,6 +5022,13 @@
   <p:clrMapOvr>
     <a:masterClrMapping/>
   </p:clrMapOvr>
+  <p:timing>
+    <p:tnLst>
+      <p:par>
+        <p:cTn id="1" dur="indefinite" restart="never" nodeType="tmRoot"/>
+      </p:par>
+    </p:tnLst>
+  </p:timing>
 </p:sld>
 </file>
 
@@ -4817,7 +5113,7 @@
           <a:graphicData uri="http://schemas.openxmlformats.org/presentationml/2006/ole">
             <mc:AlternateContent xmlns:mc="http://schemas.openxmlformats.org/markup-compatibility/2006">
               <mc:Choice xmlns:v="urn:schemas-microsoft-com:vml" Requires="v">
-                <p:oleObj spid="_x0000_s2057" name="Visio" r:id="rId3" imgW="5770040" imgH="1387260" progId="Visio.Drawing.11">
+                <p:oleObj spid="_x0000_s2063" name="Visio" r:id="rId3" imgW="5770040" imgH="1387260" progId="Visio.Drawing.11">
                   <p:embed/>
                 </p:oleObj>
               </mc:Choice>
@@ -4874,7 +5170,7 @@
           <a:graphicData uri="http://schemas.openxmlformats.org/presentationml/2006/ole">
             <mc:AlternateContent xmlns:mc="http://schemas.openxmlformats.org/markup-compatibility/2006">
               <mc:Choice xmlns:v="urn:schemas-microsoft-com:vml" Requires="v">
-                <p:oleObj spid="_x0000_s2058" name="Visio" r:id="rId5" imgW="5706828" imgH="1251450" progId="Visio.Drawing.11">
+                <p:oleObj spid="_x0000_s2064" name="Visio" r:id="rId5" imgW="5706828" imgH="1251450" progId="Visio.Drawing.11">
                   <p:embed/>
                 </p:oleObj>
               </mc:Choice>
@@ -5264,7 +5560,7 @@
           <a:graphicData uri="http://schemas.openxmlformats.org/presentationml/2006/ole">
             <mc:AlternateContent xmlns:mc="http://schemas.openxmlformats.org/markup-compatibility/2006">
               <mc:Choice xmlns:v="urn:schemas-microsoft-com:vml" Requires="v">
-                <p:oleObj spid="_x0000_s3077" name="Visio" r:id="rId3" imgW="3099775" imgH="1248480" progId="Visio.Drawing.11">
+                <p:oleObj spid="_x0000_s3080" name="Visio" r:id="rId3" imgW="3099775" imgH="1248480" progId="Visio.Drawing.11">
                   <p:embed/>
                 </p:oleObj>
               </mc:Choice>

</xml_diff>

<commit_message>
modified m-file for better demonstration purpose, added interpretations in ppt
</commit_message>
<xml_diff>
--- a/Pr�sentation/Echo Cancellation.pptx
+++ b/Pr�sentation/Echo Cancellation.pptx
@@ -6,24 +6,30 @@
   </p:sldMasterIdLst>
   <p:sldIdLst>
     <p:sldId id="256" r:id="rId2"/>
-    <p:sldId id="268" r:id="rId3"/>
-    <p:sldId id="257" r:id="rId4"/>
-    <p:sldId id="263" r:id="rId5"/>
-    <p:sldId id="258" r:id="rId6"/>
-    <p:sldId id="262" r:id="rId7"/>
-    <p:sldId id="269" r:id="rId8"/>
-    <p:sldId id="270" r:id="rId9"/>
-    <p:sldId id="271" r:id="rId10"/>
-    <p:sldId id="272" r:id="rId11"/>
-    <p:sldId id="273" r:id="rId12"/>
-    <p:sldId id="274" r:id="rId13"/>
-    <p:sldId id="275" r:id="rId14"/>
-    <p:sldId id="276" r:id="rId15"/>
-    <p:sldId id="279" r:id="rId16"/>
-    <p:sldId id="266" r:id="rId17"/>
-    <p:sldId id="267" r:id="rId18"/>
-    <p:sldId id="277" r:id="rId19"/>
-    <p:sldId id="278" r:id="rId20"/>
+    <p:sldId id="283" r:id="rId3"/>
+    <p:sldId id="268" r:id="rId4"/>
+    <p:sldId id="257" r:id="rId5"/>
+    <p:sldId id="263" r:id="rId6"/>
+    <p:sldId id="258" r:id="rId7"/>
+    <p:sldId id="262" r:id="rId8"/>
+    <p:sldId id="280" r:id="rId9"/>
+    <p:sldId id="269" r:id="rId10"/>
+    <p:sldId id="270" r:id="rId11"/>
+    <p:sldId id="271" r:id="rId12"/>
+    <p:sldId id="272" r:id="rId13"/>
+    <p:sldId id="273" r:id="rId14"/>
+    <p:sldId id="274" r:id="rId15"/>
+    <p:sldId id="275" r:id="rId16"/>
+    <p:sldId id="276" r:id="rId17"/>
+    <p:sldId id="279" r:id="rId18"/>
+    <p:sldId id="266" r:id="rId19"/>
+    <p:sldId id="267" r:id="rId20"/>
+    <p:sldId id="277" r:id="rId21"/>
+    <p:sldId id="281" r:id="rId22"/>
+    <p:sldId id="284" r:id="rId23"/>
+    <p:sldId id="285" r:id="rId24"/>
+    <p:sldId id="286" r:id="rId25"/>
+    <p:sldId id="278" r:id="rId26"/>
   </p:sldIdLst>
   <p:sldSz cx="9144000" cy="6858000" type="screen4x3"/>
   <p:notesSz cx="6858000" cy="9144000"/>
@@ -307,7 +313,7 @@
             <a:fld id="{F27091F6-B986-4D50-AC85-4EB94450ED44}" type="datetimeFigureOut">
               <a:rPr lang="de-CH" smtClean="0"/>
               <a:pPr/>
-              <a:t>30.10.2013</a:t>
+              <a:t>05.11.2013</a:t>
             </a:fld>
             <a:endParaRPr lang="de-CH"/>
           </a:p>
@@ -474,7 +480,7 @@
             <a:fld id="{F27091F6-B986-4D50-AC85-4EB94450ED44}" type="datetimeFigureOut">
               <a:rPr lang="de-CH" smtClean="0"/>
               <a:pPr/>
-              <a:t>30.10.2013</a:t>
+              <a:t>05.11.2013</a:t>
             </a:fld>
             <a:endParaRPr lang="de-CH"/>
           </a:p>
@@ -651,7 +657,7 @@
             <a:fld id="{F27091F6-B986-4D50-AC85-4EB94450ED44}" type="datetimeFigureOut">
               <a:rPr lang="de-CH" smtClean="0"/>
               <a:pPr/>
-              <a:t>30.10.2013</a:t>
+              <a:t>05.11.2013</a:t>
             </a:fld>
             <a:endParaRPr lang="de-CH"/>
           </a:p>
@@ -818,7 +824,7 @@
             <a:fld id="{F27091F6-B986-4D50-AC85-4EB94450ED44}" type="datetimeFigureOut">
               <a:rPr lang="de-CH" smtClean="0"/>
               <a:pPr/>
-              <a:t>30.10.2013</a:t>
+              <a:t>05.11.2013</a:t>
             </a:fld>
             <a:endParaRPr lang="de-CH"/>
           </a:p>
@@ -1061,7 +1067,7 @@
             <a:fld id="{F27091F6-B986-4D50-AC85-4EB94450ED44}" type="datetimeFigureOut">
               <a:rPr lang="de-CH" smtClean="0"/>
               <a:pPr/>
-              <a:t>30.10.2013</a:t>
+              <a:t>05.11.2013</a:t>
             </a:fld>
             <a:endParaRPr lang="de-CH"/>
           </a:p>
@@ -1346,7 +1352,7 @@
             <a:fld id="{F27091F6-B986-4D50-AC85-4EB94450ED44}" type="datetimeFigureOut">
               <a:rPr lang="de-CH" smtClean="0"/>
               <a:pPr/>
-              <a:t>30.10.2013</a:t>
+              <a:t>05.11.2013</a:t>
             </a:fld>
             <a:endParaRPr lang="de-CH"/>
           </a:p>
@@ -1765,7 +1771,7 @@
             <a:fld id="{F27091F6-B986-4D50-AC85-4EB94450ED44}" type="datetimeFigureOut">
               <a:rPr lang="de-CH" smtClean="0"/>
               <a:pPr/>
-              <a:t>30.10.2013</a:t>
+              <a:t>05.11.2013</a:t>
             </a:fld>
             <a:endParaRPr lang="de-CH"/>
           </a:p>
@@ -1880,7 +1886,7 @@
             <a:fld id="{F27091F6-B986-4D50-AC85-4EB94450ED44}" type="datetimeFigureOut">
               <a:rPr lang="de-CH" smtClean="0"/>
               <a:pPr/>
-              <a:t>30.10.2013</a:t>
+              <a:t>05.11.2013</a:t>
             </a:fld>
             <a:endParaRPr lang="de-CH"/>
           </a:p>
@@ -1972,7 +1978,7 @@
             <a:fld id="{F27091F6-B986-4D50-AC85-4EB94450ED44}" type="datetimeFigureOut">
               <a:rPr lang="de-CH" smtClean="0"/>
               <a:pPr/>
-              <a:t>30.10.2013</a:t>
+              <a:t>05.11.2013</a:t>
             </a:fld>
             <a:endParaRPr lang="de-CH"/>
           </a:p>
@@ -2246,7 +2252,7 @@
             <a:fld id="{F27091F6-B986-4D50-AC85-4EB94450ED44}" type="datetimeFigureOut">
               <a:rPr lang="de-CH" smtClean="0"/>
               <a:pPr/>
-              <a:t>30.10.2013</a:t>
+              <a:t>05.11.2013</a:t>
             </a:fld>
             <a:endParaRPr lang="de-CH"/>
           </a:p>
@@ -2496,7 +2502,7 @@
             <a:fld id="{F27091F6-B986-4D50-AC85-4EB94450ED44}" type="datetimeFigureOut">
               <a:rPr lang="de-CH" smtClean="0"/>
               <a:pPr/>
-              <a:t>30.10.2013</a:t>
+              <a:t>05.11.2013</a:t>
             </a:fld>
             <a:endParaRPr lang="de-CH"/>
           </a:p>
@@ -2706,7 +2712,7 @@
             <a:fld id="{F27091F6-B986-4D50-AC85-4EB94450ED44}" type="datetimeFigureOut">
               <a:rPr lang="de-CH" smtClean="0"/>
               <a:pPr/>
-              <a:t>30.10.2013</a:t>
+              <a:t>05.11.2013</a:t>
             </a:fld>
             <a:endParaRPr lang="de-CH"/>
           </a:p>
@@ -3190,169 +3196,116 @@
           <a:lstStyle/>
           <a:p>
             <a:r>
-              <a:rPr lang="de-CH" dirty="0" err="1" smtClean="0"/>
-              <a:t>Implementation</a:t>
-            </a:r>
-            <a:r>
-              <a:rPr lang="de-CH" dirty="0" smtClean="0"/>
-              <a:t> HL (</a:t>
-            </a:r>
-            <a:r>
-              <a:rPr lang="de-CH" dirty="0" err="1" smtClean="0"/>
-              <a:t>voice</a:t>
-            </a:r>
-            <a:r>
-              <a:rPr lang="de-CH" dirty="0" smtClean="0"/>
-              <a:t>)</a:t>
+              <a:rPr lang="de-CH" dirty="0" smtClean="0"/>
+              <a:t>Resultate HL (Noise)</a:t>
             </a:r>
             <a:endParaRPr lang="de-CH" dirty="0"/>
           </a:p>
         </p:txBody>
       </p:sp>
-      <p:sp>
-        <p:nvSpPr>
-          <p:cNvPr id="3" name="Inhaltsplatzhalter 2"/>
-          <p:cNvSpPr>
-            <a:spLocks noGrp="1"/>
-          </p:cNvSpPr>
-          <p:nvPr>
-            <p:ph idx="1"/>
-          </p:nvPr>
-        </p:nvSpPr>
-        <p:spPr/>
-        <p:txBody>
-          <a:bodyPr>
-            <a:normAutofit/>
+      <p:pic>
+        <p:nvPicPr>
+          <p:cNvPr id="16386" name="Picture 2" descr="D:\BFH\DSV\EchoCancellation\Präsentation\Konvergenz_u_tief_0.00008.png"/>
+          <p:cNvPicPr>
+            <a:picLocks noChangeAspect="1" noChangeArrowheads="1"/>
+          </p:cNvPicPr>
+          <p:nvPr/>
+        </p:nvPicPr>
+        <p:blipFill>
+          <a:blip r:embed="rId2" cstate="print"/>
+          <a:srcRect/>
+          <a:stretch>
+            <a:fillRect/>
+          </a:stretch>
+        </p:blipFill>
+        <p:spPr bwMode="auto">
+          <a:xfrm>
+            <a:off x="-324544" y="1196752"/>
+            <a:ext cx="7920880" cy="3974530"/>
+          </a:xfrm>
+          <a:prstGeom prst="rect">
+            <a:avLst/>
+          </a:prstGeom>
+          <a:noFill/>
+        </p:spPr>
+      </p:pic>
+      <p:pic>
+        <p:nvPicPr>
+          <p:cNvPr id="16387" name="Picture 3" descr="D:\BFH\DSV\EchoCancellation\Präsentation\Koeffizienten_u_tief_0.00008.png"/>
+          <p:cNvPicPr>
+            <a:picLocks noChangeAspect="1" noChangeArrowheads="1"/>
+          </p:cNvPicPr>
+          <p:nvPr/>
+        </p:nvPicPr>
+        <p:blipFill>
+          <a:blip r:embed="rId3" cstate="print"/>
+          <a:srcRect/>
+          <a:stretch>
+            <a:fillRect/>
+          </a:stretch>
+        </p:blipFill>
+        <p:spPr bwMode="auto">
+          <a:xfrm>
+            <a:off x="5874889" y="4437112"/>
+            <a:ext cx="3233615" cy="2420888"/>
+          </a:xfrm>
+          <a:prstGeom prst="rect">
+            <a:avLst/>
+          </a:prstGeom>
+          <a:noFill/>
+        </p:spPr>
+      </p:pic>
+      <p:sp>
+        <p:nvSpPr>
+          <p:cNvPr id="6" name="Textfeld 5"/>
+          <p:cNvSpPr txBox="1"/>
+          <p:nvPr/>
+        </p:nvSpPr>
+        <p:spPr>
+          <a:xfrm>
+            <a:off x="251520" y="5373216"/>
+            <a:ext cx="5688632" cy="1077218"/>
+          </a:xfrm>
+          <a:prstGeom prst="rect">
+            <a:avLst/>
+          </a:prstGeom>
+          <a:noFill/>
+          <a:ln>
+            <a:noFill/>
+          </a:ln>
+        </p:spPr>
+        <p:txBody>
+          <a:bodyPr wrap="square" rtlCol="0">
+            <a:spAutoFit/>
           </a:bodyPr>
           <a:lstStyle/>
           <a:p>
-            <a:r>
-              <a:rPr lang="de-CH" dirty="0" err="1" smtClean="0"/>
-              <a:t>Lorem</a:t>
-            </a:r>
-            <a:r>
-              <a:rPr lang="de-CH" dirty="0" smtClean="0"/>
-              <a:t> </a:t>
-            </a:r>
-            <a:r>
-              <a:rPr lang="de-CH" dirty="0" err="1" smtClean="0"/>
-              <a:t>Ipsum</a:t>
-            </a:r>
-            <a:r>
-              <a:rPr lang="de-CH" dirty="0" smtClean="0"/>
-              <a:t>, 2*5 Sekunden hintereinander</a:t>
-            </a:r>
-          </a:p>
-          <a:p>
-            <a:r>
-              <a:rPr lang="de-CH" dirty="0" smtClean="0"/>
-              <a:t>Echo ist eine Verzögerung um 1470 Samples (200ms bei einer Samplefrequenz von 7350Hz) und Amplitude von 0.4:</a:t>
-            </a:r>
-          </a:p>
-          <a:p>
-            <a:pPr lvl="1"/>
-            <a:r>
-              <a:rPr lang="de-CH" dirty="0" smtClean="0"/>
-              <a:t>g = </a:t>
-            </a:r>
-            <a:r>
-              <a:rPr lang="de-CH" dirty="0" err="1" smtClean="0"/>
-              <a:t>zeros</a:t>
-            </a:r>
-            <a:r>
-              <a:rPr lang="de-CH" dirty="0" smtClean="0"/>
-              <a:t>(2000,1);   g(1) = 1;   g(1600) = 0.4;</a:t>
-            </a:r>
-          </a:p>
-          <a:p>
-            <a:r>
-              <a:rPr lang="de-CH" dirty="0" smtClean="0"/>
-              <a:t>Konvergenzgeschwindigkeit ist abhängig von u</a:t>
-            </a:r>
-          </a:p>
-          <a:p>
-            <a:pPr lvl="1"/>
-            <a:r>
-              <a:rPr lang="de-CH" dirty="0" smtClean="0"/>
-              <a:t>u sollte                     nicht überschreiten</a:t>
-            </a:r>
-          </a:p>
-        </p:txBody>
-      </p:sp>
-      <p:graphicFrame>
-        <p:nvGraphicFramePr>
-          <p:cNvPr id="1028" name="Object 4"/>
-          <p:cNvGraphicFramePr>
-            <a:graphicFrameLocks noChangeAspect="1"/>
-          </p:cNvGraphicFramePr>
-          <p:nvPr/>
-        </p:nvGraphicFramePr>
-        <p:xfrm>
-          <a:off x="2411760" y="4743374"/>
-          <a:ext cx="1584176" cy="701850"/>
-        </p:xfrm>
-        <a:graphic>
-          <a:graphicData uri="http://schemas.openxmlformats.org/presentationml/2006/ole">
-            <mc:AlternateContent xmlns:mc="http://schemas.openxmlformats.org/markup-compatibility/2006">
-              <mc:Choice xmlns:v="urn:schemas-microsoft-com:vml" Requires="v">
-                <p:oleObj spid="_x0000_s4103" name="Formel" r:id="rId3" imgW="1002960" imgH="444240" progId="Equation.3">
-                  <p:embed/>
-                </p:oleObj>
-              </mc:Choice>
-              <mc:Fallback>
-                <p:oleObj name="Formel" r:id="rId3" imgW="1002960" imgH="444240" progId="Equation.3">
-                  <p:embed/>
-                  <p:pic>
-                    <p:nvPicPr>
-                      <p:cNvPr id="0" name=""/>
-                      <p:cNvPicPr>
-                        <a:picLocks noChangeAspect="1" noChangeArrowheads="1"/>
-                      </p:cNvPicPr>
-                      <p:nvPr/>
-                    </p:nvPicPr>
-                    <p:blipFill>
-                      <a:blip r:embed="rId4">
-                        <a:extLst>
-                          <a:ext uri="{28A0092B-C50C-407E-A947-70E740481C1C}">
-                            <a14:useLocalDpi xmlns:a14="http://schemas.microsoft.com/office/drawing/2010/main" val="0"/>
-                          </a:ext>
-                        </a:extLst>
-                      </a:blip>
-                      <a:srcRect/>
-                      <a:stretch>
-                        <a:fillRect/>
-                      </a:stretch>
-                    </p:blipFill>
-                    <p:spPr bwMode="auto">
-                      <a:xfrm>
-                        <a:off x="2411760" y="4743374"/>
-                        <a:ext cx="1584176" cy="701850"/>
-                      </a:xfrm>
-                      <a:prstGeom prst="rect">
-                        <a:avLst/>
-                      </a:prstGeom>
-                      <a:noFill/>
-                      <a:extLst>
-                        <a:ext uri="{909E8E84-426E-40DD-AFC4-6F175D3DCCD1}">
-                          <a14:hiddenFill xmlns:a14="http://schemas.microsoft.com/office/drawing/2010/main">
-                            <a:solidFill>
-                              <a:srgbClr val="FFFFFF"/>
-                            </a:solidFill>
-                          </a14:hiddenFill>
-                        </a:ext>
-                      </a:extLst>
-                    </p:spPr>
-                  </p:pic>
-                </p:oleObj>
-              </mc:Fallback>
-            </mc:AlternateContent>
-          </a:graphicData>
-        </a:graphic>
-      </p:graphicFrame>
+            <a:pPr>
+              <a:buFont typeface="Arial" pitchFamily="34" charset="0"/>
+              <a:buChar char="•"/>
+            </a:pPr>
+            <a:r>
+              <a:rPr lang="de-CH" sz="3200" dirty="0" smtClean="0"/>
+              <a:t>Weisses Rauschen</a:t>
+            </a:r>
+          </a:p>
+          <a:p>
+            <a:pPr>
+              <a:buFont typeface="Arial" pitchFamily="34" charset="0"/>
+              <a:buChar char="•"/>
+            </a:pPr>
+            <a:r>
+              <a:rPr lang="de-CH" sz="3200" dirty="0" smtClean="0"/>
+              <a:t>u = 0.00008 (klein)</a:t>
+            </a:r>
+            <a:endParaRPr lang="de-CH" sz="3200" dirty="0"/>
+          </a:p>
+        </p:txBody>
+      </p:sp>
     </p:spTree>
     <p:extLst>
       <p:ext uri="{BB962C8B-B14F-4D97-AF65-F5344CB8AC3E}">
-        <p14:creationId xmlns:p14="http://schemas.microsoft.com/office/powerpoint/2010/main" val="4255640864"/>
+        <p14:creationId xmlns:p14="http://schemas.microsoft.com/office/powerpoint/2010/main" xmlns="" val="3796069438"/>
       </p:ext>
     </p:extLst>
   </p:cSld>
@@ -3370,6 +3323,327 @@
 </file>
 
 <file path=ppt/slides/slide11.xml><?xml version="1.0" encoding="utf-8"?>
+<p:sld xmlns:a="http://schemas.openxmlformats.org/drawingml/2006/main" xmlns:r="http://schemas.openxmlformats.org/officeDocument/2006/relationships" xmlns:p="http://schemas.openxmlformats.org/presentationml/2006/main">
+  <p:cSld>
+    <p:spTree>
+      <p:nvGrpSpPr>
+        <p:cNvPr id="1" name=""/>
+        <p:cNvGrpSpPr/>
+        <p:nvPr/>
+      </p:nvGrpSpPr>
+      <p:grpSpPr>
+        <a:xfrm>
+          <a:off x="0" y="0"/>
+          <a:ext cx="0" cy="0"/>
+          <a:chOff x="0" y="0"/>
+          <a:chExt cx="0" cy="0"/>
+        </a:xfrm>
+      </p:grpSpPr>
+      <p:sp>
+        <p:nvSpPr>
+          <p:cNvPr id="2" name="Titel 1"/>
+          <p:cNvSpPr>
+            <a:spLocks noGrp="1"/>
+          </p:cNvSpPr>
+          <p:nvPr>
+            <p:ph type="title"/>
+          </p:nvPr>
+        </p:nvSpPr>
+        <p:spPr/>
+        <p:txBody>
+          <a:bodyPr/>
+          <a:lstStyle/>
+          <a:p>
+            <a:r>
+              <a:rPr lang="de-CH" dirty="0" smtClean="0"/>
+              <a:t>Resultate HL (Noise)</a:t>
+            </a:r>
+            <a:endParaRPr lang="de-CH" dirty="0"/>
+          </a:p>
+        </p:txBody>
+      </p:sp>
+      <p:sp>
+        <p:nvSpPr>
+          <p:cNvPr id="6" name="Textfeld 5"/>
+          <p:cNvSpPr txBox="1"/>
+          <p:nvPr/>
+        </p:nvSpPr>
+        <p:spPr>
+          <a:xfrm>
+            <a:off x="251520" y="5373216"/>
+            <a:ext cx="5688632" cy="1077218"/>
+          </a:xfrm>
+          <a:prstGeom prst="rect">
+            <a:avLst/>
+          </a:prstGeom>
+          <a:noFill/>
+          <a:ln>
+            <a:noFill/>
+          </a:ln>
+        </p:spPr>
+        <p:txBody>
+          <a:bodyPr wrap="square" rtlCol="0">
+            <a:spAutoFit/>
+          </a:bodyPr>
+          <a:lstStyle/>
+          <a:p>
+            <a:pPr>
+              <a:buFont typeface="Arial" pitchFamily="34" charset="0"/>
+              <a:buChar char="•"/>
+            </a:pPr>
+            <a:r>
+              <a:rPr lang="de-CH" sz="3200" dirty="0" smtClean="0"/>
+              <a:t>Weisses Rauschen</a:t>
+            </a:r>
+          </a:p>
+          <a:p>
+            <a:pPr>
+              <a:buFont typeface="Arial" pitchFamily="34" charset="0"/>
+              <a:buChar char="•"/>
+            </a:pPr>
+            <a:r>
+              <a:rPr lang="de-CH" sz="3200" dirty="0" smtClean="0"/>
+              <a:t>u = 0.008 (gross)</a:t>
+            </a:r>
+            <a:endParaRPr lang="de-CH" sz="3200" dirty="0"/>
+          </a:p>
+        </p:txBody>
+      </p:sp>
+      <p:pic>
+        <p:nvPicPr>
+          <p:cNvPr id="17410" name="Picture 2" descr="D:\BFH\DSV\EchoCancellation\Präsentation\Konvergenz_u_hoch_0.008.png"/>
+          <p:cNvPicPr>
+            <a:picLocks noChangeAspect="1" noChangeArrowheads="1"/>
+          </p:cNvPicPr>
+          <p:nvPr/>
+        </p:nvPicPr>
+        <p:blipFill>
+          <a:blip r:embed="rId2" cstate="print"/>
+          <a:srcRect/>
+          <a:stretch>
+            <a:fillRect/>
+          </a:stretch>
+        </p:blipFill>
+        <p:spPr bwMode="auto">
+          <a:xfrm>
+            <a:off x="-324544" y="1196752"/>
+            <a:ext cx="7892800" cy="3960439"/>
+          </a:xfrm>
+          <a:prstGeom prst="rect">
+            <a:avLst/>
+          </a:prstGeom>
+          <a:noFill/>
+        </p:spPr>
+      </p:pic>
+      <p:pic>
+        <p:nvPicPr>
+          <p:cNvPr id="17411" name="Picture 3" descr="D:\BFH\DSV\EchoCancellation\Präsentation\Koeffizienten_u_hoch_0.008.png"/>
+          <p:cNvPicPr>
+            <a:picLocks noChangeAspect="1" noChangeArrowheads="1"/>
+          </p:cNvPicPr>
+          <p:nvPr/>
+        </p:nvPicPr>
+        <p:blipFill>
+          <a:blip r:embed="rId3" cstate="print"/>
+          <a:srcRect/>
+          <a:stretch>
+            <a:fillRect/>
+          </a:stretch>
+        </p:blipFill>
+        <p:spPr bwMode="auto">
+          <a:xfrm>
+            <a:off x="5868144" y="4432872"/>
+            <a:ext cx="3275856" cy="2452512"/>
+          </a:xfrm>
+          <a:prstGeom prst="rect">
+            <a:avLst/>
+          </a:prstGeom>
+          <a:noFill/>
+        </p:spPr>
+      </p:pic>
+    </p:spTree>
+    <p:extLst>
+      <p:ext uri="{BB962C8B-B14F-4D97-AF65-F5344CB8AC3E}">
+        <p14:creationId xmlns:p14="http://schemas.microsoft.com/office/powerpoint/2010/main" xmlns="" val="408520795"/>
+      </p:ext>
+    </p:extLst>
+  </p:cSld>
+  <p:clrMapOvr>
+    <a:masterClrMapping/>
+  </p:clrMapOvr>
+  <p:timing>
+    <p:tnLst>
+      <p:par>
+        <p:cTn id="1" dur="indefinite" restart="never" nodeType="tmRoot"/>
+      </p:par>
+    </p:tnLst>
+  </p:timing>
+</p:sld>
+</file>
+
+<file path=ppt/slides/slide12.xml><?xml version="1.0" encoding="utf-8"?>
+<p:sld xmlns:a="http://schemas.openxmlformats.org/drawingml/2006/main" xmlns:r="http://schemas.openxmlformats.org/officeDocument/2006/relationships" xmlns:p="http://schemas.openxmlformats.org/presentationml/2006/main">
+  <p:cSld>
+    <p:spTree>
+      <p:nvGrpSpPr>
+        <p:cNvPr id="1" name=""/>
+        <p:cNvGrpSpPr/>
+        <p:nvPr/>
+      </p:nvGrpSpPr>
+      <p:grpSpPr>
+        <a:xfrm>
+          <a:off x="0" y="0"/>
+          <a:ext cx="0" cy="0"/>
+          <a:chOff x="0" y="0"/>
+          <a:chExt cx="0" cy="0"/>
+        </a:xfrm>
+      </p:grpSpPr>
+      <p:sp>
+        <p:nvSpPr>
+          <p:cNvPr id="2" name="Titel 1"/>
+          <p:cNvSpPr>
+            <a:spLocks noGrp="1"/>
+          </p:cNvSpPr>
+          <p:nvPr>
+            <p:ph type="title"/>
+          </p:nvPr>
+        </p:nvSpPr>
+        <p:spPr/>
+        <p:txBody>
+          <a:bodyPr/>
+          <a:lstStyle/>
+          <a:p>
+            <a:r>
+              <a:rPr lang="de-CH" dirty="0" err="1" smtClean="0"/>
+              <a:t>Implementation</a:t>
+            </a:r>
+            <a:r>
+              <a:rPr lang="de-CH" dirty="0" smtClean="0"/>
+              <a:t> HL (</a:t>
+            </a:r>
+            <a:r>
+              <a:rPr lang="de-CH" dirty="0" err="1" smtClean="0"/>
+              <a:t>voice</a:t>
+            </a:r>
+            <a:r>
+              <a:rPr lang="de-CH" dirty="0" smtClean="0"/>
+              <a:t>)</a:t>
+            </a:r>
+            <a:endParaRPr lang="de-CH" dirty="0"/>
+          </a:p>
+        </p:txBody>
+      </p:sp>
+      <p:sp>
+        <p:nvSpPr>
+          <p:cNvPr id="3" name="Inhaltsplatzhalter 2"/>
+          <p:cNvSpPr>
+            <a:spLocks noGrp="1"/>
+          </p:cNvSpPr>
+          <p:nvPr>
+            <p:ph idx="1"/>
+          </p:nvPr>
+        </p:nvSpPr>
+        <p:spPr/>
+        <p:txBody>
+          <a:bodyPr>
+            <a:normAutofit/>
+          </a:bodyPr>
+          <a:lstStyle/>
+          <a:p>
+            <a:r>
+              <a:rPr lang="de-CH" dirty="0" err="1" smtClean="0"/>
+              <a:t>Lorem</a:t>
+            </a:r>
+            <a:r>
+              <a:rPr lang="de-CH" dirty="0" smtClean="0"/>
+              <a:t> </a:t>
+            </a:r>
+            <a:r>
+              <a:rPr lang="de-CH" dirty="0" err="1" smtClean="0"/>
+              <a:t>Ipsum</a:t>
+            </a:r>
+            <a:r>
+              <a:rPr lang="de-CH" dirty="0" smtClean="0"/>
+              <a:t>, 2*5 Sekunden hintereinander</a:t>
+            </a:r>
+          </a:p>
+          <a:p>
+            <a:r>
+              <a:rPr lang="de-CH" dirty="0" smtClean="0"/>
+              <a:t>Echo ist eine Verzögerung um 1470 Samples (200ms bei einer Samplefrequenz von 7350Hz) und Amplitude von 0.4:</a:t>
+            </a:r>
+          </a:p>
+          <a:p>
+            <a:pPr lvl="1"/>
+            <a:r>
+              <a:rPr lang="de-CH" dirty="0" smtClean="0"/>
+              <a:t>g = </a:t>
+            </a:r>
+            <a:r>
+              <a:rPr lang="de-CH" dirty="0" err="1" smtClean="0"/>
+              <a:t>zeros</a:t>
+            </a:r>
+            <a:r>
+              <a:rPr lang="de-CH" dirty="0" smtClean="0"/>
+              <a:t>(2000,1);   g(1) = 1;   g(1600) = 0.4;</a:t>
+            </a:r>
+          </a:p>
+          <a:p>
+            <a:r>
+              <a:rPr lang="de-CH" dirty="0" smtClean="0"/>
+              <a:t>Konvergenzgeschwindigkeit ist abhängig von u</a:t>
+            </a:r>
+          </a:p>
+          <a:p>
+            <a:pPr lvl="1"/>
+            <a:r>
+              <a:rPr lang="de-CH" dirty="0" smtClean="0"/>
+              <a:t>u sollte                     nicht überschreiten</a:t>
+            </a:r>
+          </a:p>
+        </p:txBody>
+      </p:sp>
+      <p:graphicFrame>
+        <p:nvGraphicFramePr>
+          <p:cNvPr id="1028" name="Object 4"/>
+          <p:cNvGraphicFramePr>
+            <a:graphicFrameLocks noChangeAspect="1"/>
+          </p:cNvGraphicFramePr>
+          <p:nvPr/>
+        </p:nvGraphicFramePr>
+        <p:xfrm>
+          <a:off x="2411760" y="4743374"/>
+          <a:ext cx="1584176" cy="701850"/>
+        </p:xfrm>
+        <a:graphic>
+          <a:graphicData uri="http://schemas.openxmlformats.org/presentationml/2006/ole">
+            <p:oleObj spid="_x0000_s4103" name="Formel" r:id="rId3" imgW="1002865" imgH="444307" progId="Equation.3">
+              <p:embed/>
+            </p:oleObj>
+          </a:graphicData>
+        </a:graphic>
+      </p:graphicFrame>
+    </p:spTree>
+    <p:extLst>
+      <p:ext uri="{BB962C8B-B14F-4D97-AF65-F5344CB8AC3E}">
+        <p14:creationId xmlns:p14="http://schemas.microsoft.com/office/powerpoint/2010/main" xmlns="" val="4255640864"/>
+      </p:ext>
+    </p:extLst>
+  </p:cSld>
+  <p:clrMapOvr>
+    <a:masterClrMapping/>
+  </p:clrMapOvr>
+  <p:timing>
+    <p:tnLst>
+      <p:par>
+        <p:cTn id="1" dur="indefinite" restart="never" nodeType="tmRoot"/>
+      </p:par>
+    </p:tnLst>
+  </p:timing>
+</p:sld>
+</file>
+
+<file path=ppt/slides/slide13.xml><?xml version="1.0" encoding="utf-8"?>
 <p:sld xmlns:a="http://schemas.openxmlformats.org/drawingml/2006/main" xmlns:r="http://schemas.openxmlformats.org/officeDocument/2006/relationships" xmlns:p="http://schemas.openxmlformats.org/presentationml/2006/main">
   <p:cSld>
     <p:spTree>
@@ -3527,66 +3801,16 @@
         </p:xfrm>
         <a:graphic>
           <a:graphicData uri="http://schemas.openxmlformats.org/presentationml/2006/ole">
-            <mc:AlternateContent xmlns:mc="http://schemas.openxmlformats.org/markup-compatibility/2006">
-              <mc:Choice xmlns:v="urn:schemas-microsoft-com:vml" Requires="v">
-                <p:oleObj spid="_x0000_s5127" name="Formel" r:id="rId4" imgW="1002960" imgH="444240" progId="Equation.3">
-                  <p:embed/>
-                </p:oleObj>
-              </mc:Choice>
-              <mc:Fallback>
-                <p:oleObj name="Formel" r:id="rId4" imgW="1002960" imgH="444240" progId="Equation.3">
-                  <p:embed/>
-                  <p:pic>
-                    <p:nvPicPr>
-                      <p:cNvPr id="0" name=""/>
-                      <p:cNvPicPr>
-                        <a:picLocks noChangeAspect="1" noChangeArrowheads="1"/>
-                      </p:cNvPicPr>
-                      <p:nvPr/>
-                    </p:nvPicPr>
-                    <p:blipFill>
-                      <a:blip r:embed="rId5">
-                        <a:extLst>
-                          <a:ext uri="{28A0092B-C50C-407E-A947-70E740481C1C}">
-                            <a14:useLocalDpi xmlns:a14="http://schemas.microsoft.com/office/drawing/2010/main" val="0"/>
-                          </a:ext>
-                        </a:extLst>
-                      </a:blip>
-                      <a:srcRect/>
-                      <a:stretch>
-                        <a:fillRect/>
-                      </a:stretch>
-                    </p:blipFill>
-                    <p:spPr bwMode="auto">
-                      <a:xfrm>
-                        <a:off x="1475656" y="1844824"/>
-                        <a:ext cx="1909501" cy="845691"/>
-                      </a:xfrm>
-                      <a:prstGeom prst="rect">
-                        <a:avLst/>
-                      </a:prstGeom>
-                      <a:noFill/>
-                      <a:extLst>
-                        <a:ext uri="{909E8E84-426E-40DD-AFC4-6F175D3DCCD1}">
-                          <a14:hiddenFill xmlns:a14="http://schemas.microsoft.com/office/drawing/2010/main">
-                            <a:solidFill>
-                              <a:srgbClr val="FFFFFF"/>
-                            </a:solidFill>
-                          </a14:hiddenFill>
-                        </a:ext>
-                      </a:extLst>
-                    </p:spPr>
-                  </p:pic>
-                </p:oleObj>
-              </mc:Fallback>
-            </mc:AlternateContent>
+            <p:oleObj spid="_x0000_s5127" name="Formel" r:id="rId4" imgW="1002865" imgH="444307" progId="Equation.3">
+              <p:embed/>
+            </p:oleObj>
           </a:graphicData>
         </a:graphic>
       </p:graphicFrame>
     </p:spTree>
     <p:extLst>
       <p:ext uri="{BB962C8B-B14F-4D97-AF65-F5344CB8AC3E}">
-        <p14:creationId xmlns:p14="http://schemas.microsoft.com/office/powerpoint/2010/main" val="484890485"/>
+        <p14:creationId xmlns:p14="http://schemas.microsoft.com/office/powerpoint/2010/main" xmlns="" val="484890485"/>
       </p:ext>
     </p:extLst>
   </p:cSld>
@@ -3603,7 +3827,7 @@
 </p:sld>
 </file>
 
-<file path=ppt/slides/slide12.xml><?xml version="1.0" encoding="utf-8"?>
+<file path=ppt/slides/slide14.xml><?xml version="1.0" encoding="utf-8"?>
 <p:sld xmlns:a="http://schemas.openxmlformats.org/drawingml/2006/main" xmlns:r="http://schemas.openxmlformats.org/officeDocument/2006/relationships" xmlns:p="http://schemas.openxmlformats.org/presentationml/2006/main">
   <p:cSld>
     <p:spTree>
@@ -3732,66 +3956,16 @@
         </p:xfrm>
         <a:graphic>
           <a:graphicData uri="http://schemas.openxmlformats.org/presentationml/2006/ole">
-            <mc:AlternateContent xmlns:mc="http://schemas.openxmlformats.org/markup-compatibility/2006">
-              <mc:Choice xmlns:v="urn:schemas-microsoft-com:vml" Requires="v">
-                <p:oleObj spid="_x0000_s6151" name="Formel" r:id="rId3" imgW="1002960" imgH="444240" progId="Equation.3">
-                  <p:embed/>
-                </p:oleObj>
-              </mc:Choice>
-              <mc:Fallback>
-                <p:oleObj name="Formel" r:id="rId3" imgW="1002960" imgH="444240" progId="Equation.3">
-                  <p:embed/>
-                  <p:pic>
-                    <p:nvPicPr>
-                      <p:cNvPr id="0" name=""/>
-                      <p:cNvPicPr>
-                        <a:picLocks noChangeAspect="1" noChangeArrowheads="1"/>
-                      </p:cNvPicPr>
-                      <p:nvPr/>
-                    </p:nvPicPr>
-                    <p:blipFill>
-                      <a:blip r:embed="rId4">
-                        <a:extLst>
-                          <a:ext uri="{28A0092B-C50C-407E-A947-70E740481C1C}">
-                            <a14:useLocalDpi xmlns:a14="http://schemas.microsoft.com/office/drawing/2010/main" val="0"/>
-                          </a:ext>
-                        </a:extLst>
-                      </a:blip>
-                      <a:srcRect/>
-                      <a:stretch>
-                        <a:fillRect/>
-                      </a:stretch>
-                    </p:blipFill>
-                    <p:spPr bwMode="auto">
-                      <a:xfrm>
-                        <a:off x="2123728" y="1772817"/>
-                        <a:ext cx="1765485" cy="781908"/>
-                      </a:xfrm>
-                      <a:prstGeom prst="rect">
-                        <a:avLst/>
-                      </a:prstGeom>
-                      <a:noFill/>
-                      <a:extLst>
-                        <a:ext uri="{909E8E84-426E-40DD-AFC4-6F175D3DCCD1}">
-                          <a14:hiddenFill xmlns:a14="http://schemas.microsoft.com/office/drawing/2010/main">
-                            <a:solidFill>
-                              <a:srgbClr val="FFFFFF"/>
-                            </a:solidFill>
-                          </a14:hiddenFill>
-                        </a:ext>
-                      </a:extLst>
-                    </p:spPr>
-                  </p:pic>
-                </p:oleObj>
-              </mc:Fallback>
-            </mc:AlternateContent>
+            <p:oleObj spid="_x0000_s6151" name="Formel" r:id="rId3" imgW="1002865" imgH="444307" progId="Equation.3">
+              <p:embed/>
+            </p:oleObj>
           </a:graphicData>
         </a:graphic>
       </p:graphicFrame>
     </p:spTree>
     <p:extLst>
       <p:ext uri="{BB962C8B-B14F-4D97-AF65-F5344CB8AC3E}">
-        <p14:creationId xmlns:p14="http://schemas.microsoft.com/office/powerpoint/2010/main" val="959315056"/>
+        <p14:creationId xmlns:p14="http://schemas.microsoft.com/office/powerpoint/2010/main" xmlns="" val="959315056"/>
       </p:ext>
     </p:extLst>
   </p:cSld>
@@ -3808,7 +3982,7 @@
 </p:sld>
 </file>
 
-<file path=ppt/slides/slide13.xml><?xml version="1.0" encoding="utf-8"?>
+<file path=ppt/slides/slide15.xml><?xml version="1.0" encoding="utf-8"?>
 <p:sld xmlns:a="http://schemas.openxmlformats.org/drawingml/2006/main" xmlns:r="http://schemas.openxmlformats.org/officeDocument/2006/relationships" xmlns:p="http://schemas.openxmlformats.org/presentationml/2006/main">
   <p:cSld>
     <p:spTree>
@@ -4153,274 +4327,7 @@
     </p:spTree>
     <p:extLst>
       <p:ext uri="{BB962C8B-B14F-4D97-AF65-F5344CB8AC3E}">
-        <p14:creationId xmlns:p14="http://schemas.microsoft.com/office/powerpoint/2010/main" val="3730123226"/>
-      </p:ext>
-    </p:extLst>
-  </p:cSld>
-  <p:clrMapOvr>
-    <a:masterClrMapping/>
-  </p:clrMapOvr>
-  <p:timing>
-    <p:tnLst>
-      <p:par>
-        <p:cTn id="1" dur="indefinite" restart="never" nodeType="tmRoot"/>
-      </p:par>
-    </p:tnLst>
-  </p:timing>
-</p:sld>
-</file>
-
-<file path=ppt/slides/slide14.xml><?xml version="1.0" encoding="utf-8"?>
-<p:sld xmlns:a="http://schemas.openxmlformats.org/drawingml/2006/main" xmlns:r="http://schemas.openxmlformats.org/officeDocument/2006/relationships" xmlns:p="http://schemas.openxmlformats.org/presentationml/2006/main">
-  <p:cSld>
-    <p:spTree>
-      <p:nvGrpSpPr>
-        <p:cNvPr id="1" name=""/>
-        <p:cNvGrpSpPr/>
-        <p:nvPr/>
-      </p:nvGrpSpPr>
-      <p:grpSpPr>
-        <a:xfrm>
-          <a:off x="0" y="0"/>
-          <a:ext cx="0" cy="0"/>
-          <a:chOff x="0" y="0"/>
-          <a:chExt cx="0" cy="0"/>
-        </a:xfrm>
-      </p:grpSpPr>
-      <p:sp>
-        <p:nvSpPr>
-          <p:cNvPr id="2" name="Titel 1"/>
-          <p:cNvSpPr>
-            <a:spLocks noGrp="1"/>
-          </p:cNvSpPr>
-          <p:nvPr>
-            <p:ph type="title"/>
-          </p:nvPr>
-        </p:nvSpPr>
-        <p:spPr/>
-        <p:txBody>
-          <a:bodyPr/>
-          <a:lstStyle/>
-          <a:p>
-            <a:r>
-              <a:rPr lang="de-CH" dirty="0" smtClean="0"/>
-              <a:t>Resultate HL (</a:t>
-            </a:r>
-            <a:r>
-              <a:rPr lang="de-CH" dirty="0" err="1" smtClean="0"/>
-              <a:t>voice</a:t>
-            </a:r>
-            <a:r>
-              <a:rPr lang="de-CH" dirty="0" smtClean="0"/>
-              <a:t>)</a:t>
-            </a:r>
-            <a:endParaRPr lang="de-CH" dirty="0"/>
-          </a:p>
-        </p:txBody>
-      </p:sp>
-      <p:sp>
-        <p:nvSpPr>
-          <p:cNvPr id="9" name="Inhaltsplatzhalter 2"/>
-          <p:cNvSpPr>
-            <a:spLocks noGrp="1"/>
-          </p:cNvSpPr>
-          <p:nvPr>
-            <p:ph idx="1"/>
-          </p:nvPr>
-        </p:nvSpPr>
-        <p:spPr>
-          <a:xfrm>
-            <a:off x="467544" y="1340768"/>
-            <a:ext cx="8229600" cy="4525963"/>
-          </a:xfrm>
-        </p:spPr>
-        <p:txBody>
-          <a:bodyPr>
-            <a:normAutofit/>
-          </a:bodyPr>
-          <a:lstStyle/>
-          <a:p>
-            <a:r>
-              <a:rPr lang="de-CH" dirty="0" smtClean="0"/>
-              <a:t>Leider nur ca. 60% des Echos herausgefiltert</a:t>
-            </a:r>
-          </a:p>
-          <a:p>
-            <a:r>
-              <a:rPr lang="de-CH" dirty="0" smtClean="0"/>
-              <a:t>Relativ schnell: nach 2 Sekunden ist ca. 80% dieser Filterung </a:t>
-            </a:r>
-            <a:r>
-              <a:rPr lang="de-CH" dirty="0" smtClean="0"/>
-              <a:t>erreicht</a:t>
-            </a:r>
-          </a:p>
-        </p:txBody>
-      </p:sp>
-    </p:spTree>
-    <p:extLst>
-      <p:ext uri="{BB962C8B-B14F-4D97-AF65-F5344CB8AC3E}">
-        <p14:creationId xmlns:p14="http://schemas.microsoft.com/office/powerpoint/2010/main" val="541257800"/>
-      </p:ext>
-    </p:extLst>
-  </p:cSld>
-  <p:clrMapOvr>
-    <a:masterClrMapping/>
-  </p:clrMapOvr>
-  <p:timing>
-    <p:tnLst>
-      <p:par>
-        <p:cTn id="1" dur="indefinite" restart="never" nodeType="tmRoot"/>
-      </p:par>
-    </p:tnLst>
-  </p:timing>
-</p:sld>
-</file>
-
-<file path=ppt/slides/slide15.xml><?xml version="1.0" encoding="utf-8"?>
-<p:sld xmlns:a="http://schemas.openxmlformats.org/drawingml/2006/main" xmlns:r="http://schemas.openxmlformats.org/officeDocument/2006/relationships" xmlns:p="http://schemas.openxmlformats.org/presentationml/2006/main">
-  <p:cSld>
-    <p:spTree>
-      <p:nvGrpSpPr>
-        <p:cNvPr id="1" name=""/>
-        <p:cNvGrpSpPr/>
-        <p:nvPr/>
-      </p:nvGrpSpPr>
-      <p:grpSpPr>
-        <a:xfrm>
-          <a:off x="0" y="0"/>
-          <a:ext cx="0" cy="0"/>
-          <a:chOff x="0" y="0"/>
-          <a:chExt cx="0" cy="0"/>
-        </a:xfrm>
-      </p:grpSpPr>
-      <p:sp>
-        <p:nvSpPr>
-          <p:cNvPr id="2" name="Titel 1"/>
-          <p:cNvSpPr>
-            <a:spLocks noGrp="1"/>
-          </p:cNvSpPr>
-          <p:nvPr>
-            <p:ph type="title"/>
-          </p:nvPr>
-        </p:nvSpPr>
-        <p:spPr/>
-        <p:txBody>
-          <a:bodyPr/>
-          <a:lstStyle/>
-          <a:p>
-            <a:r>
-              <a:rPr lang="de-CH" dirty="0" smtClean="0"/>
-              <a:t>Resultate HL (</a:t>
-            </a:r>
-            <a:r>
-              <a:rPr lang="de-CH" dirty="0" err="1" smtClean="0"/>
-              <a:t>voice</a:t>
-            </a:r>
-            <a:r>
-              <a:rPr lang="de-CH" dirty="0" smtClean="0"/>
-              <a:t>)</a:t>
-            </a:r>
-            <a:endParaRPr lang="de-CH" dirty="0"/>
-          </a:p>
-        </p:txBody>
-      </p:sp>
-      <p:sp>
-        <p:nvSpPr>
-          <p:cNvPr id="9" name="Inhaltsplatzhalter 2"/>
-          <p:cNvSpPr>
-            <a:spLocks noGrp="1"/>
-          </p:cNvSpPr>
-          <p:nvPr>
-            <p:ph idx="1"/>
-          </p:nvPr>
-        </p:nvSpPr>
-        <p:spPr>
-          <a:xfrm>
-            <a:off x="467544" y="1340768"/>
-            <a:ext cx="8229600" cy="4525963"/>
-          </a:xfrm>
-        </p:spPr>
-        <p:txBody>
-          <a:bodyPr>
-            <a:normAutofit/>
-          </a:bodyPr>
-          <a:lstStyle/>
-          <a:p>
-            <a:r>
-              <a:rPr lang="de-CH" dirty="0"/>
-              <a:t>Filter mit richtigem Echo-Signal initialisieren:</a:t>
-            </a:r>
-          </a:p>
-          <a:p>
-            <a:pPr lvl="1"/>
-            <a:r>
-              <a:rPr lang="de-CH" dirty="0"/>
-              <a:t>Bleibt stabil</a:t>
-            </a:r>
-          </a:p>
-          <a:p>
-            <a:pPr lvl="1"/>
-            <a:r>
-              <a:rPr lang="de-CH" dirty="0"/>
-              <a:t>Emulation einer nahezu perfekten echo-</a:t>
-            </a:r>
-            <a:r>
-              <a:rPr lang="de-CH" dirty="0" err="1"/>
-              <a:t>cancellation</a:t>
-            </a:r>
-            <a:r>
-              <a:rPr lang="de-CH" dirty="0"/>
-              <a:t>: [MATLAB DEMONSTRATION]</a:t>
-            </a:r>
-          </a:p>
-        </p:txBody>
-      </p:sp>
-      <p:pic>
-        <p:nvPicPr>
-          <p:cNvPr id="8194" name="Picture 2" descr="C:\Users\Marcel\Documents\5_Semester\DSV\EchoCancellation\Matlab\konvergenz_stabil_w_vordefiniert.png"/>
-          <p:cNvPicPr>
-            <a:picLocks noChangeAspect="1" noChangeArrowheads="1"/>
-          </p:cNvPicPr>
-          <p:nvPr/>
-        </p:nvPicPr>
-        <p:blipFill>
-          <a:blip r:embed="rId2" cstate="print">
-            <a:extLst>
-              <a:ext uri="{28A0092B-C50C-407E-A947-70E740481C1C}">
-                <a14:useLocalDpi xmlns:a14="http://schemas.microsoft.com/office/drawing/2010/main" val="0"/>
-              </a:ext>
-            </a:extLst>
-          </a:blip>
-          <a:srcRect/>
-          <a:stretch>
-            <a:fillRect/>
-          </a:stretch>
-        </p:blipFill>
-        <p:spPr bwMode="auto">
-          <a:xfrm>
-            <a:off x="971600" y="3246311"/>
-            <a:ext cx="7128792" cy="3577384"/>
-          </a:xfrm>
-          <a:prstGeom prst="rect">
-            <a:avLst/>
-          </a:prstGeom>
-          <a:noFill/>
-          <a:extLst>
-            <a:ext uri="{909E8E84-426E-40DD-AFC4-6F175D3DCCD1}">
-              <a14:hiddenFill xmlns:a14="http://schemas.microsoft.com/office/drawing/2010/main">
-                <a:solidFill>
-                  <a:srgbClr val="FFFFFF"/>
-                </a:solidFill>
-              </a14:hiddenFill>
-            </a:ext>
-          </a:extLst>
-        </p:spPr>
-      </p:pic>
-    </p:spTree>
-    <p:extLst>
-      <p:ext uri="{BB962C8B-B14F-4D97-AF65-F5344CB8AC3E}">
-        <p14:creationId xmlns:p14="http://schemas.microsoft.com/office/powerpoint/2010/main" val="1139998434"/>
+        <p14:creationId xmlns:p14="http://schemas.microsoft.com/office/powerpoint/2010/main" xmlns="" val="3730123226"/>
       </p:ext>
     </p:extLst>
   </p:cSld>
@@ -4471,15 +4378,23 @@
           <a:p>
             <a:r>
               <a:rPr lang="de-CH" dirty="0" smtClean="0"/>
-              <a:t>Implementation LL</a:t>
-            </a:r>
-            <a:endParaRPr lang="en-US" dirty="0"/>
-          </a:p>
-        </p:txBody>
-      </p:sp>
-      <p:sp>
-        <p:nvSpPr>
-          <p:cNvPr id="3" name="Inhaltsplatzhalter 2"/>
+              <a:t>Resultate HL (</a:t>
+            </a:r>
+            <a:r>
+              <a:rPr lang="de-CH" dirty="0" err="1" smtClean="0"/>
+              <a:t>voice</a:t>
+            </a:r>
+            <a:r>
+              <a:rPr lang="de-CH" dirty="0" smtClean="0"/>
+              <a:t>)</a:t>
+            </a:r>
+            <a:endParaRPr lang="de-CH" dirty="0"/>
+          </a:p>
+        </p:txBody>
+      </p:sp>
+      <p:sp>
+        <p:nvSpPr>
+          <p:cNvPr id="9" name="Inhaltsplatzhalter 2"/>
           <p:cNvSpPr>
             <a:spLocks noGrp="1"/>
           </p:cNvSpPr>
@@ -4487,104 +4402,35 @@
             <p:ph idx="1"/>
           </p:nvPr>
         </p:nvSpPr>
-        <p:spPr/>
-        <p:txBody>
-          <a:bodyPr/>
-          <a:lstStyle/>
-          <a:p>
-            <a:r>
-              <a:rPr lang="de-CH" dirty="0" smtClean="0"/>
-              <a:t>2 ARM Boards</a:t>
-            </a:r>
-          </a:p>
-          <a:p>
-            <a:pPr lvl="1"/>
-            <a:r>
-              <a:rPr lang="de-CH" dirty="0" smtClean="0"/>
-              <a:t>Je eins für Delay und LMS</a:t>
-            </a:r>
-            <a:endParaRPr lang="en-US" dirty="0" smtClean="0"/>
-          </a:p>
-          <a:p>
-            <a:r>
-              <a:rPr lang="de-CH" dirty="0" smtClean="0"/>
-              <a:t>Headset</a:t>
-            </a:r>
-          </a:p>
-          <a:p>
-            <a:r>
-              <a:rPr lang="de-CH" dirty="0" smtClean="0"/>
-              <a:t>Mikrofon </a:t>
-            </a:r>
-            <a:r>
-              <a:rPr lang="de-CH" dirty="0" err="1" smtClean="0"/>
-              <a:t>Preamp</a:t>
-            </a:r>
-            <a:endParaRPr lang="de-CH" dirty="0" smtClean="0"/>
-          </a:p>
-        </p:txBody>
-      </p:sp>
-      <p:graphicFrame>
-        <p:nvGraphicFramePr>
-          <p:cNvPr id="4" name="Objekt 3"/>
-          <p:cNvGraphicFramePr>
-            <a:graphicFrameLocks noChangeAspect="1"/>
-          </p:cNvGraphicFramePr>
-          <p:nvPr>
-            <p:extLst>
-              <p:ext uri="{D42A27DB-BD31-4B8C-83A1-F6EECF244321}">
-                <p14:modId xmlns:p14="http://schemas.microsoft.com/office/powerpoint/2010/main" val="588458436"/>
-              </p:ext>
-            </p:extLst>
-          </p:nvPr>
-        </p:nvGraphicFramePr>
-        <p:xfrm>
-          <a:off x="1043608" y="4149080"/>
-          <a:ext cx="7349631" cy="1610990"/>
-        </p:xfrm>
-        <a:graphic>
-          <a:graphicData uri="http://schemas.openxmlformats.org/presentationml/2006/ole">
-            <mc:AlternateContent xmlns:mc="http://schemas.openxmlformats.org/markup-compatibility/2006">
-              <mc:Choice xmlns:v="urn:schemas-microsoft-com:vml" Requires="v">
-                <p:oleObj spid="_x0000_s1035" name="Visio" r:id="rId3" imgW="5726008" imgH="1260900" progId="Visio.Drawing.11">
-                  <p:embed/>
-                </p:oleObj>
-              </mc:Choice>
-              <mc:Fallback>
-                <p:oleObj name="Visio" r:id="rId3" imgW="5726008" imgH="1260900" progId="Visio.Drawing.11">
-                  <p:embed/>
-                  <p:pic>
-                    <p:nvPicPr>
-                      <p:cNvPr id="0" name=""/>
-                      <p:cNvPicPr/>
-                      <p:nvPr/>
-                    </p:nvPicPr>
-                    <p:blipFill>
-                      <a:blip r:embed="rId4"/>
-                      <a:stretch>
-                        <a:fillRect/>
-                      </a:stretch>
-                    </p:blipFill>
-                    <p:spPr>
-                      <a:xfrm>
-                        <a:off x="1043608" y="4149080"/>
-                        <a:ext cx="7349631" cy="1610990"/>
-                      </a:xfrm>
-                      <a:prstGeom prst="rect">
-                        <a:avLst/>
-                      </a:prstGeom>
-                    </p:spPr>
-                  </p:pic>
-                </p:oleObj>
-              </mc:Fallback>
-            </mc:AlternateContent>
-          </a:graphicData>
-        </a:graphic>
-      </p:graphicFrame>
+        <p:spPr>
+          <a:xfrm>
+            <a:off x="467544" y="1340768"/>
+            <a:ext cx="8229600" cy="4525963"/>
+          </a:xfrm>
+        </p:spPr>
+        <p:txBody>
+          <a:bodyPr>
+            <a:normAutofit/>
+          </a:bodyPr>
+          <a:lstStyle/>
+          <a:p>
+            <a:r>
+              <a:rPr lang="de-CH" dirty="0" smtClean="0"/>
+              <a:t>Leider nur ca. 60% des Echos herausgefiltert</a:t>
+            </a:r>
+          </a:p>
+          <a:p>
+            <a:r>
+              <a:rPr lang="de-CH" dirty="0" smtClean="0"/>
+              <a:t>Relativ schnell: nach 2 Sekunden ist ca. 80% dieser Filterung erreicht</a:t>
+            </a:r>
+          </a:p>
+        </p:txBody>
+      </p:sp>
     </p:spTree>
     <p:extLst>
       <p:ext uri="{BB962C8B-B14F-4D97-AF65-F5344CB8AC3E}">
-        <p14:creationId xmlns:p14="http://schemas.microsoft.com/office/powerpoint/2010/main" val="334745486"/>
+        <p14:creationId xmlns:p14="http://schemas.microsoft.com/office/powerpoint/2010/main" xmlns="" val="541257800"/>
       </p:ext>
     </p:extLst>
   </p:cSld>
@@ -4635,15 +4481,23 @@
           <a:p>
             <a:r>
               <a:rPr lang="de-CH" dirty="0" smtClean="0"/>
-              <a:t>Implementation Delay</a:t>
-            </a:r>
-            <a:endParaRPr lang="en-US" dirty="0"/>
-          </a:p>
-        </p:txBody>
-      </p:sp>
-      <p:sp>
-        <p:nvSpPr>
-          <p:cNvPr id="3" name="Inhaltsplatzhalter 2"/>
+              <a:t>Resultate HL (</a:t>
+            </a:r>
+            <a:r>
+              <a:rPr lang="de-CH" dirty="0" err="1" smtClean="0"/>
+              <a:t>voice</a:t>
+            </a:r>
+            <a:r>
+              <a:rPr lang="de-CH" dirty="0" smtClean="0"/>
+              <a:t>)</a:t>
+            </a:r>
+            <a:endParaRPr lang="de-CH" dirty="0"/>
+          </a:p>
+        </p:txBody>
+      </p:sp>
+      <p:sp>
+        <p:nvSpPr>
+          <p:cNvPr id="9" name="Inhaltsplatzhalter 2"/>
           <p:cNvSpPr>
             <a:spLocks noGrp="1"/>
           </p:cNvSpPr>
@@ -4651,72 +4505,60 @@
             <p:ph idx="1"/>
           </p:nvPr>
         </p:nvSpPr>
-        <p:spPr/>
-        <p:txBody>
-          <a:bodyPr/>
-          <a:lstStyle/>
-          <a:p>
-            <a:r>
-              <a:rPr lang="de-CH" dirty="0" smtClean="0"/>
-              <a:t>FIR-Filter (Raum-Simulation, «</a:t>
-            </a:r>
-            <a:r>
-              <a:rPr lang="de-CH" dirty="0" err="1" smtClean="0"/>
-              <a:t>Reverb</a:t>
-            </a:r>
-            <a:r>
-              <a:rPr lang="de-CH" dirty="0" smtClean="0"/>
-              <a:t>»)</a:t>
-            </a:r>
-          </a:p>
-          <a:p>
-            <a:r>
-              <a:rPr lang="de-CH" dirty="0" smtClean="0"/>
-              <a:t>Max. 200ms -&gt; N = 1600 mit </a:t>
-            </a:r>
-            <a:r>
-              <a:rPr lang="de-CH" dirty="0" err="1" smtClean="0"/>
-              <a:t>fs</a:t>
-            </a:r>
-            <a:r>
-              <a:rPr lang="de-CH" dirty="0" smtClean="0"/>
-              <a:t> = 8kHz</a:t>
-            </a:r>
-          </a:p>
-          <a:p>
-            <a:r>
-              <a:rPr lang="en-US" dirty="0" smtClean="0"/>
-              <a:t>arm_fir_q15</a:t>
-            </a:r>
-          </a:p>
-          <a:p>
-            <a:r>
-              <a:rPr lang="de-CH" dirty="0" smtClean="0"/>
-              <a:t>funktioniert!</a:t>
-            </a:r>
-          </a:p>
-          <a:p>
-            <a:endParaRPr lang="de-CH" dirty="0" smtClean="0"/>
+        <p:spPr>
+          <a:xfrm>
+            <a:off x="467544" y="1340768"/>
+            <a:ext cx="8229600" cy="4525963"/>
+          </a:xfrm>
+        </p:spPr>
+        <p:txBody>
+          <a:bodyPr>
+            <a:normAutofit/>
+          </a:bodyPr>
+          <a:lstStyle/>
+          <a:p>
+            <a:r>
+              <a:rPr lang="de-CH" dirty="0"/>
+              <a:t>Filter mit richtigem Echo-Signal initialisieren:</a:t>
+            </a:r>
           </a:p>
           <a:p>
             <a:pPr lvl="1"/>
-            <a:endParaRPr lang="en-US" dirty="0"/>
+            <a:r>
+              <a:rPr lang="de-CH" dirty="0"/>
+              <a:t>Bleibt stabil</a:t>
+            </a:r>
+          </a:p>
+          <a:p>
+            <a:pPr lvl="1"/>
+            <a:r>
+              <a:rPr lang="de-CH" dirty="0"/>
+              <a:t>Emulation einer nahezu perfekten echo-</a:t>
+            </a:r>
+            <a:r>
+              <a:rPr lang="de-CH" dirty="0" err="1"/>
+              <a:t>cancellation</a:t>
+            </a:r>
+            <a:r>
+              <a:rPr lang="de-CH" dirty="0"/>
+              <a:t>: [MATLAB DEMONSTRATION]</a:t>
+            </a:r>
           </a:p>
         </p:txBody>
       </p:sp>
       <p:pic>
         <p:nvPicPr>
-          <p:cNvPr id="9218" name="Picture 2" descr="C:\Users\Marcel\Documents\5_Semester\DSV\EchoCancellation\Matlab\Echo.png"/>
+          <p:cNvPr id="8194" name="Picture 2" descr="C:\Users\Marcel\Documents\5_Semester\DSV\EchoCancellation\Matlab\konvergenz_stabil_w_vordefiniert.png"/>
           <p:cNvPicPr>
             <a:picLocks noChangeAspect="1" noChangeArrowheads="1"/>
           </p:cNvPicPr>
           <p:nvPr/>
         </p:nvPicPr>
         <p:blipFill>
-          <a:blip r:embed="rId2">
+          <a:blip r:embed="rId2" cstate="print">
             <a:extLst>
               <a:ext uri="{28A0092B-C50C-407E-A947-70E740481C1C}">
-                <a14:useLocalDpi xmlns:a14="http://schemas.microsoft.com/office/drawing/2010/main" val="0"/>
+                <a14:useLocalDpi xmlns:a14="http://schemas.microsoft.com/office/drawing/2010/main" xmlns="" val="0"/>
               </a:ext>
             </a:extLst>
           </a:blip>
@@ -4727,8 +4569,8 @@
         </p:blipFill>
         <p:spPr bwMode="auto">
           <a:xfrm>
-            <a:off x="3203848" y="2780928"/>
-            <a:ext cx="5342858" cy="4000000"/>
+            <a:off x="971600" y="3246311"/>
+            <a:ext cx="7128792" cy="3577384"/>
           </a:xfrm>
           <a:prstGeom prst="rect">
             <a:avLst/>
@@ -4736,7 +4578,7 @@
           <a:noFill/>
           <a:extLst>
             <a:ext uri="{909E8E84-426E-40DD-AFC4-6F175D3DCCD1}">
-              <a14:hiddenFill xmlns:a14="http://schemas.microsoft.com/office/drawing/2010/main">
+              <a14:hiddenFill xmlns:a14="http://schemas.microsoft.com/office/drawing/2010/main" xmlns="">
                 <a:solidFill>
                   <a:srgbClr val="FFFFFF"/>
                 </a:solidFill>
@@ -4748,7 +4590,7 @@
     </p:spTree>
     <p:extLst>
       <p:ext uri="{BB962C8B-B14F-4D97-AF65-F5344CB8AC3E}">
-        <p14:creationId xmlns:p14="http://schemas.microsoft.com/office/powerpoint/2010/main" val="786059088"/>
+        <p14:creationId xmlns:p14="http://schemas.microsoft.com/office/powerpoint/2010/main" xmlns="" val="1139998434"/>
       </p:ext>
     </p:extLst>
   </p:cSld>
@@ -4798,12 +4640,8 @@
           <a:lstStyle/>
           <a:p>
             <a:r>
-              <a:rPr lang="de-CH" dirty="0"/>
-              <a:t>Implementation </a:t>
-            </a:r>
-            <a:r>
-              <a:rPr lang="de-CH" dirty="0" smtClean="0"/>
-              <a:t>LMS</a:t>
+              <a:rPr lang="de-CH" dirty="0" smtClean="0"/>
+              <a:t>Implementation LL</a:t>
             </a:r>
             <a:endParaRPr lang="en-US" dirty="0"/>
           </a:p>
@@ -4821,118 +4659,71 @@
         </p:nvSpPr>
         <p:spPr/>
         <p:txBody>
-          <a:bodyPr>
-            <a:normAutofit lnSpcReduction="10000"/>
-          </a:bodyPr>
-          <a:lstStyle/>
-          <a:p>
-            <a:r>
-              <a:rPr lang="de-CH" dirty="0" smtClean="0"/>
-              <a:t>Samplebasiert  (DMA-Blocksize = 1)</a:t>
+          <a:bodyPr/>
+          <a:lstStyle/>
+          <a:p>
+            <a:r>
+              <a:rPr lang="de-CH" dirty="0" smtClean="0"/>
+              <a:t>2 ARM Boards</a:t>
             </a:r>
           </a:p>
           <a:p>
             <a:pPr lvl="1"/>
             <a:r>
+              <a:rPr lang="de-CH" dirty="0" smtClean="0"/>
+              <a:t>Je eins für Delay und LMS</a:t>
+            </a:r>
+            <a:endParaRPr lang="en-US" dirty="0" smtClean="0"/>
+          </a:p>
+          <a:p>
+            <a:r>
+              <a:rPr lang="de-CH" dirty="0" smtClean="0"/>
+              <a:t>Headset</a:t>
+            </a:r>
+          </a:p>
+          <a:p>
+            <a:r>
+              <a:rPr lang="de-CH" dirty="0" smtClean="0"/>
+              <a:t>Mikrofon </a:t>
+            </a:r>
+            <a:r>
               <a:rPr lang="de-CH" dirty="0" err="1" smtClean="0"/>
-              <a:t>Skalarprodukt</a:t>
-            </a:r>
-            <a:r>
-              <a:rPr lang="de-CH" dirty="0" smtClean="0"/>
-              <a:t> des Eingangs und der Filterkoeffizienten</a:t>
-            </a:r>
-          </a:p>
-          <a:p>
-            <a:pPr lvl="1"/>
-            <a:endParaRPr lang="de-CH" dirty="0"/>
-          </a:p>
-          <a:p>
-            <a:pPr lvl="1"/>
+              <a:t>Preamp</a:t>
+            </a:r>
             <a:endParaRPr lang="de-CH" dirty="0" smtClean="0"/>
           </a:p>
-          <a:p>
-            <a:r>
-              <a:rPr lang="de-CH" dirty="0" smtClean="0"/>
-              <a:t>Funktioniert noch nicht</a:t>
-            </a:r>
-            <a:r>
-              <a:rPr lang="de-CH" dirty="0"/>
-              <a:t> </a:t>
-            </a:r>
-            <a:r>
-              <a:rPr lang="de-CH" dirty="0" smtClean="0">
-                <a:sym typeface="Wingdings" panose="05000000000000000000" pitchFamily="2" charset="2"/>
-              </a:rPr>
-              <a:t></a:t>
-            </a:r>
-            <a:r>
-              <a:rPr lang="de-CH" dirty="0" smtClean="0"/>
-              <a:t> Zeitmangel</a:t>
-            </a:r>
-          </a:p>
-          <a:p>
-            <a:r>
-              <a:rPr lang="de-CH" dirty="0" smtClean="0"/>
-              <a:t>CMSIS DSP Library enthält bereits eine optimierte LMS-Implementation</a:t>
-            </a:r>
-          </a:p>
-          <a:p>
-            <a:pPr lvl="1"/>
-            <a:r>
-              <a:rPr lang="de-CH" dirty="0" smtClean="0"/>
-              <a:t>Noch nicht getestet</a:t>
-            </a:r>
-          </a:p>
-          <a:p>
-            <a:endParaRPr lang="en-US" dirty="0"/>
-          </a:p>
-        </p:txBody>
-      </p:sp>
-      <p:pic>
-        <p:nvPicPr>
-          <p:cNvPr id="7170" name="Picture 2" descr="C:\Users\Marcel\Pictures\Screenpresso\2013-10-30_11h23_34.png"/>
-          <p:cNvPicPr>
-            <a:picLocks noChangeAspect="1" noChangeArrowheads="1"/>
-          </p:cNvPicPr>
-          <p:nvPr/>
-        </p:nvPicPr>
-        <p:blipFill>
-          <a:blip r:embed="rId2">
-            <a:extLst>
-              <a:ext uri="{28A0092B-C50C-407E-A947-70E740481C1C}">
-                <a14:useLocalDpi xmlns:a14="http://schemas.microsoft.com/office/drawing/2010/main" val="0"/>
-              </a:ext>
-            </a:extLst>
-          </a:blip>
-          <a:srcRect/>
-          <a:stretch>
-            <a:fillRect/>
-          </a:stretch>
-        </p:blipFill>
-        <p:spPr bwMode="auto">
-          <a:xfrm>
-            <a:off x="2771800" y="2996952"/>
-            <a:ext cx="3384376" cy="932368"/>
-          </a:xfrm>
-          <a:prstGeom prst="rect">
-            <a:avLst/>
-          </a:prstGeom>
-          <a:noFill/>
-          <a:extLst>
-            <a:ext uri="{909E8E84-426E-40DD-AFC4-6F175D3DCCD1}">
-              <a14:hiddenFill xmlns:a14="http://schemas.microsoft.com/office/drawing/2010/main">
-                <a:solidFill>
-                  <a:srgbClr val="FFFFFF"/>
-                </a:solidFill>
-              </a14:hiddenFill>
-            </a:ext>
-          </a:extLst>
-        </p:spPr>
-      </p:pic>
+        </p:txBody>
+      </p:sp>
+      <p:graphicFrame>
+        <p:nvGraphicFramePr>
+          <p:cNvPr id="4" name="Objekt 3"/>
+          <p:cNvGraphicFramePr>
+            <a:graphicFrameLocks noChangeAspect="1"/>
+          </p:cNvGraphicFramePr>
+          <p:nvPr>
+            <p:extLst>
+              <p:ext uri="{D42A27DB-BD31-4B8C-83A1-F6EECF244321}">
+                <p14:modId xmlns:p14="http://schemas.microsoft.com/office/powerpoint/2010/main" xmlns="" val="588458436"/>
+              </p:ext>
+            </p:extLst>
+          </p:nvPr>
+        </p:nvGraphicFramePr>
+        <p:xfrm>
+          <a:off x="1043608" y="4149080"/>
+          <a:ext cx="7349631" cy="1610990"/>
+        </p:xfrm>
+        <a:graphic>
+          <a:graphicData uri="http://schemas.openxmlformats.org/presentationml/2006/ole">
+            <p:oleObj spid="_x0000_s1035" name="Visio" r:id="rId3" imgW="5726008" imgH="1260900" progId="Visio.Drawing.11">
+              <p:embed/>
+            </p:oleObj>
+          </a:graphicData>
+        </a:graphic>
+      </p:graphicFrame>
     </p:spTree>
     <p:extLst>
       <p:ext uri="{BB962C8B-B14F-4D97-AF65-F5344CB8AC3E}">
-        <p14:creationId xmlns:p14="http://schemas.microsoft.com/office/powerpoint/2010/main" val="1889050203"/>
+        <p14:creationId xmlns:p14="http://schemas.microsoft.com/office/powerpoint/2010/main" xmlns="" val="334745486"/>
       </p:ext>
     </p:extLst>
   </p:cSld>
@@ -4983,7 +4774,7 @@
           <a:p>
             <a:r>
               <a:rPr lang="de-CH" dirty="0" smtClean="0"/>
-              <a:t>Demonstration</a:t>
+              <a:t>Implementation Delay</a:t>
             </a:r>
             <a:endParaRPr lang="en-US" dirty="0"/>
           </a:p>
@@ -5006,16 +4797,105 @@
           <a:p>
             <a:r>
               <a:rPr lang="de-CH" dirty="0" smtClean="0"/>
-              <a:t>Leider nur Echo-Generierung</a:t>
-            </a:r>
+              <a:t>FIR-Filter (Raum-Simulation, «</a:t>
+            </a:r>
+            <a:r>
+              <a:rPr lang="de-CH" dirty="0" err="1" smtClean="0"/>
+              <a:t>Reverb</a:t>
+            </a:r>
+            <a:r>
+              <a:rPr lang="de-CH" dirty="0" smtClean="0"/>
+              <a:t>»)</a:t>
+            </a:r>
+          </a:p>
+          <a:p>
+            <a:r>
+              <a:rPr lang="de-CH" dirty="0" smtClean="0"/>
+              <a:t>Max. 200ms -&gt; </a:t>
+            </a:r>
+            <a:r>
+              <a:rPr lang="de-CH" dirty="0" smtClean="0"/>
+              <a:t>NFIR </a:t>
+            </a:r>
+            <a:r>
+              <a:rPr lang="de-CH" dirty="0" smtClean="0"/>
+              <a:t>= 1600 mit </a:t>
+            </a:r>
+            <a:r>
+              <a:rPr lang="de-CH" dirty="0" err="1" smtClean="0"/>
+              <a:t>fs</a:t>
+            </a:r>
+            <a:r>
+              <a:rPr lang="de-CH" dirty="0" smtClean="0"/>
+              <a:t> = 8kHz</a:t>
+            </a:r>
+          </a:p>
+          <a:p>
+            <a:r>
+              <a:rPr lang="en-US" dirty="0" smtClean="0"/>
+              <a:t>arm_fir_q15</a:t>
+            </a:r>
+          </a:p>
+          <a:p>
+            <a:r>
+              <a:rPr lang="de-CH" dirty="0" smtClean="0"/>
+              <a:t>funktioniert!</a:t>
+            </a:r>
+          </a:p>
+          <a:p>
+            <a:endParaRPr lang="de-CH" dirty="0" smtClean="0"/>
+          </a:p>
+          <a:p>
+            <a:pPr lvl="1"/>
             <a:endParaRPr lang="en-US" dirty="0"/>
           </a:p>
         </p:txBody>
       </p:sp>
+      <p:pic>
+        <p:nvPicPr>
+          <p:cNvPr id="9218" name="Picture 2" descr="C:\Users\Marcel\Documents\5_Semester\DSV\EchoCancellation\Matlab\Echo.png"/>
+          <p:cNvPicPr>
+            <a:picLocks noChangeAspect="1" noChangeArrowheads="1"/>
+          </p:cNvPicPr>
+          <p:nvPr/>
+        </p:nvPicPr>
+        <p:blipFill>
+          <a:blip r:embed="rId2" cstate="print">
+            <a:extLst>
+              <a:ext uri="{28A0092B-C50C-407E-A947-70E740481C1C}">
+                <a14:useLocalDpi xmlns:a14="http://schemas.microsoft.com/office/drawing/2010/main" xmlns="" val="0"/>
+              </a:ext>
+            </a:extLst>
+          </a:blip>
+          <a:srcRect/>
+          <a:stretch>
+            <a:fillRect/>
+          </a:stretch>
+        </p:blipFill>
+        <p:spPr bwMode="auto">
+          <a:xfrm>
+            <a:off x="3203848" y="2780928"/>
+            <a:ext cx="5342858" cy="4000000"/>
+          </a:xfrm>
+          <a:prstGeom prst="rect">
+            <a:avLst/>
+          </a:prstGeom>
+          <a:noFill/>
+          <a:extLst>
+            <a:ext uri="{909E8E84-426E-40DD-AFC4-6F175D3DCCD1}">
+              <a14:hiddenFill xmlns:a14="http://schemas.microsoft.com/office/drawing/2010/main" xmlns="">
+                <a:solidFill>
+                  <a:srgbClr val="FFFFFF"/>
+                </a:solidFill>
+              </a14:hiddenFill>
+            </a:ext>
+          </a:extLst>
+        </p:spPr>
+      </p:pic>
     </p:spTree>
     <p:extLst>
       <p:ext uri="{BB962C8B-B14F-4D97-AF65-F5344CB8AC3E}">
-        <p14:creationId xmlns:p14="http://schemas.microsoft.com/office/powerpoint/2010/main" val="3256245483"/>
+        <p14:creationId xmlns:p14="http://schemas.microsoft.com/office/powerpoint/2010/main" xmlns="" val="786059088"/>
       </p:ext>
     </p:extLst>
   </p:cSld>
@@ -5066,8 +4946,151 @@
           <a:p>
             <a:r>
               <a:rPr lang="de-CH" dirty="0" smtClean="0"/>
+              <a:t>Inhaltsverzeichnis</a:t>
+            </a:r>
+            <a:endParaRPr lang="de-CH" dirty="0"/>
+          </a:p>
+        </p:txBody>
+      </p:sp>
+      <p:sp>
+        <p:nvSpPr>
+          <p:cNvPr id="3" name="Inhaltsplatzhalter 2"/>
+          <p:cNvSpPr>
+            <a:spLocks noGrp="1"/>
+          </p:cNvSpPr>
+          <p:nvPr>
+            <p:ph idx="1"/>
+          </p:nvPr>
+        </p:nvSpPr>
+        <p:spPr/>
+        <p:txBody>
+          <a:bodyPr/>
+          <a:lstStyle/>
+          <a:p>
+            <a:r>
+              <a:rPr lang="de-CH" dirty="0" smtClean="0"/>
               <a:t>Problematik</a:t>
             </a:r>
+          </a:p>
+          <a:p>
+            <a:r>
+              <a:rPr lang="de-CH" dirty="0" smtClean="0"/>
+              <a:t>Modellierung</a:t>
+            </a:r>
+          </a:p>
+          <a:p>
+            <a:r>
+              <a:rPr lang="de-CH" dirty="0" smtClean="0"/>
+              <a:t>Lösungsansatz</a:t>
+            </a:r>
+          </a:p>
+          <a:p>
+            <a:r>
+              <a:rPr lang="de-CH" dirty="0" smtClean="0"/>
+              <a:t>High-Level </a:t>
+            </a:r>
+            <a:r>
+              <a:rPr lang="de-CH" dirty="0" err="1" smtClean="0"/>
+              <a:t>Implementation</a:t>
+            </a:r>
+            <a:r>
+              <a:rPr lang="de-CH" dirty="0" smtClean="0"/>
+              <a:t> (Rauschen)</a:t>
+            </a:r>
+          </a:p>
+          <a:p>
+            <a:r>
+              <a:rPr lang="de-CH" dirty="0" smtClean="0"/>
+              <a:t>High-Level </a:t>
+            </a:r>
+            <a:r>
+              <a:rPr lang="de-CH" dirty="0" err="1" smtClean="0"/>
+              <a:t>Implementation</a:t>
+            </a:r>
+            <a:r>
+              <a:rPr lang="de-CH" dirty="0" smtClean="0"/>
+              <a:t> (Stimme)</a:t>
+            </a:r>
+          </a:p>
+          <a:p>
+            <a:r>
+              <a:rPr lang="de-CH" dirty="0" smtClean="0"/>
+              <a:t>Low-Level </a:t>
+            </a:r>
+            <a:r>
+              <a:rPr lang="de-CH" dirty="0" err="1" smtClean="0"/>
+              <a:t>Implementation</a:t>
+            </a:r>
+            <a:r>
+              <a:rPr lang="de-CH" dirty="0" smtClean="0"/>
+              <a:t> Echo Modellierung</a:t>
+            </a:r>
+          </a:p>
+          <a:p>
+            <a:r>
+              <a:rPr lang="de-CH" dirty="0" smtClean="0"/>
+              <a:t>Low-Level </a:t>
+            </a:r>
+            <a:r>
+              <a:rPr lang="de-CH" dirty="0" err="1" smtClean="0"/>
+              <a:t>Implementation</a:t>
+            </a:r>
+            <a:r>
+              <a:rPr lang="de-CH" dirty="0" smtClean="0"/>
+              <a:t> Filterung</a:t>
+            </a:r>
+            <a:endParaRPr lang="de-CH" dirty="0"/>
+          </a:p>
+        </p:txBody>
+      </p:sp>
+    </p:spTree>
+  </p:cSld>
+  <p:clrMapOvr>
+    <a:masterClrMapping/>
+  </p:clrMapOvr>
+</p:sld>
+</file>
+
+<file path=ppt/slides/slide20.xml><?xml version="1.0" encoding="utf-8"?>
+<p:sld xmlns:a="http://schemas.openxmlformats.org/drawingml/2006/main" xmlns:r="http://schemas.openxmlformats.org/officeDocument/2006/relationships" xmlns:p="http://schemas.openxmlformats.org/presentationml/2006/main">
+  <p:cSld>
+    <p:spTree>
+      <p:nvGrpSpPr>
+        <p:cNvPr id="1" name=""/>
+        <p:cNvGrpSpPr/>
+        <p:nvPr/>
+      </p:nvGrpSpPr>
+      <p:grpSpPr>
+        <a:xfrm>
+          <a:off x="0" y="0"/>
+          <a:ext cx="0" cy="0"/>
+          <a:chOff x="0" y="0"/>
+          <a:chExt cx="0" cy="0"/>
+        </a:xfrm>
+      </p:grpSpPr>
+      <p:sp>
+        <p:nvSpPr>
+          <p:cNvPr id="2" name="Titel 1"/>
+          <p:cNvSpPr>
+            <a:spLocks noGrp="1"/>
+          </p:cNvSpPr>
+          <p:nvPr>
+            <p:ph type="title"/>
+          </p:nvPr>
+        </p:nvSpPr>
+        <p:spPr/>
+        <p:txBody>
+          <a:bodyPr/>
+          <a:lstStyle/>
+          <a:p>
+            <a:r>
+              <a:rPr lang="de-CH" dirty="0"/>
+              <a:t>Implementation </a:t>
+            </a:r>
+            <a:r>
+              <a:rPr lang="de-CH" dirty="0" smtClean="0"/>
+              <a:t>LMS</a:t>
+            </a:r>
             <a:endParaRPr lang="en-US" dirty="0"/>
           </a:p>
         </p:txBody>
@@ -5084,137 +5107,776 @@
         </p:nvSpPr>
         <p:spPr/>
         <p:txBody>
-          <a:bodyPr/>
-          <a:lstStyle/>
-          <a:p>
-            <a:endParaRPr lang="en-US"/>
-          </a:p>
-        </p:txBody>
-      </p:sp>
-      <p:graphicFrame>
-        <p:nvGraphicFramePr>
-          <p:cNvPr id="4" name="Objekt 3"/>
-          <p:cNvGraphicFramePr>
-            <a:graphicFrameLocks noChangeAspect="1"/>
-          </p:cNvGraphicFramePr>
-          <p:nvPr>
-            <p:extLst>
-              <p:ext uri="{D42A27DB-BD31-4B8C-83A1-F6EECF244321}">
-                <p14:modId xmlns:p14="http://schemas.microsoft.com/office/powerpoint/2010/main" val="836563750"/>
-              </p:ext>
-            </p:extLst>
-          </p:nvPr>
-        </p:nvGraphicFramePr>
-        <p:xfrm>
-          <a:off x="611560" y="2132856"/>
-          <a:ext cx="7976513" cy="1917874"/>
-        </p:xfrm>
-        <a:graphic>
-          <a:graphicData uri="http://schemas.openxmlformats.org/presentationml/2006/ole">
-            <mc:AlternateContent xmlns:mc="http://schemas.openxmlformats.org/markup-compatibility/2006">
-              <mc:Choice xmlns:v="urn:schemas-microsoft-com:vml" Requires="v">
-                <p:oleObj spid="_x0000_s2063" name="Visio" r:id="rId3" imgW="5770040" imgH="1387260" progId="Visio.Drawing.11">
-                  <p:embed/>
-                </p:oleObj>
-              </mc:Choice>
-              <mc:Fallback>
-                <p:oleObj name="Visio" r:id="rId3" imgW="5770040" imgH="1387260" progId="Visio.Drawing.11">
-                  <p:embed/>
-                  <p:pic>
-                    <p:nvPicPr>
-                      <p:cNvPr id="0" name=""/>
-                      <p:cNvPicPr/>
-                      <p:nvPr/>
-                    </p:nvPicPr>
-                    <p:blipFill>
-                      <a:blip r:embed="rId4"/>
-                      <a:stretch>
-                        <a:fillRect/>
-                      </a:stretch>
-                    </p:blipFill>
-                    <p:spPr>
-                      <a:xfrm>
-                        <a:off x="611560" y="2132856"/>
-                        <a:ext cx="7976513" cy="1917874"/>
-                      </a:xfrm>
-                      <a:prstGeom prst="rect">
-                        <a:avLst/>
-                      </a:prstGeom>
-                    </p:spPr>
-                  </p:pic>
-                </p:oleObj>
-              </mc:Fallback>
-            </mc:AlternateContent>
-          </a:graphicData>
-        </a:graphic>
-      </p:graphicFrame>
-      <p:graphicFrame>
-        <p:nvGraphicFramePr>
-          <p:cNvPr id="5" name="Objekt 4"/>
-          <p:cNvGraphicFramePr>
-            <a:graphicFrameLocks noChangeAspect="1"/>
-          </p:cNvGraphicFramePr>
-          <p:nvPr>
-            <p:extLst>
-              <p:ext uri="{D42A27DB-BD31-4B8C-83A1-F6EECF244321}">
-                <p14:modId xmlns:p14="http://schemas.microsoft.com/office/powerpoint/2010/main" val="2666585826"/>
-              </p:ext>
-            </p:extLst>
-          </p:nvPr>
-        </p:nvGraphicFramePr>
-        <p:xfrm>
-          <a:off x="683568" y="4365104"/>
-          <a:ext cx="8006659" cy="1755006"/>
-        </p:xfrm>
-        <a:graphic>
-          <a:graphicData uri="http://schemas.openxmlformats.org/presentationml/2006/ole">
-            <mc:AlternateContent xmlns:mc="http://schemas.openxmlformats.org/markup-compatibility/2006">
-              <mc:Choice xmlns:v="urn:schemas-microsoft-com:vml" Requires="v">
-                <p:oleObj spid="_x0000_s2064" name="Visio" r:id="rId5" imgW="5706828" imgH="1251450" progId="Visio.Drawing.11">
-                  <p:embed/>
-                </p:oleObj>
-              </mc:Choice>
-              <mc:Fallback>
-                <p:oleObj name="Visio" r:id="rId5" imgW="5706828" imgH="1251450" progId="Visio.Drawing.11">
-                  <p:embed/>
-                  <p:pic>
-                    <p:nvPicPr>
-                      <p:cNvPr id="0" name=""/>
-                      <p:cNvPicPr/>
-                      <p:nvPr/>
-                    </p:nvPicPr>
-                    <p:blipFill>
-                      <a:blip r:embed="rId6"/>
-                      <a:stretch>
-                        <a:fillRect/>
-                      </a:stretch>
-                    </p:blipFill>
-                    <p:spPr>
-                      <a:xfrm>
-                        <a:off x="683568" y="4365104"/>
-                        <a:ext cx="8006659" cy="1755006"/>
-                      </a:xfrm>
-                      <a:prstGeom prst="rect">
-                        <a:avLst/>
-                      </a:prstGeom>
-                    </p:spPr>
-                  </p:pic>
-                </p:oleObj>
-              </mc:Fallback>
-            </mc:AlternateContent>
-          </a:graphicData>
-        </a:graphic>
-      </p:graphicFrame>
+          <a:bodyPr>
+            <a:normAutofit/>
+          </a:bodyPr>
+          <a:lstStyle/>
+          <a:p>
+            <a:r>
+              <a:rPr lang="de-CH" dirty="0" smtClean="0"/>
+              <a:t>Samplebasiert  (DMA-Blocksize = 1)</a:t>
+            </a:r>
+          </a:p>
+          <a:p>
+            <a:pPr lvl="1"/>
+            <a:r>
+              <a:rPr lang="de-CH" dirty="0" err="1" smtClean="0"/>
+              <a:t>Skalarprodukt</a:t>
+            </a:r>
+            <a:r>
+              <a:rPr lang="de-CH" dirty="0" smtClean="0"/>
+              <a:t> des Eingangs und der Filterkoeffizienten</a:t>
+            </a:r>
+          </a:p>
+          <a:p>
+            <a:pPr lvl="1"/>
+            <a:endParaRPr lang="de-CH" dirty="0"/>
+          </a:p>
+          <a:p>
+            <a:pPr lvl="1"/>
+            <a:endParaRPr lang="de-CH" dirty="0" smtClean="0"/>
+          </a:p>
+          <a:p>
+            <a:r>
+              <a:rPr lang="de-CH" dirty="0" smtClean="0"/>
+              <a:t>Funktioniert noch nicht</a:t>
+            </a:r>
+            <a:r>
+              <a:rPr lang="de-CH" dirty="0"/>
+              <a:t> </a:t>
+            </a:r>
+            <a:r>
+              <a:rPr lang="de-CH" dirty="0" smtClean="0">
+                <a:sym typeface="Wingdings" panose="05000000000000000000" pitchFamily="2" charset="2"/>
+              </a:rPr>
+              <a:t></a:t>
+            </a:r>
+            <a:r>
+              <a:rPr lang="de-CH" dirty="0" smtClean="0"/>
+              <a:t> Zeitmangel</a:t>
+            </a:r>
+          </a:p>
+          <a:p>
+            <a:r>
+              <a:rPr lang="de-CH" dirty="0" smtClean="0"/>
+              <a:t>CMSIS DSP Library enthält bereits eine optimierte LMS-Implementation</a:t>
+            </a:r>
+          </a:p>
+          <a:p>
+            <a:pPr lvl="1"/>
+            <a:endParaRPr lang="de-CH" dirty="0" smtClean="0"/>
+          </a:p>
+          <a:p>
+            <a:endParaRPr lang="en-US" dirty="0"/>
+          </a:p>
+        </p:txBody>
+      </p:sp>
+      <p:pic>
+        <p:nvPicPr>
+          <p:cNvPr id="7170" name="Picture 2" descr="C:\Users\Marcel\Pictures\Screenpresso\2013-10-30_11h23_34.png"/>
+          <p:cNvPicPr>
+            <a:picLocks noChangeAspect="1" noChangeArrowheads="1"/>
+          </p:cNvPicPr>
+          <p:nvPr/>
+        </p:nvPicPr>
+        <p:blipFill>
+          <a:blip r:embed="rId2" cstate="print">
+            <a:extLst>
+              <a:ext uri="{28A0092B-C50C-407E-A947-70E740481C1C}">
+                <a14:useLocalDpi xmlns:a14="http://schemas.microsoft.com/office/drawing/2010/main" xmlns="" val="0"/>
+              </a:ext>
+            </a:extLst>
+          </a:blip>
+          <a:srcRect/>
+          <a:stretch>
+            <a:fillRect/>
+          </a:stretch>
+        </p:blipFill>
+        <p:spPr bwMode="auto">
+          <a:xfrm>
+            <a:off x="2771800" y="2996952"/>
+            <a:ext cx="3384376" cy="932368"/>
+          </a:xfrm>
+          <a:prstGeom prst="rect">
+            <a:avLst/>
+          </a:prstGeom>
+          <a:noFill/>
+          <a:extLst>
+            <a:ext uri="{909E8E84-426E-40DD-AFC4-6F175D3DCCD1}">
+              <a14:hiddenFill xmlns:a14="http://schemas.microsoft.com/office/drawing/2010/main" xmlns="">
+                <a:solidFill>
+                  <a:srgbClr val="FFFFFF"/>
+                </a:solidFill>
+              </a14:hiddenFill>
+            </a:ext>
+          </a:extLst>
+        </p:spPr>
+      </p:pic>
     </p:spTree>
     <p:extLst>
       <p:ext uri="{BB962C8B-B14F-4D97-AF65-F5344CB8AC3E}">
-        <p14:creationId xmlns:p14="http://schemas.microsoft.com/office/powerpoint/2010/main" val="387133026"/>
+        <p14:creationId xmlns:p14="http://schemas.microsoft.com/office/powerpoint/2010/main" xmlns="" val="1889050203"/>
       </p:ext>
     </p:extLst>
   </p:cSld>
   <p:clrMapOvr>
     <a:masterClrMapping/>
   </p:clrMapOvr>
+  <p:timing>
+    <p:tnLst>
+      <p:par>
+        <p:cTn id="1" dur="indefinite" restart="never" nodeType="tmRoot"/>
+      </p:par>
+    </p:tnLst>
+  </p:timing>
+</p:sld>
+</file>
+
+<file path=ppt/slides/slide21.xml><?xml version="1.0" encoding="utf-8"?>
+<p:sld xmlns:a="http://schemas.openxmlformats.org/drawingml/2006/main" xmlns:r="http://schemas.openxmlformats.org/officeDocument/2006/relationships" xmlns:p="http://schemas.openxmlformats.org/presentationml/2006/main">
+  <p:cSld>
+    <p:spTree>
+      <p:nvGrpSpPr>
+        <p:cNvPr id="1" name=""/>
+        <p:cNvGrpSpPr/>
+        <p:nvPr/>
+      </p:nvGrpSpPr>
+      <p:grpSpPr>
+        <a:xfrm>
+          <a:off x="0" y="0"/>
+          <a:ext cx="0" cy="0"/>
+          <a:chOff x="0" y="0"/>
+          <a:chExt cx="0" cy="0"/>
+        </a:xfrm>
+      </p:grpSpPr>
+      <p:sp>
+        <p:nvSpPr>
+          <p:cNvPr id="2" name="Titel 1"/>
+          <p:cNvSpPr>
+            <a:spLocks noGrp="1"/>
+          </p:cNvSpPr>
+          <p:nvPr>
+            <p:ph type="title"/>
+          </p:nvPr>
+        </p:nvSpPr>
+        <p:spPr/>
+        <p:txBody>
+          <a:bodyPr/>
+          <a:lstStyle/>
+          <a:p>
+            <a:r>
+              <a:rPr lang="de-CH" dirty="0"/>
+              <a:t>Implementation </a:t>
+            </a:r>
+            <a:r>
+              <a:rPr lang="de-CH" dirty="0" smtClean="0"/>
+              <a:t>LMS</a:t>
+            </a:r>
+            <a:endParaRPr lang="en-US" dirty="0"/>
+          </a:p>
+        </p:txBody>
+      </p:sp>
+      <p:sp>
+        <p:nvSpPr>
+          <p:cNvPr id="3" name="Inhaltsplatzhalter 2"/>
+          <p:cNvSpPr>
+            <a:spLocks noGrp="1"/>
+          </p:cNvSpPr>
+          <p:nvPr>
+            <p:ph idx="1"/>
+          </p:nvPr>
+        </p:nvSpPr>
+        <p:spPr/>
+        <p:txBody>
+          <a:bodyPr>
+            <a:normAutofit/>
+          </a:bodyPr>
+          <a:lstStyle/>
+          <a:p>
+            <a:r>
+              <a:rPr lang="de-CH" dirty="0" smtClean="0"/>
+              <a:t>Alternativen:</a:t>
+            </a:r>
+          </a:p>
+          <a:p>
+            <a:pPr lvl="1"/>
+            <a:r>
+              <a:rPr lang="de-CH" dirty="0" smtClean="0"/>
+              <a:t>Zweites FIR-Filter auf zweitem Board welches einfach das Echo wieder </a:t>
+            </a:r>
+            <a:r>
+              <a:rPr lang="de-CH" dirty="0" err="1" smtClean="0"/>
+              <a:t>herausrechnet</a:t>
+            </a:r>
+            <a:r>
+              <a:rPr lang="de-CH" dirty="0" smtClean="0"/>
+              <a:t> (unveränderliche, richtig initialisierte Filtertabs)</a:t>
+            </a:r>
+          </a:p>
+          <a:p>
+            <a:pPr lvl="2"/>
+            <a:r>
+              <a:rPr lang="de-CH" dirty="0" smtClean="0"/>
+              <a:t>Gut für Sprache</a:t>
+            </a:r>
+          </a:p>
+          <a:p>
+            <a:pPr lvl="2"/>
+            <a:r>
+              <a:rPr lang="de-CH" dirty="0" smtClean="0"/>
+              <a:t>Schlecht für schnelle Signale (z.B. </a:t>
+            </a:r>
+            <a:r>
+              <a:rPr lang="de-CH" dirty="0" err="1" smtClean="0"/>
+              <a:t>Diracs</a:t>
+            </a:r>
+            <a:r>
+              <a:rPr lang="de-CH" dirty="0" smtClean="0"/>
+              <a:t>)</a:t>
+            </a:r>
+          </a:p>
+          <a:p>
+            <a:pPr lvl="2"/>
+            <a:r>
+              <a:rPr lang="de-CH" dirty="0" smtClean="0"/>
+              <a:t>Warum: Filtertabs müssen genau stimmen, sonst rutscht ein Peak zwischen durch</a:t>
+            </a:r>
+            <a:endParaRPr lang="de-CH" dirty="0" smtClean="0"/>
+          </a:p>
+          <a:p>
+            <a:endParaRPr lang="en-US" dirty="0"/>
+          </a:p>
+        </p:txBody>
+      </p:sp>
+    </p:spTree>
+    <p:extLst>
+      <p:ext uri="{BB962C8B-B14F-4D97-AF65-F5344CB8AC3E}">
+        <p14:creationId xmlns:p14="http://schemas.microsoft.com/office/powerpoint/2010/main" xmlns="" val="1889050203"/>
+      </p:ext>
+    </p:extLst>
+  </p:cSld>
+  <p:clrMapOvr>
+    <a:masterClrMapping/>
+  </p:clrMapOvr>
+  <p:timing>
+    <p:tnLst>
+      <p:par>
+        <p:cTn id="1" dur="indefinite" restart="never" nodeType="tmRoot"/>
+      </p:par>
+    </p:tnLst>
+  </p:timing>
+</p:sld>
+</file>
+
+<file path=ppt/slides/slide22.xml><?xml version="1.0" encoding="utf-8"?>
+<p:sld xmlns:a="http://schemas.openxmlformats.org/drawingml/2006/main" xmlns:r="http://schemas.openxmlformats.org/officeDocument/2006/relationships" xmlns:p="http://schemas.openxmlformats.org/presentationml/2006/main">
+  <p:cSld>
+    <p:spTree>
+      <p:nvGrpSpPr>
+        <p:cNvPr id="1" name=""/>
+        <p:cNvGrpSpPr/>
+        <p:nvPr/>
+      </p:nvGrpSpPr>
+      <p:grpSpPr>
+        <a:xfrm>
+          <a:off x="0" y="0"/>
+          <a:ext cx="0" cy="0"/>
+          <a:chOff x="0" y="0"/>
+          <a:chExt cx="0" cy="0"/>
+        </a:xfrm>
+      </p:grpSpPr>
+      <p:sp>
+        <p:nvSpPr>
+          <p:cNvPr id="2" name="Titel 1"/>
+          <p:cNvSpPr>
+            <a:spLocks noGrp="1"/>
+          </p:cNvSpPr>
+          <p:nvPr>
+            <p:ph type="title"/>
+          </p:nvPr>
+        </p:nvSpPr>
+        <p:spPr/>
+        <p:txBody>
+          <a:bodyPr/>
+          <a:lstStyle/>
+          <a:p>
+            <a:r>
+              <a:rPr lang="de-CH" dirty="0" smtClean="0"/>
+              <a:t>Resultate LL</a:t>
+            </a:r>
+            <a:endParaRPr lang="en-US" dirty="0"/>
+          </a:p>
+        </p:txBody>
+      </p:sp>
+      <p:sp>
+        <p:nvSpPr>
+          <p:cNvPr id="3" name="Inhaltsplatzhalter 2"/>
+          <p:cNvSpPr>
+            <a:spLocks noGrp="1"/>
+          </p:cNvSpPr>
+          <p:nvPr>
+            <p:ph idx="1"/>
+          </p:nvPr>
+        </p:nvSpPr>
+        <p:spPr/>
+        <p:txBody>
+          <a:bodyPr>
+            <a:normAutofit/>
+          </a:bodyPr>
+          <a:lstStyle/>
+          <a:p>
+            <a:r>
+              <a:rPr lang="de-CH" dirty="0" smtClean="0"/>
+              <a:t>Nur akustischer Test</a:t>
+            </a:r>
+            <a:endParaRPr lang="de-CH" dirty="0" smtClean="0"/>
+          </a:p>
+          <a:p>
+            <a:r>
+              <a:rPr lang="en-US" dirty="0" smtClean="0"/>
+              <a:t>Built-In LMS-</a:t>
+            </a:r>
+            <a:r>
+              <a:rPr lang="en-US" dirty="0" err="1" smtClean="0"/>
+              <a:t>Funktion</a:t>
+            </a:r>
+            <a:r>
+              <a:rPr lang="en-US" dirty="0" smtClean="0"/>
+              <a:t> gut </a:t>
+            </a:r>
+            <a:r>
+              <a:rPr lang="en-US" dirty="0" err="1" smtClean="0"/>
+              <a:t>aber</a:t>
+            </a:r>
+            <a:r>
+              <a:rPr lang="en-US" dirty="0" smtClean="0"/>
+              <a:t> “</a:t>
+            </a:r>
+            <a:r>
+              <a:rPr lang="en-US" dirty="0" err="1" smtClean="0"/>
+              <a:t>langsam</a:t>
+            </a:r>
+            <a:r>
+              <a:rPr lang="en-US" dirty="0" smtClean="0"/>
+              <a:t>”</a:t>
+            </a:r>
+          </a:p>
+          <a:p>
+            <a:r>
+              <a:rPr lang="en-US" dirty="0" err="1" smtClean="0"/>
+              <a:t>Jedoch</a:t>
+            </a:r>
+            <a:r>
+              <a:rPr lang="en-US" dirty="0" smtClean="0"/>
+              <a:t> </a:t>
+            </a:r>
+            <a:r>
+              <a:rPr lang="en-US" dirty="0" err="1" smtClean="0"/>
+              <a:t>schon</a:t>
+            </a:r>
+            <a:r>
+              <a:rPr lang="en-US" dirty="0" smtClean="0"/>
+              <a:t> </a:t>
+            </a:r>
+            <a:r>
+              <a:rPr lang="en-US" dirty="0" err="1" smtClean="0"/>
+              <a:t>mit</a:t>
+            </a:r>
+            <a:r>
+              <a:rPr lang="en-US" dirty="0" smtClean="0"/>
+              <a:t> </a:t>
+            </a:r>
+            <a:r>
+              <a:rPr lang="en-US" dirty="0" err="1" smtClean="0"/>
+              <a:t>einem</a:t>
+            </a:r>
+            <a:r>
+              <a:rPr lang="en-US" dirty="0" smtClean="0"/>
+              <a:t> </a:t>
+            </a:r>
+            <a:r>
+              <a:rPr lang="en-US" dirty="0" err="1" smtClean="0"/>
+              <a:t>sehr</a:t>
+            </a:r>
+            <a:r>
+              <a:rPr lang="en-US" dirty="0" smtClean="0"/>
+              <a:t> </a:t>
+            </a:r>
+            <a:r>
+              <a:rPr lang="en-US" dirty="0" err="1" smtClean="0"/>
+              <a:t>kleinen</a:t>
+            </a:r>
+            <a:r>
+              <a:rPr lang="en-US" dirty="0" smtClean="0"/>
+              <a:t> u </a:t>
+            </a:r>
+            <a:r>
+              <a:rPr lang="en-US" dirty="0" err="1" smtClean="0"/>
+              <a:t>gute</a:t>
+            </a:r>
+            <a:r>
+              <a:rPr lang="en-US" dirty="0" smtClean="0"/>
+              <a:t> und </a:t>
+            </a:r>
+            <a:r>
+              <a:rPr lang="en-US" dirty="0" err="1" smtClean="0"/>
+              <a:t>schnelle</a:t>
+            </a:r>
+            <a:r>
+              <a:rPr lang="en-US" dirty="0" smtClean="0"/>
+              <a:t> </a:t>
+            </a:r>
+            <a:r>
+              <a:rPr lang="en-US" dirty="0" err="1" smtClean="0"/>
+              <a:t>Resultate</a:t>
+            </a:r>
+            <a:endParaRPr lang="en-US" dirty="0" smtClean="0"/>
+          </a:p>
+        </p:txBody>
+      </p:sp>
+    </p:spTree>
+    <p:extLst>
+      <p:ext uri="{BB962C8B-B14F-4D97-AF65-F5344CB8AC3E}">
+        <p14:creationId xmlns:p14="http://schemas.microsoft.com/office/powerpoint/2010/main" xmlns="" val="1889050203"/>
+      </p:ext>
+    </p:extLst>
+  </p:cSld>
+  <p:clrMapOvr>
+    <a:masterClrMapping/>
+  </p:clrMapOvr>
+  <p:timing>
+    <p:tnLst>
+      <p:par>
+        <p:cTn id="1" dur="indefinite" restart="never" nodeType="tmRoot"/>
+      </p:par>
+    </p:tnLst>
+  </p:timing>
+</p:sld>
+</file>
+
+<file path=ppt/slides/slide23.xml><?xml version="1.0" encoding="utf-8"?>
+<p:sld xmlns:a="http://schemas.openxmlformats.org/drawingml/2006/main" xmlns:r="http://schemas.openxmlformats.org/officeDocument/2006/relationships" xmlns:p="http://schemas.openxmlformats.org/presentationml/2006/main">
+  <p:cSld>
+    <p:spTree>
+      <p:nvGrpSpPr>
+        <p:cNvPr id="1" name=""/>
+        <p:cNvGrpSpPr/>
+        <p:nvPr/>
+      </p:nvGrpSpPr>
+      <p:grpSpPr>
+        <a:xfrm>
+          <a:off x="0" y="0"/>
+          <a:ext cx="0" cy="0"/>
+          <a:chOff x="0" y="0"/>
+          <a:chExt cx="0" cy="0"/>
+        </a:xfrm>
+      </p:grpSpPr>
+      <p:sp>
+        <p:nvSpPr>
+          <p:cNvPr id="2" name="Titel 1"/>
+          <p:cNvSpPr>
+            <a:spLocks noGrp="1"/>
+          </p:cNvSpPr>
+          <p:nvPr>
+            <p:ph type="title"/>
+          </p:nvPr>
+        </p:nvSpPr>
+        <p:spPr/>
+        <p:txBody>
+          <a:bodyPr/>
+          <a:lstStyle/>
+          <a:p>
+            <a:r>
+              <a:rPr lang="de-CH" dirty="0" smtClean="0"/>
+              <a:t>Schlussfolgerung</a:t>
+            </a:r>
+            <a:endParaRPr lang="en-US" dirty="0"/>
+          </a:p>
+        </p:txBody>
+      </p:sp>
+      <p:sp>
+        <p:nvSpPr>
+          <p:cNvPr id="3" name="Inhaltsplatzhalter 2"/>
+          <p:cNvSpPr>
+            <a:spLocks noGrp="1"/>
+          </p:cNvSpPr>
+          <p:nvPr>
+            <p:ph idx="1"/>
+          </p:nvPr>
+        </p:nvSpPr>
+        <p:spPr/>
+        <p:txBody>
+          <a:bodyPr>
+            <a:normAutofit/>
+          </a:bodyPr>
+          <a:lstStyle/>
+          <a:p>
+            <a:r>
+              <a:rPr lang="de-CH" dirty="0" smtClean="0"/>
+              <a:t>Technische Schlussfolgerung</a:t>
+            </a:r>
+          </a:p>
+          <a:p>
+            <a:pPr lvl="1"/>
+            <a:r>
+              <a:rPr lang="de-CH" dirty="0" smtClean="0"/>
+              <a:t>Grundsätzlich einfach</a:t>
+            </a:r>
+          </a:p>
+          <a:p>
+            <a:pPr lvl="1"/>
+            <a:r>
+              <a:rPr lang="de-CH" dirty="0" smtClean="0"/>
+              <a:t>Adaptives Konzept ist die Basis vieler weiterer Filterungstypen</a:t>
+            </a:r>
+          </a:p>
+          <a:p>
+            <a:pPr lvl="1"/>
+            <a:r>
+              <a:rPr lang="de-CH" dirty="0" err="1" smtClean="0"/>
+              <a:t>Implementation</a:t>
+            </a:r>
+            <a:r>
+              <a:rPr lang="de-CH" dirty="0" smtClean="0"/>
+              <a:t> auf Low-Level anspruchsvoll, zeitaufwändiger als gedacht</a:t>
+            </a:r>
+          </a:p>
+          <a:p>
+            <a:pPr lvl="1"/>
+            <a:r>
+              <a:rPr lang="de-CH" dirty="0" smtClean="0"/>
+              <a:t>Stückweise </a:t>
+            </a:r>
+            <a:r>
+              <a:rPr lang="de-CH" dirty="0" err="1" smtClean="0"/>
+              <a:t>Implementation</a:t>
+            </a:r>
+            <a:r>
+              <a:rPr lang="de-CH" dirty="0" smtClean="0"/>
+              <a:t> durchaus sinnvoll ;)</a:t>
+            </a:r>
+          </a:p>
+        </p:txBody>
+      </p:sp>
+    </p:spTree>
+    <p:extLst>
+      <p:ext uri="{BB962C8B-B14F-4D97-AF65-F5344CB8AC3E}">
+        <p14:creationId xmlns:p14="http://schemas.microsoft.com/office/powerpoint/2010/main" xmlns="" val="1889050203"/>
+      </p:ext>
+    </p:extLst>
+  </p:cSld>
+  <p:clrMapOvr>
+    <a:masterClrMapping/>
+  </p:clrMapOvr>
+  <p:timing>
+    <p:tnLst>
+      <p:par>
+        <p:cTn id="1" dur="indefinite" restart="never" nodeType="tmRoot"/>
+      </p:par>
+    </p:tnLst>
+  </p:timing>
+</p:sld>
+</file>
+
+<file path=ppt/slides/slide24.xml><?xml version="1.0" encoding="utf-8"?>
+<p:sld xmlns:a="http://schemas.openxmlformats.org/drawingml/2006/main" xmlns:r="http://schemas.openxmlformats.org/officeDocument/2006/relationships" xmlns:p="http://schemas.openxmlformats.org/presentationml/2006/main">
+  <p:cSld>
+    <p:spTree>
+      <p:nvGrpSpPr>
+        <p:cNvPr id="1" name=""/>
+        <p:cNvGrpSpPr/>
+        <p:nvPr/>
+      </p:nvGrpSpPr>
+      <p:grpSpPr>
+        <a:xfrm>
+          <a:off x="0" y="0"/>
+          <a:ext cx="0" cy="0"/>
+          <a:chOff x="0" y="0"/>
+          <a:chExt cx="0" cy="0"/>
+        </a:xfrm>
+      </p:grpSpPr>
+      <p:sp>
+        <p:nvSpPr>
+          <p:cNvPr id="2" name="Titel 1"/>
+          <p:cNvSpPr>
+            <a:spLocks noGrp="1"/>
+          </p:cNvSpPr>
+          <p:nvPr>
+            <p:ph type="title"/>
+          </p:nvPr>
+        </p:nvSpPr>
+        <p:spPr/>
+        <p:txBody>
+          <a:bodyPr/>
+          <a:lstStyle/>
+          <a:p>
+            <a:r>
+              <a:rPr lang="de-CH" dirty="0" smtClean="0"/>
+              <a:t>Schlussfolgerung</a:t>
+            </a:r>
+            <a:endParaRPr lang="en-US" dirty="0"/>
+          </a:p>
+        </p:txBody>
+      </p:sp>
+      <p:sp>
+        <p:nvSpPr>
+          <p:cNvPr id="3" name="Inhaltsplatzhalter 2"/>
+          <p:cNvSpPr>
+            <a:spLocks noGrp="1"/>
+          </p:cNvSpPr>
+          <p:nvPr>
+            <p:ph idx="1"/>
+          </p:nvPr>
+        </p:nvSpPr>
+        <p:spPr/>
+        <p:txBody>
+          <a:bodyPr>
+            <a:normAutofit/>
+          </a:bodyPr>
+          <a:lstStyle/>
+          <a:p>
+            <a:r>
+              <a:rPr lang="de-CH" dirty="0" smtClean="0"/>
+              <a:t>Persönliche Schlussfolgerung</a:t>
+            </a:r>
+          </a:p>
+          <a:p>
+            <a:pPr lvl="1"/>
+            <a:r>
+              <a:rPr lang="de-CH" dirty="0" smtClean="0"/>
+              <a:t>Viel gelernt, Eigeninitiative wurde gefördert</a:t>
+            </a:r>
+          </a:p>
+          <a:p>
+            <a:pPr lvl="1"/>
+            <a:r>
+              <a:rPr lang="de-CH" dirty="0" smtClean="0"/>
+              <a:t>Praxisbezug des DSV-Gebiets</a:t>
+            </a:r>
+          </a:p>
+          <a:p>
+            <a:pPr lvl="1"/>
+            <a:r>
+              <a:rPr lang="de-CH" dirty="0" smtClean="0"/>
+              <a:t>Low-Level </a:t>
+            </a:r>
+            <a:r>
+              <a:rPr lang="de-CH" dirty="0" err="1" smtClean="0"/>
+              <a:t>Implementation</a:t>
+            </a:r>
+            <a:r>
+              <a:rPr lang="de-CH" dirty="0" smtClean="0"/>
+              <a:t> hat geholfen ein Gefühl dafür zu erhalten, wie viel Performance möglich ist und wo die Grenzen liegen</a:t>
+            </a:r>
+          </a:p>
+        </p:txBody>
+      </p:sp>
+    </p:spTree>
+    <p:extLst>
+      <p:ext uri="{BB962C8B-B14F-4D97-AF65-F5344CB8AC3E}">
+        <p14:creationId xmlns:p14="http://schemas.microsoft.com/office/powerpoint/2010/main" xmlns="" val="1889050203"/>
+      </p:ext>
+    </p:extLst>
+  </p:cSld>
+  <p:clrMapOvr>
+    <a:masterClrMapping/>
+  </p:clrMapOvr>
+  <p:timing>
+    <p:tnLst>
+      <p:par>
+        <p:cTn id="1" dur="indefinite" restart="never" nodeType="tmRoot"/>
+      </p:par>
+    </p:tnLst>
+  </p:timing>
+</p:sld>
+</file>
+
+<file path=ppt/slides/slide25.xml><?xml version="1.0" encoding="utf-8"?>
+<p:sld xmlns:a="http://schemas.openxmlformats.org/drawingml/2006/main" xmlns:r="http://schemas.openxmlformats.org/officeDocument/2006/relationships" xmlns:p="http://schemas.openxmlformats.org/presentationml/2006/main">
+  <p:cSld>
+    <p:spTree>
+      <p:nvGrpSpPr>
+        <p:cNvPr id="1" name=""/>
+        <p:cNvGrpSpPr/>
+        <p:nvPr/>
+      </p:nvGrpSpPr>
+      <p:grpSpPr>
+        <a:xfrm>
+          <a:off x="0" y="0"/>
+          <a:ext cx="0" cy="0"/>
+          <a:chOff x="0" y="0"/>
+          <a:chExt cx="0" cy="0"/>
+        </a:xfrm>
+      </p:grpSpPr>
+      <p:sp>
+        <p:nvSpPr>
+          <p:cNvPr id="2" name="Titel 1"/>
+          <p:cNvSpPr>
+            <a:spLocks noGrp="1"/>
+          </p:cNvSpPr>
+          <p:nvPr>
+            <p:ph type="title"/>
+          </p:nvPr>
+        </p:nvSpPr>
+        <p:spPr/>
+        <p:txBody>
+          <a:bodyPr/>
+          <a:lstStyle/>
+          <a:p>
+            <a:r>
+              <a:rPr lang="de-CH" dirty="0" smtClean="0"/>
+              <a:t>Demonstration</a:t>
+            </a:r>
+            <a:endParaRPr lang="en-US" dirty="0"/>
+          </a:p>
+        </p:txBody>
+      </p:sp>
+      <p:sp>
+        <p:nvSpPr>
+          <p:cNvPr id="3" name="Inhaltsplatzhalter 2"/>
+          <p:cNvSpPr>
+            <a:spLocks noGrp="1"/>
+          </p:cNvSpPr>
+          <p:nvPr>
+            <p:ph idx="1"/>
+          </p:nvPr>
+        </p:nvSpPr>
+        <p:spPr/>
+        <p:txBody>
+          <a:bodyPr/>
+          <a:lstStyle/>
+          <a:p>
+            <a:r>
+              <a:rPr lang="de-CH" dirty="0" smtClean="0"/>
+              <a:t>Echo-Generierung</a:t>
+            </a:r>
+          </a:p>
+          <a:p>
+            <a:r>
+              <a:rPr lang="de-CH" dirty="0" smtClean="0"/>
+              <a:t>Filterung mit fixem FIR-Filter</a:t>
+            </a:r>
+            <a:endParaRPr lang="en-US" dirty="0"/>
+          </a:p>
+        </p:txBody>
+      </p:sp>
+    </p:spTree>
+    <p:extLst>
+      <p:ext uri="{BB962C8B-B14F-4D97-AF65-F5344CB8AC3E}">
+        <p14:creationId xmlns:p14="http://schemas.microsoft.com/office/powerpoint/2010/main" xmlns="" val="3256245483"/>
+      </p:ext>
+    </p:extLst>
+  </p:cSld>
+  <p:clrMapOvr>
+    <a:masterClrMapping/>
+  </p:clrMapOvr>
+  <p:timing>
+    <p:tnLst>
+      <p:par>
+        <p:cTn id="1" dur="indefinite" restart="never" nodeType="tmRoot"/>
+      </p:par>
+    </p:tnLst>
+  </p:timing>
 </p:sld>
 </file>
 
@@ -5254,7 +5916,7 @@
               <a:rPr lang="de-CH" dirty="0" smtClean="0"/>
               <a:t>Problematik</a:t>
             </a:r>
-            <a:endParaRPr lang="de-CH" dirty="0"/>
+            <a:endParaRPr lang="en-US" dirty="0"/>
           </a:p>
         </p:txBody>
       </p:sp>
@@ -5270,39 +5932,71 @@
         </p:nvSpPr>
         <p:spPr/>
         <p:txBody>
-          <a:bodyPr>
-            <a:normAutofit/>
-          </a:bodyPr>
-          <a:lstStyle/>
-          <a:p>
-            <a:r>
-              <a:rPr lang="de-CH" dirty="0" smtClean="0"/>
-              <a:t>Ein Signal x wird mit einem Echo versehen.</a:t>
-            </a:r>
-          </a:p>
-          <a:p>
-            <a:pPr lvl="1"/>
-            <a:r>
-              <a:rPr lang="de-CH" dirty="0" smtClean="0"/>
-              <a:t>Ein Echo ist einfach eine verzögerte und eventuell abgedämpfte Kopie von x.</a:t>
-            </a:r>
-          </a:p>
-          <a:p>
-            <a:r>
-              <a:rPr lang="de-CH" dirty="0" smtClean="0"/>
-              <a:t>Das Signal x und das resultierende Signal y sind bekannt.</a:t>
-            </a:r>
-          </a:p>
-          <a:p>
-            <a:r>
-              <a:rPr lang="de-CH" dirty="0" smtClean="0"/>
-              <a:t>Aus beiden Signalen soll nun die Charakteristik des Echos ermittelt und das ursprüngliche Signal x wiederhergestellt werden.</a:t>
-            </a:r>
-            <a:endParaRPr lang="de-CH" dirty="0"/>
-          </a:p>
-        </p:txBody>
-      </p:sp>
+          <a:bodyPr/>
+          <a:lstStyle/>
+          <a:p>
+            <a:endParaRPr lang="en-US"/>
+          </a:p>
+        </p:txBody>
+      </p:sp>
+      <p:graphicFrame>
+        <p:nvGraphicFramePr>
+          <p:cNvPr id="4" name="Objekt 3"/>
+          <p:cNvGraphicFramePr>
+            <a:graphicFrameLocks noChangeAspect="1"/>
+          </p:cNvGraphicFramePr>
+          <p:nvPr>
+            <p:extLst>
+              <p:ext uri="{D42A27DB-BD31-4B8C-83A1-F6EECF244321}">
+                <p14:modId xmlns:p14="http://schemas.microsoft.com/office/powerpoint/2010/main" xmlns="" val="836563750"/>
+              </p:ext>
+            </p:extLst>
+          </p:nvPr>
+        </p:nvGraphicFramePr>
+        <p:xfrm>
+          <a:off x="611560" y="2132856"/>
+          <a:ext cx="7976513" cy="1917874"/>
+        </p:xfrm>
+        <a:graphic>
+          <a:graphicData uri="http://schemas.openxmlformats.org/presentationml/2006/ole">
+            <p:oleObj spid="_x0000_s2063" name="Visio" r:id="rId3" imgW="5770040" imgH="1387260" progId="Visio.Drawing.11">
+              <p:embed/>
+            </p:oleObj>
+          </a:graphicData>
+        </a:graphic>
+      </p:graphicFrame>
+      <p:graphicFrame>
+        <p:nvGraphicFramePr>
+          <p:cNvPr id="5" name="Objekt 4"/>
+          <p:cNvGraphicFramePr>
+            <a:graphicFrameLocks noChangeAspect="1"/>
+          </p:cNvGraphicFramePr>
+          <p:nvPr>
+            <p:extLst>
+              <p:ext uri="{D42A27DB-BD31-4B8C-83A1-F6EECF244321}">
+                <p14:modId xmlns:p14="http://schemas.microsoft.com/office/powerpoint/2010/main" xmlns="" val="2666585826"/>
+              </p:ext>
+            </p:extLst>
+          </p:nvPr>
+        </p:nvGraphicFramePr>
+        <p:xfrm>
+          <a:off x="683568" y="4365104"/>
+          <a:ext cx="8006659" cy="1755006"/>
+        </p:xfrm>
+        <a:graphic>
+          <a:graphicData uri="http://schemas.openxmlformats.org/presentationml/2006/ole">
+            <p:oleObj spid="_x0000_s2064" name="Visio" r:id="rId4" imgW="5706828" imgH="1251450" progId="Visio.Drawing.11">
+              <p:embed/>
+            </p:oleObj>
+          </a:graphicData>
+        </a:graphic>
+      </p:graphicFrame>
     </p:spTree>
+    <p:extLst>
+      <p:ext uri="{BB962C8B-B14F-4D97-AF65-F5344CB8AC3E}">
+        <p14:creationId xmlns:p14="http://schemas.microsoft.com/office/powerpoint/2010/main" xmlns="" val="387133026"/>
+      </p:ext>
+    </p:extLst>
   </p:cSld>
   <p:clrMapOvr>
     <a:masterClrMapping/>
@@ -5351,7 +6045,7 @@
           <a:p>
             <a:r>
               <a:rPr lang="de-CH" dirty="0" smtClean="0"/>
-              <a:t>Problematik</a:t>
+              <a:t>Modellierung</a:t>
             </a:r>
             <a:endParaRPr lang="de-CH" dirty="0"/>
           </a:p>
@@ -5376,14 +6070,201 @@
           <a:p>
             <a:r>
               <a:rPr lang="de-CH" dirty="0" smtClean="0"/>
-              <a:t>Echo:</a:t>
-            </a:r>
+              <a:t>Signal </a:t>
+            </a:r>
+            <a:r>
+              <a:rPr lang="de-CH" dirty="0" smtClean="0"/>
+              <a:t>x wird mit einem Echo </a:t>
+            </a:r>
+            <a:r>
+              <a:rPr lang="de-CH" dirty="0" smtClean="0"/>
+              <a:t>versehen</a:t>
+            </a:r>
+            <a:endParaRPr lang="de-CH" dirty="0" smtClean="0"/>
           </a:p>
           <a:p>
             <a:pPr lvl="1"/>
             <a:r>
               <a:rPr lang="de-CH" dirty="0" smtClean="0"/>
-              <a:t>Echo-Verzögerung: 8/</a:t>
+              <a:t>Echo: eine oder mehrere verzögerte </a:t>
+            </a:r>
+            <a:r>
+              <a:rPr lang="de-CH" dirty="0" smtClean="0"/>
+              <a:t>und eventuell abgedämpfte </a:t>
+            </a:r>
+            <a:r>
+              <a:rPr lang="de-CH" dirty="0" smtClean="0"/>
+              <a:t>Kopien </a:t>
+            </a:r>
+            <a:r>
+              <a:rPr lang="de-CH" dirty="0" smtClean="0"/>
+              <a:t>von x.</a:t>
+            </a:r>
+          </a:p>
+          <a:p>
+            <a:r>
+              <a:rPr lang="de-CH" dirty="0" smtClean="0"/>
+              <a:t>Signal </a:t>
+            </a:r>
+            <a:r>
+              <a:rPr lang="de-CH" dirty="0" smtClean="0"/>
+              <a:t>x und </a:t>
+            </a:r>
+            <a:r>
+              <a:rPr lang="de-CH" dirty="0" smtClean="0"/>
+              <a:t>resultierendes </a:t>
+            </a:r>
+            <a:r>
+              <a:rPr lang="de-CH" dirty="0" smtClean="0"/>
+              <a:t>Signal y </a:t>
+            </a:r>
+            <a:r>
+              <a:rPr lang="de-CH" dirty="0" smtClean="0"/>
+              <a:t>sind bekannt</a:t>
+            </a:r>
+            <a:endParaRPr lang="de-CH" dirty="0" smtClean="0"/>
+          </a:p>
+          <a:p>
+            <a:r>
+              <a:rPr lang="de-CH" dirty="0" smtClean="0"/>
+              <a:t>x, y </a:t>
+            </a:r>
+            <a:r>
+              <a:rPr lang="de-CH" dirty="0" smtClean="0">
+                <a:sym typeface="Wingdings" pitchFamily="2" charset="2"/>
+              </a:rPr>
+              <a:t> h: </a:t>
+            </a:r>
+            <a:r>
+              <a:rPr lang="de-CH" dirty="0" smtClean="0"/>
+              <a:t>Charakteristik </a:t>
+            </a:r>
+            <a:r>
+              <a:rPr lang="de-CH" dirty="0" smtClean="0"/>
+              <a:t>des </a:t>
+            </a:r>
+            <a:r>
+              <a:rPr lang="de-CH" dirty="0" smtClean="0"/>
+              <a:t>Echos,</a:t>
+            </a:r>
+          </a:p>
+          <a:p>
+            <a:r>
+              <a:rPr lang="de-CH" dirty="0" smtClean="0"/>
+              <a:t>h</a:t>
+            </a:r>
+            <a:r>
+              <a:rPr lang="de-CH" dirty="0" smtClean="0"/>
+              <a:t> </a:t>
+            </a:r>
+            <a:r>
+              <a:rPr lang="de-CH" dirty="0" smtClean="0">
+                <a:sym typeface="Wingdings" pitchFamily="2" charset="2"/>
+              </a:rPr>
+              <a:t> Wiederherstellung von x aus y</a:t>
+            </a:r>
+            <a:endParaRPr lang="de-CH" dirty="0" smtClean="0"/>
+          </a:p>
+          <a:p>
+            <a:endParaRPr lang="de-CH" dirty="0"/>
+          </a:p>
+        </p:txBody>
+      </p:sp>
+    </p:spTree>
+  </p:cSld>
+  <p:clrMapOvr>
+    <a:masterClrMapping/>
+  </p:clrMapOvr>
+  <p:timing>
+    <p:tnLst>
+      <p:par>
+        <p:cTn id="1" dur="indefinite" restart="never" nodeType="tmRoot"/>
+      </p:par>
+    </p:tnLst>
+  </p:timing>
+</p:sld>
+</file>
+
+<file path=ppt/slides/slide5.xml><?xml version="1.0" encoding="utf-8"?>
+<p:sld xmlns:a="http://schemas.openxmlformats.org/drawingml/2006/main" xmlns:r="http://schemas.openxmlformats.org/officeDocument/2006/relationships" xmlns:p="http://schemas.openxmlformats.org/presentationml/2006/main">
+  <p:cSld>
+    <p:spTree>
+      <p:nvGrpSpPr>
+        <p:cNvPr id="1" name=""/>
+        <p:cNvGrpSpPr/>
+        <p:nvPr/>
+      </p:nvGrpSpPr>
+      <p:grpSpPr>
+        <a:xfrm>
+          <a:off x="0" y="0"/>
+          <a:ext cx="0" cy="0"/>
+          <a:chOff x="0" y="0"/>
+          <a:chExt cx="0" cy="0"/>
+        </a:xfrm>
+      </p:grpSpPr>
+      <p:sp>
+        <p:nvSpPr>
+          <p:cNvPr id="2" name="Titel 1"/>
+          <p:cNvSpPr>
+            <a:spLocks noGrp="1"/>
+          </p:cNvSpPr>
+          <p:nvPr>
+            <p:ph type="title"/>
+          </p:nvPr>
+        </p:nvSpPr>
+        <p:spPr/>
+        <p:txBody>
+          <a:bodyPr/>
+          <a:lstStyle/>
+          <a:p>
+            <a:r>
+              <a:rPr lang="de-CH" dirty="0" smtClean="0"/>
+              <a:t>Modellierung</a:t>
+            </a:r>
+            <a:endParaRPr lang="de-CH" dirty="0"/>
+          </a:p>
+        </p:txBody>
+      </p:sp>
+      <p:sp>
+        <p:nvSpPr>
+          <p:cNvPr id="3" name="Inhaltsplatzhalter 2"/>
+          <p:cNvSpPr>
+            <a:spLocks noGrp="1"/>
+          </p:cNvSpPr>
+          <p:nvPr>
+            <p:ph idx="1"/>
+          </p:nvPr>
+        </p:nvSpPr>
+        <p:spPr/>
+        <p:txBody>
+          <a:bodyPr>
+            <a:normAutofit/>
+          </a:bodyPr>
+          <a:lstStyle/>
+          <a:p>
+            <a:r>
+              <a:rPr lang="de-CH" dirty="0" smtClean="0"/>
+              <a:t>Echo in </a:t>
+            </a:r>
+            <a:r>
+              <a:rPr lang="de-CH" dirty="0" err="1" smtClean="0"/>
+              <a:t>Matlab</a:t>
+            </a:r>
+            <a:r>
+              <a:rPr lang="de-CH" dirty="0" smtClean="0"/>
+              <a:t>-Simulation:</a:t>
+            </a:r>
+            <a:endParaRPr lang="de-CH" dirty="0" smtClean="0"/>
+          </a:p>
+          <a:p>
+            <a:pPr lvl="1"/>
+            <a:r>
+              <a:rPr lang="de-CH" dirty="0" smtClean="0"/>
+              <a:t>Verzögerung</a:t>
+            </a:r>
+            <a:r>
+              <a:rPr lang="de-CH" dirty="0" smtClean="0"/>
+              <a:t>: 8/</a:t>
             </a:r>
             <a:r>
               <a:rPr lang="de-CH" dirty="0" err="1" smtClean="0"/>
@@ -5395,7 +6276,11 @@
             <a:pPr lvl="1"/>
             <a:r>
               <a:rPr lang="de-CH" dirty="0" smtClean="0"/>
-              <a:t>Echo-Amplitude: 0.4</a:t>
+              <a:t>Amplitude</a:t>
+            </a:r>
+            <a:r>
+              <a:rPr lang="de-CH" dirty="0" smtClean="0"/>
+              <a:t>: 0.4</a:t>
             </a:r>
             <a:endParaRPr lang="de-CH" dirty="0"/>
           </a:p>
@@ -5442,174 +6327,6 @@
 </p:sld>
 </file>
 
-<file path=ppt/slides/slide5.xml><?xml version="1.0" encoding="utf-8"?>
-<p:sld xmlns:a="http://schemas.openxmlformats.org/drawingml/2006/main" xmlns:r="http://schemas.openxmlformats.org/officeDocument/2006/relationships" xmlns:p="http://schemas.openxmlformats.org/presentationml/2006/main">
-  <p:cSld>
-    <p:spTree>
-      <p:nvGrpSpPr>
-        <p:cNvPr id="1" name=""/>
-        <p:cNvGrpSpPr/>
-        <p:nvPr/>
-      </p:nvGrpSpPr>
-      <p:grpSpPr>
-        <a:xfrm>
-          <a:off x="0" y="0"/>
-          <a:ext cx="0" cy="0"/>
-          <a:chOff x="0" y="0"/>
-          <a:chExt cx="0" cy="0"/>
-        </a:xfrm>
-      </p:grpSpPr>
-      <p:sp>
-        <p:nvSpPr>
-          <p:cNvPr id="2" name="Titel 1"/>
-          <p:cNvSpPr>
-            <a:spLocks noGrp="1"/>
-          </p:cNvSpPr>
-          <p:nvPr>
-            <p:ph type="title"/>
-          </p:nvPr>
-        </p:nvSpPr>
-        <p:spPr/>
-        <p:txBody>
-          <a:bodyPr/>
-          <a:lstStyle/>
-          <a:p>
-            <a:r>
-              <a:rPr lang="de-CH" dirty="0" smtClean="0"/>
-              <a:t>Lösung</a:t>
-            </a:r>
-            <a:endParaRPr lang="de-CH" dirty="0"/>
-          </a:p>
-        </p:txBody>
-      </p:sp>
-      <p:sp>
-        <p:nvSpPr>
-          <p:cNvPr id="3" name="Inhaltsplatzhalter 2"/>
-          <p:cNvSpPr>
-            <a:spLocks noGrp="1"/>
-          </p:cNvSpPr>
-          <p:nvPr>
-            <p:ph idx="1"/>
-          </p:nvPr>
-        </p:nvSpPr>
-        <p:spPr/>
-        <p:txBody>
-          <a:bodyPr/>
-          <a:lstStyle/>
-          <a:p>
-            <a:r>
-              <a:rPr lang="de-CH" dirty="0" smtClean="0"/>
-              <a:t>Adaptives </a:t>
-            </a:r>
-            <a:r>
-              <a:rPr lang="de-CH" dirty="0" smtClean="0"/>
-              <a:t>LMS-Filter</a:t>
-            </a:r>
-          </a:p>
-          <a:p>
-            <a:pPr lvl="1"/>
-            <a:r>
-              <a:rPr lang="de-CH" dirty="0" smtClean="0"/>
-              <a:t>Das </a:t>
-            </a:r>
-            <a:r>
-              <a:rPr lang="de-CH" dirty="0" smtClean="0"/>
-              <a:t>Signal y und das Signal y^ werden nun verglichen und auf das Filter zurückgeführt.</a:t>
-            </a:r>
-          </a:p>
-          <a:p>
-            <a:pPr lvl="1"/>
-            <a:r>
-              <a:rPr lang="de-CH" dirty="0" smtClean="0"/>
-              <a:t>Als Resultat sollte </a:t>
-            </a:r>
-            <a:r>
-              <a:rPr lang="de-CH" dirty="0" err="1" smtClean="0"/>
-              <a:t>optimalerweise</a:t>
-            </a:r>
-            <a:r>
-              <a:rPr lang="de-CH" dirty="0" smtClean="0"/>
-              <a:t> </a:t>
-            </a:r>
-            <a:r>
-              <a:rPr lang="de-CH" dirty="0" smtClean="0"/>
-              <a:t>0 herauskommen:</a:t>
-            </a:r>
-          </a:p>
-        </p:txBody>
-      </p:sp>
-      <p:graphicFrame>
-        <p:nvGraphicFramePr>
-          <p:cNvPr id="4" name="Objekt 3"/>
-          <p:cNvGraphicFramePr>
-            <a:graphicFrameLocks noChangeAspect="1"/>
-          </p:cNvGraphicFramePr>
-          <p:nvPr>
-            <p:extLst>
-              <p:ext uri="{D42A27DB-BD31-4B8C-83A1-F6EECF244321}">
-                <p14:modId xmlns:p14="http://schemas.microsoft.com/office/powerpoint/2010/main" val="3937119484"/>
-              </p:ext>
-            </p:extLst>
-          </p:nvPr>
-        </p:nvGraphicFramePr>
-        <p:xfrm>
-          <a:off x="1619672" y="4077072"/>
-          <a:ext cx="5844289" cy="2352080"/>
-        </p:xfrm>
-        <a:graphic>
-          <a:graphicData uri="http://schemas.openxmlformats.org/presentationml/2006/ole">
-            <mc:AlternateContent xmlns:mc="http://schemas.openxmlformats.org/markup-compatibility/2006">
-              <mc:Choice xmlns:v="urn:schemas-microsoft-com:vml" Requires="v">
-                <p:oleObj spid="_x0000_s3080" name="Visio" r:id="rId3" imgW="3099775" imgH="1248480" progId="Visio.Drawing.11">
-                  <p:embed/>
-                </p:oleObj>
-              </mc:Choice>
-              <mc:Fallback>
-                <p:oleObj name="Visio" r:id="rId3" imgW="3099775" imgH="1248480" progId="Visio.Drawing.11">
-                  <p:embed/>
-                  <p:pic>
-                    <p:nvPicPr>
-                      <p:cNvPr id="0" name=""/>
-                      <p:cNvPicPr/>
-                      <p:nvPr/>
-                    </p:nvPicPr>
-                    <p:blipFill>
-                      <a:blip r:embed="rId4"/>
-                      <a:stretch>
-                        <a:fillRect/>
-                      </a:stretch>
-                    </p:blipFill>
-                    <p:spPr>
-                      <a:xfrm>
-                        <a:off x="1619672" y="4077072"/>
-                        <a:ext cx="5844289" cy="2352080"/>
-                      </a:xfrm>
-                      <a:prstGeom prst="rect">
-                        <a:avLst/>
-                      </a:prstGeom>
-                    </p:spPr>
-                  </p:pic>
-                </p:oleObj>
-              </mc:Fallback>
-            </mc:AlternateContent>
-          </a:graphicData>
-        </a:graphic>
-      </p:graphicFrame>
-    </p:spTree>
-  </p:cSld>
-  <p:clrMapOvr>
-    <a:masterClrMapping/>
-  </p:clrMapOvr>
-  <p:timing>
-    <p:tnLst>
-      <p:par>
-        <p:cTn id="1" dur="indefinite" restart="never" nodeType="tmRoot"/>
-      </p:par>
-    </p:tnLst>
-  </p:timing>
-</p:sld>
-</file>
-
 <file path=ppt/slides/slide6.xml><?xml version="1.0" encoding="utf-8"?>
 <p:sld xmlns:a="http://schemas.openxmlformats.org/drawingml/2006/main" xmlns:r="http://schemas.openxmlformats.org/officeDocument/2006/relationships" xmlns:p="http://schemas.openxmlformats.org/presentationml/2006/main">
   <p:cSld>
@@ -5644,7 +6361,205 @@
           <a:p>
             <a:r>
               <a:rPr lang="de-CH" dirty="0" smtClean="0"/>
-              <a:t>Lösung</a:t>
+              <a:t>Lösungsansatz</a:t>
+            </a:r>
+            <a:endParaRPr lang="de-CH" dirty="0"/>
+          </a:p>
+        </p:txBody>
+      </p:sp>
+      <p:sp>
+        <p:nvSpPr>
+          <p:cNvPr id="3" name="Inhaltsplatzhalter 2"/>
+          <p:cNvSpPr>
+            <a:spLocks noGrp="1"/>
+          </p:cNvSpPr>
+          <p:nvPr>
+            <p:ph idx="1"/>
+          </p:nvPr>
+        </p:nvSpPr>
+        <p:spPr/>
+        <p:txBody>
+          <a:bodyPr/>
+          <a:lstStyle/>
+          <a:p>
+            <a:r>
+              <a:rPr lang="de-CH" dirty="0" smtClean="0"/>
+              <a:t>Normales adaptives </a:t>
+            </a:r>
+            <a:r>
+              <a:rPr lang="de-CH" dirty="0" smtClean="0"/>
+              <a:t>LMS-Filter</a:t>
+            </a:r>
+          </a:p>
+          <a:p>
+            <a:pPr lvl="1"/>
+            <a:r>
+              <a:rPr lang="de-CH" dirty="0" smtClean="0"/>
+              <a:t>Signal </a:t>
+            </a:r>
+            <a:r>
+              <a:rPr lang="de-CH" dirty="0" smtClean="0"/>
+              <a:t>y und </a:t>
+            </a:r>
+            <a:r>
+              <a:rPr lang="de-CH" dirty="0" smtClean="0"/>
+              <a:t>Signal </a:t>
+            </a:r>
+            <a:r>
+              <a:rPr lang="de-CH" dirty="0" err="1" smtClean="0"/>
+              <a:t>y</a:t>
+            </a:r>
+            <a:r>
+              <a:rPr lang="de-CH" baseline="-25000" dirty="0" err="1" smtClean="0"/>
+              <a:t>hat</a:t>
+            </a:r>
+            <a:r>
+              <a:rPr lang="de-CH" dirty="0" smtClean="0"/>
+              <a:t> </a:t>
+            </a:r>
+            <a:r>
+              <a:rPr lang="de-CH" dirty="0" smtClean="0"/>
+              <a:t>werden nun verglichen und auf </a:t>
+            </a:r>
+            <a:r>
+              <a:rPr lang="de-CH" dirty="0" smtClean="0"/>
+              <a:t>Filter zurückgeführt</a:t>
+            </a:r>
+            <a:endParaRPr lang="de-CH" dirty="0" smtClean="0"/>
+          </a:p>
+          <a:p>
+            <a:pPr lvl="1"/>
+            <a:r>
+              <a:rPr lang="de-CH" dirty="0" smtClean="0"/>
+              <a:t>Resultat: </a:t>
+            </a:r>
+            <a:r>
+              <a:rPr lang="de-CH" dirty="0" err="1" smtClean="0"/>
+              <a:t>optimalerweise</a:t>
+            </a:r>
+            <a:r>
+              <a:rPr lang="de-CH" dirty="0" smtClean="0"/>
+              <a:t> </a:t>
+            </a:r>
+            <a:r>
+              <a:rPr lang="de-CH" u="sng" dirty="0" smtClean="0"/>
+              <a:t>0</a:t>
+            </a:r>
+            <a:endParaRPr lang="de-CH" dirty="0" smtClean="0"/>
+          </a:p>
+        </p:txBody>
+      </p:sp>
+      <p:graphicFrame>
+        <p:nvGraphicFramePr>
+          <p:cNvPr id="4" name="Objekt 3"/>
+          <p:cNvGraphicFramePr>
+            <a:graphicFrameLocks noChangeAspect="1"/>
+          </p:cNvGraphicFramePr>
+          <p:nvPr>
+            <p:extLst>
+              <p:ext uri="{D42A27DB-BD31-4B8C-83A1-F6EECF244321}">
+                <p14:modId xmlns:p14="http://schemas.microsoft.com/office/powerpoint/2010/main" xmlns="" val="3937119484"/>
+              </p:ext>
+            </p:extLst>
+          </p:nvPr>
+        </p:nvGraphicFramePr>
+        <p:xfrm>
+          <a:off x="1619672" y="4077072"/>
+          <a:ext cx="5844289" cy="2352080"/>
+        </p:xfrm>
+        <a:graphic>
+          <a:graphicData uri="http://schemas.openxmlformats.org/presentationml/2006/ole">
+            <p:oleObj spid="_x0000_s3080" name="Visio" r:id="rId3" imgW="3099775" imgH="1248480" progId="Visio.Drawing.11">
+              <p:embed/>
+            </p:oleObj>
+          </a:graphicData>
+        </a:graphic>
+      </p:graphicFrame>
+      <p:cxnSp>
+        <p:nvCxnSpPr>
+          <p:cNvPr id="6" name="Gerade Verbindung 5"/>
+          <p:cNvCxnSpPr/>
+          <p:nvPr/>
+        </p:nvCxnSpPr>
+        <p:spPr>
+          <a:xfrm>
+            <a:off x="6127604" y="4528168"/>
+            <a:ext cx="72008" cy="0"/>
+          </a:xfrm>
+          <a:prstGeom prst="line">
+            <a:avLst/>
+          </a:prstGeom>
+          <a:ln w="19050">
+            <a:solidFill>
+              <a:schemeClr val="tx1"/>
+            </a:solidFill>
+          </a:ln>
+        </p:spPr>
+        <p:style>
+          <a:lnRef idx="1">
+            <a:schemeClr val="accent1"/>
+          </a:lnRef>
+          <a:fillRef idx="0">
+            <a:schemeClr val="accent1"/>
+          </a:fillRef>
+          <a:effectRef idx="0">
+            <a:schemeClr val="accent1"/>
+          </a:effectRef>
+          <a:fontRef idx="minor">
+            <a:schemeClr val="tx1"/>
+          </a:fontRef>
+        </p:style>
+      </p:cxnSp>
+    </p:spTree>
+  </p:cSld>
+  <p:clrMapOvr>
+    <a:masterClrMapping/>
+  </p:clrMapOvr>
+  <p:timing>
+    <p:tnLst>
+      <p:par>
+        <p:cTn id="1" dur="indefinite" restart="never" nodeType="tmRoot"/>
+      </p:par>
+    </p:tnLst>
+  </p:timing>
+</p:sld>
+</file>
+
+<file path=ppt/slides/slide7.xml><?xml version="1.0" encoding="utf-8"?>
+<p:sld xmlns:a="http://schemas.openxmlformats.org/drawingml/2006/main" xmlns:r="http://schemas.openxmlformats.org/officeDocument/2006/relationships" xmlns:p="http://schemas.openxmlformats.org/presentationml/2006/main">
+  <p:cSld>
+    <p:spTree>
+      <p:nvGrpSpPr>
+        <p:cNvPr id="1" name=""/>
+        <p:cNvGrpSpPr/>
+        <p:nvPr/>
+      </p:nvGrpSpPr>
+      <p:grpSpPr>
+        <a:xfrm>
+          <a:off x="0" y="0"/>
+          <a:ext cx="0" cy="0"/>
+          <a:chOff x="0" y="0"/>
+          <a:chExt cx="0" cy="0"/>
+        </a:xfrm>
+      </p:grpSpPr>
+      <p:sp>
+        <p:nvSpPr>
+          <p:cNvPr id="2" name="Titel 1"/>
+          <p:cNvSpPr>
+            <a:spLocks noGrp="1"/>
+          </p:cNvSpPr>
+          <p:nvPr>
+            <p:ph type="title"/>
+          </p:nvPr>
+        </p:nvSpPr>
+        <p:spPr/>
+        <p:txBody>
+          <a:bodyPr/>
+          <a:lstStyle/>
+          <a:p>
+            <a:r>
+              <a:rPr lang="de-CH" dirty="0" smtClean="0"/>
+              <a:t>Lösungsansatz</a:t>
             </a:r>
             <a:endParaRPr lang="de-CH" dirty="0"/>
           </a:p>
@@ -5831,133 +6746,6 @@
 </p:sld>
 </file>
 
-<file path=ppt/slides/slide7.xml><?xml version="1.0" encoding="utf-8"?>
-<p:sld xmlns:a="http://schemas.openxmlformats.org/drawingml/2006/main" xmlns:r="http://schemas.openxmlformats.org/officeDocument/2006/relationships" xmlns:p="http://schemas.openxmlformats.org/presentationml/2006/main">
-  <p:cSld>
-    <p:spTree>
-      <p:nvGrpSpPr>
-        <p:cNvPr id="1" name=""/>
-        <p:cNvGrpSpPr/>
-        <p:nvPr/>
-      </p:nvGrpSpPr>
-      <p:grpSpPr>
-        <a:xfrm>
-          <a:off x="0" y="0"/>
-          <a:ext cx="0" cy="0"/>
-          <a:chOff x="0" y="0"/>
-          <a:chExt cx="0" cy="0"/>
-        </a:xfrm>
-      </p:grpSpPr>
-      <p:sp>
-        <p:nvSpPr>
-          <p:cNvPr id="2" name="Titel 1"/>
-          <p:cNvSpPr>
-            <a:spLocks noGrp="1"/>
-          </p:cNvSpPr>
-          <p:nvPr>
-            <p:ph type="title"/>
-          </p:nvPr>
-        </p:nvSpPr>
-        <p:spPr/>
-        <p:txBody>
-          <a:bodyPr/>
-          <a:lstStyle/>
-          <a:p>
-            <a:r>
-              <a:rPr lang="de-CH" dirty="0" err="1" smtClean="0"/>
-              <a:t>Implementation</a:t>
-            </a:r>
-            <a:r>
-              <a:rPr lang="de-CH" dirty="0" smtClean="0"/>
-              <a:t> HL (</a:t>
-            </a:r>
-            <a:r>
-              <a:rPr lang="de-CH" dirty="0" err="1" smtClean="0"/>
-              <a:t>noise</a:t>
-            </a:r>
-            <a:r>
-              <a:rPr lang="de-CH" dirty="0" smtClean="0"/>
-              <a:t>)</a:t>
-            </a:r>
-            <a:endParaRPr lang="de-CH" dirty="0"/>
-          </a:p>
-        </p:txBody>
-      </p:sp>
-      <p:sp>
-        <p:nvSpPr>
-          <p:cNvPr id="3" name="Inhaltsplatzhalter 2"/>
-          <p:cNvSpPr>
-            <a:spLocks noGrp="1"/>
-          </p:cNvSpPr>
-          <p:nvPr>
-            <p:ph idx="1"/>
-          </p:nvPr>
-        </p:nvSpPr>
-        <p:spPr/>
-        <p:txBody>
-          <a:bodyPr/>
-          <a:lstStyle/>
-          <a:p>
-            <a:r>
-              <a:rPr lang="de-CH" dirty="0" smtClean="0"/>
-              <a:t>Weisses Rauschen</a:t>
-            </a:r>
-          </a:p>
-          <a:p>
-            <a:r>
-              <a:rPr lang="de-CH" dirty="0" smtClean="0"/>
-              <a:t>Echo ist eine Verzögerung um 8 Samples und Amplitude von 0.4:</a:t>
-            </a:r>
-          </a:p>
-          <a:p>
-            <a:pPr lvl="1"/>
-            <a:r>
-              <a:rPr lang="de-CH" dirty="0" smtClean="0"/>
-              <a:t>g = [1 0 0 0 0 0 0 0.4]</a:t>
-            </a:r>
-          </a:p>
-          <a:p>
-            <a:r>
-              <a:rPr lang="de-CH" dirty="0" smtClean="0"/>
-              <a:t>Konvergenzgeschwindigkeit ist abhängig von u</a:t>
-            </a:r>
-          </a:p>
-          <a:p>
-            <a:pPr lvl="1"/>
-            <a:r>
-              <a:rPr lang="de-CH" dirty="0" smtClean="0"/>
-              <a:t>u klein: genau aber langsam</a:t>
-            </a:r>
-          </a:p>
-          <a:p>
-            <a:pPr lvl="1"/>
-            <a:r>
-              <a:rPr lang="de-CH" dirty="0" smtClean="0"/>
-              <a:t>u gross: schnell aber ungenau (und evtl. unstabil)</a:t>
-            </a:r>
-          </a:p>
-        </p:txBody>
-      </p:sp>
-    </p:spTree>
-    <p:extLst>
-      <p:ext uri="{BB962C8B-B14F-4D97-AF65-F5344CB8AC3E}">
-        <p14:creationId xmlns:p14="http://schemas.microsoft.com/office/powerpoint/2010/main" val="770896185"/>
-      </p:ext>
-    </p:extLst>
-  </p:cSld>
-  <p:clrMapOvr>
-    <a:masterClrMapping/>
-  </p:clrMapOvr>
-  <p:timing>
-    <p:tnLst>
-      <p:par>
-        <p:cTn id="1" dur="indefinite" restart="never" nodeType="tmRoot"/>
-      </p:par>
-    </p:tnLst>
-  </p:timing>
-</p:sld>
-</file>
-
 <file path=ppt/slides/slide8.xml><?xml version="1.0" encoding="utf-8"?>
 <p:sld xmlns:a="http://schemas.openxmlformats.org/drawingml/2006/main" xmlns:r="http://schemas.openxmlformats.org/officeDocument/2006/relationships" xmlns:p="http://schemas.openxmlformats.org/presentationml/2006/main">
   <p:cSld>
@@ -5992,117 +6780,99 @@
           <a:p>
             <a:r>
               <a:rPr lang="de-CH" dirty="0" smtClean="0"/>
-              <a:t>Resultate HL (Noise)</a:t>
+              <a:t>Lösungsansatz</a:t>
             </a:r>
             <a:endParaRPr lang="de-CH" dirty="0"/>
           </a:p>
         </p:txBody>
       </p:sp>
-      <p:pic>
-        <p:nvPicPr>
-          <p:cNvPr id="16386" name="Picture 2" descr="D:\BFH\DSV\EchoCancellation\Präsentation\Konvergenz_u_tief_0.00008.png"/>
-          <p:cNvPicPr>
-            <a:picLocks noChangeAspect="1" noChangeArrowheads="1"/>
-          </p:cNvPicPr>
-          <p:nvPr/>
-        </p:nvPicPr>
-        <p:blipFill>
-          <a:blip r:embed="rId2" cstate="print"/>
-          <a:srcRect/>
-          <a:stretch>
-            <a:fillRect/>
-          </a:stretch>
-        </p:blipFill>
-        <p:spPr bwMode="auto">
-          <a:xfrm>
-            <a:off x="-324544" y="1196752"/>
-            <a:ext cx="7920880" cy="3974530"/>
-          </a:xfrm>
-          <a:prstGeom prst="rect">
-            <a:avLst/>
-          </a:prstGeom>
-          <a:noFill/>
-        </p:spPr>
-      </p:pic>
-      <p:pic>
-        <p:nvPicPr>
-          <p:cNvPr id="16387" name="Picture 3" descr="D:\BFH\DSV\EchoCancellation\Präsentation\Koeffizienten_u_tief_0.00008.png"/>
-          <p:cNvPicPr>
-            <a:picLocks noChangeAspect="1" noChangeArrowheads="1"/>
-          </p:cNvPicPr>
-          <p:nvPr/>
-        </p:nvPicPr>
-        <p:blipFill>
-          <a:blip r:embed="rId3" cstate="print"/>
-          <a:srcRect/>
-          <a:stretch>
-            <a:fillRect/>
-          </a:stretch>
-        </p:blipFill>
-        <p:spPr bwMode="auto">
-          <a:xfrm>
-            <a:off x="5874889" y="4437112"/>
-            <a:ext cx="3233615" cy="2420888"/>
-          </a:xfrm>
-          <a:prstGeom prst="rect">
-            <a:avLst/>
-          </a:prstGeom>
-          <a:noFill/>
-        </p:spPr>
-      </p:pic>
-      <p:sp>
-        <p:nvSpPr>
-          <p:cNvPr id="6" name="Textfeld 5"/>
-          <p:cNvSpPr txBox="1"/>
-          <p:nvPr/>
-        </p:nvSpPr>
-        <p:spPr>
-          <a:xfrm>
-            <a:off x="251520" y="5373216"/>
-            <a:ext cx="5688632" cy="1077218"/>
-          </a:xfrm>
-          <a:prstGeom prst="rect">
-            <a:avLst/>
-          </a:prstGeom>
-          <a:noFill/>
-          <a:ln>
-            <a:noFill/>
-          </a:ln>
-        </p:spPr>
-        <p:txBody>
-          <a:bodyPr wrap="square" rtlCol="0">
-            <a:spAutoFit/>
-          </a:bodyPr>
-          <a:lstStyle/>
-          <a:p>
-            <a:pPr>
-              <a:buFont typeface="Arial" pitchFamily="34" charset="0"/>
-              <a:buChar char="•"/>
-            </a:pPr>
-            <a:r>
-              <a:rPr lang="de-CH" sz="3200" dirty="0" smtClean="0"/>
-              <a:t>Weisses Rauschen</a:t>
-            </a:r>
-          </a:p>
-          <a:p>
-            <a:pPr>
-              <a:buFont typeface="Arial" pitchFamily="34" charset="0"/>
-              <a:buChar char="•"/>
-            </a:pPr>
-            <a:r>
-              <a:rPr lang="de-CH" sz="3200" dirty="0" smtClean="0"/>
-              <a:t>u = 0.00008 (klein)</a:t>
-            </a:r>
-            <a:endParaRPr lang="de-CH" sz="3200" dirty="0"/>
+      <p:sp>
+        <p:nvSpPr>
+          <p:cNvPr id="3" name="Inhaltsplatzhalter 2"/>
+          <p:cNvSpPr>
+            <a:spLocks noGrp="1"/>
+          </p:cNvSpPr>
+          <p:nvPr>
+            <p:ph idx="1"/>
+          </p:nvPr>
+        </p:nvSpPr>
+        <p:spPr/>
+        <p:txBody>
+          <a:bodyPr/>
+          <a:lstStyle/>
+          <a:p>
+            <a:r>
+              <a:rPr lang="de-CH" dirty="0" smtClean="0"/>
+              <a:t>Echo </a:t>
+            </a:r>
+            <a:r>
+              <a:rPr lang="de-CH" dirty="0" err="1" smtClean="0"/>
+              <a:t>Cancellation</a:t>
+            </a:r>
+            <a:r>
+              <a:rPr lang="de-CH" dirty="0" smtClean="0"/>
+              <a:t> mit Adaptivem </a:t>
+            </a:r>
+            <a:r>
+              <a:rPr lang="de-CH" dirty="0" smtClean="0"/>
+              <a:t>LMS-Filter:</a:t>
+            </a:r>
+          </a:p>
+          <a:p>
+            <a:pPr lvl="1"/>
+            <a:r>
+              <a:rPr lang="de-CH" dirty="0" smtClean="0"/>
+              <a:t>Weit verbreitete und einfachste Methode.</a:t>
+            </a:r>
+          </a:p>
+          <a:p>
+            <a:pPr lvl="1"/>
+            <a:r>
+              <a:rPr lang="de-CH" dirty="0" smtClean="0"/>
+              <a:t>Zahlreiche IEEE Papers und Erwähnung in praktisch jeder DSV-Literatur</a:t>
+            </a:r>
+          </a:p>
+          <a:p>
+            <a:pPr lvl="1"/>
+            <a:r>
+              <a:rPr lang="de-CH" dirty="0" smtClean="0"/>
+              <a:t>Wird eingesetzt bei: </a:t>
+            </a:r>
+          </a:p>
+          <a:p>
+            <a:pPr lvl="2"/>
+            <a:r>
+              <a:rPr lang="de-CH" dirty="0" err="1" smtClean="0"/>
+              <a:t>Skype</a:t>
+            </a:r>
+            <a:endParaRPr lang="de-CH" dirty="0" smtClean="0"/>
+          </a:p>
+          <a:p>
+            <a:pPr lvl="2"/>
+            <a:r>
+              <a:rPr lang="de-CH" dirty="0" err="1" smtClean="0"/>
+              <a:t>Teamspeak</a:t>
+            </a:r>
+            <a:endParaRPr lang="de-CH" dirty="0" smtClean="0"/>
+          </a:p>
+          <a:p>
+            <a:pPr lvl="2"/>
+            <a:r>
+              <a:rPr lang="de-CH" dirty="0" smtClean="0"/>
+              <a:t>Smartphone</a:t>
+            </a:r>
+          </a:p>
+          <a:p>
+            <a:pPr lvl="2"/>
+            <a:endParaRPr lang="de-CH" dirty="0" smtClean="0"/>
+          </a:p>
+          <a:p>
+            <a:pPr lvl="2"/>
+            <a:endParaRPr lang="de-CH" dirty="0" smtClean="0"/>
           </a:p>
         </p:txBody>
       </p:sp>
     </p:spTree>
-    <p:extLst>
-      <p:ext uri="{BB962C8B-B14F-4D97-AF65-F5344CB8AC3E}">
-        <p14:creationId xmlns:p14="http://schemas.microsoft.com/office/powerpoint/2010/main" val="3796069438"/>
-      </p:ext>
-    </p:extLst>
   </p:cSld>
   <p:clrMapOvr>
     <a:masterClrMapping/>
@@ -6150,8 +6920,20 @@
           <a:lstStyle/>
           <a:p>
             <a:r>
-              <a:rPr lang="de-CH" dirty="0" smtClean="0"/>
-              <a:t>Resultate HL (Noise)</a:t>
+              <a:rPr lang="de-CH" dirty="0" err="1" smtClean="0"/>
+              <a:t>Implementation</a:t>
+            </a:r>
+            <a:r>
+              <a:rPr lang="de-CH" dirty="0" smtClean="0"/>
+              <a:t> HL (</a:t>
+            </a:r>
+            <a:r>
+              <a:rPr lang="de-CH" dirty="0" err="1" smtClean="0"/>
+              <a:t>noise</a:t>
+            </a:r>
+            <a:r>
+              <a:rPr lang="de-CH" dirty="0" smtClean="0"/>
+              <a:t>)</a:t>
             </a:r>
             <a:endParaRPr lang="de-CH" dirty="0"/>
           </a:p>
@@ -6159,107 +6941,63 @@
       </p:sp>
       <p:sp>
         <p:nvSpPr>
-          <p:cNvPr id="6" name="Textfeld 5"/>
-          <p:cNvSpPr txBox="1"/>
-          <p:nvPr/>
-        </p:nvSpPr>
-        <p:spPr>
-          <a:xfrm>
-            <a:off x="251520" y="5373216"/>
-            <a:ext cx="5688632" cy="1077218"/>
-          </a:xfrm>
-          <a:prstGeom prst="rect">
-            <a:avLst/>
-          </a:prstGeom>
-          <a:noFill/>
-          <a:ln>
-            <a:noFill/>
-          </a:ln>
-        </p:spPr>
-        <p:txBody>
-          <a:bodyPr wrap="square" rtlCol="0">
-            <a:spAutoFit/>
-          </a:bodyPr>
-          <a:lstStyle/>
-          <a:p>
-            <a:pPr>
-              <a:buFont typeface="Arial" pitchFamily="34" charset="0"/>
-              <a:buChar char="•"/>
-            </a:pPr>
-            <a:r>
-              <a:rPr lang="de-CH" sz="3200" dirty="0" smtClean="0"/>
+          <p:cNvPr id="3" name="Inhaltsplatzhalter 2"/>
+          <p:cNvSpPr>
+            <a:spLocks noGrp="1"/>
+          </p:cNvSpPr>
+          <p:nvPr>
+            <p:ph idx="1"/>
+          </p:nvPr>
+        </p:nvSpPr>
+        <p:spPr/>
+        <p:txBody>
+          <a:bodyPr/>
+          <a:lstStyle/>
+          <a:p>
+            <a:r>
+              <a:rPr lang="de-CH" dirty="0" smtClean="0"/>
               <a:t>Weisses Rauschen</a:t>
             </a:r>
           </a:p>
           <a:p>
-            <a:pPr>
-              <a:buFont typeface="Arial" pitchFamily="34" charset="0"/>
-              <a:buChar char="•"/>
-            </a:pPr>
-            <a:r>
-              <a:rPr lang="de-CH" sz="3200" dirty="0" smtClean="0"/>
-              <a:t>u = 0.008 (gross)</a:t>
-            </a:r>
-            <a:endParaRPr lang="de-CH" sz="3200" dirty="0"/>
-          </a:p>
-        </p:txBody>
-      </p:sp>
-      <p:pic>
-        <p:nvPicPr>
-          <p:cNvPr id="17410" name="Picture 2" descr="D:\BFH\DSV\EchoCancellation\Präsentation\Konvergenz_u_hoch_0.008.png"/>
-          <p:cNvPicPr>
-            <a:picLocks noChangeAspect="1" noChangeArrowheads="1"/>
-          </p:cNvPicPr>
-          <p:nvPr/>
-        </p:nvPicPr>
-        <p:blipFill>
-          <a:blip r:embed="rId2" cstate="print"/>
-          <a:srcRect/>
-          <a:stretch>
-            <a:fillRect/>
-          </a:stretch>
-        </p:blipFill>
-        <p:spPr bwMode="auto">
-          <a:xfrm>
-            <a:off x="-324544" y="1196752"/>
-            <a:ext cx="7892800" cy="3960439"/>
-          </a:xfrm>
-          <a:prstGeom prst="rect">
-            <a:avLst/>
-          </a:prstGeom>
-          <a:noFill/>
-        </p:spPr>
-      </p:pic>
-      <p:pic>
-        <p:nvPicPr>
-          <p:cNvPr id="17411" name="Picture 3" descr="D:\BFH\DSV\EchoCancellation\Präsentation\Koeffizienten_u_hoch_0.008.png"/>
-          <p:cNvPicPr>
-            <a:picLocks noChangeAspect="1" noChangeArrowheads="1"/>
-          </p:cNvPicPr>
-          <p:nvPr/>
-        </p:nvPicPr>
-        <p:blipFill>
-          <a:blip r:embed="rId3" cstate="print"/>
-          <a:srcRect/>
-          <a:stretch>
-            <a:fillRect/>
-          </a:stretch>
-        </p:blipFill>
-        <p:spPr bwMode="auto">
-          <a:xfrm>
-            <a:off x="5868144" y="4432872"/>
-            <a:ext cx="3275856" cy="2452512"/>
-          </a:xfrm>
-          <a:prstGeom prst="rect">
-            <a:avLst/>
-          </a:prstGeom>
-          <a:noFill/>
-        </p:spPr>
-      </p:pic>
+            <a:r>
+              <a:rPr lang="de-CH" dirty="0" smtClean="0"/>
+              <a:t>Echo ist eine Verzögerung um 8 Samples und Amplitude von 0.4:</a:t>
+            </a:r>
+          </a:p>
+          <a:p>
+            <a:pPr lvl="1"/>
+            <a:r>
+              <a:rPr lang="de-CH" dirty="0" smtClean="0"/>
+              <a:t>g = [1 0 0 0 0 0 0 0.4]</a:t>
+            </a:r>
+          </a:p>
+          <a:p>
+            <a:r>
+              <a:rPr lang="de-CH" dirty="0" smtClean="0"/>
+              <a:t>Konvergenzgeschwindigkeit ist abhängig von u</a:t>
+            </a:r>
+          </a:p>
+          <a:p>
+            <a:pPr lvl="1"/>
+            <a:r>
+              <a:rPr lang="de-CH" dirty="0" smtClean="0"/>
+              <a:t>u klein: genau aber langsam</a:t>
+            </a:r>
+          </a:p>
+          <a:p>
+            <a:pPr lvl="1"/>
+            <a:r>
+              <a:rPr lang="de-CH" dirty="0" smtClean="0"/>
+              <a:t>u gross: schnell aber ungenau (und evtl. unstabil)</a:t>
+            </a:r>
+          </a:p>
+        </p:txBody>
+      </p:sp>
     </p:spTree>
     <p:extLst>
       <p:ext uri="{BB962C8B-B14F-4D97-AF65-F5344CB8AC3E}">
-        <p14:creationId xmlns:p14="http://schemas.microsoft.com/office/powerpoint/2010/main" val="408520795"/>
+        <p14:creationId xmlns:p14="http://schemas.microsoft.com/office/powerpoint/2010/main" xmlns="" val="770896185"/>
       </p:ext>
     </p:extLst>
   </p:cSld>

</xml_diff>